<commit_message>
ball tracker demo slides and pictures
</commit_message>
<xml_diff>
--- a/presentation/Presentation.pptx
+++ b/presentation/Presentation.pptx
@@ -5,8 +5,11 @@
     <p:sldMasterId id="2147483648" r:id="rId1"/>
   </p:sldMasterIdLst>
   <p:notesMasterIdLst>
-    <p:notesMasterId r:id="rId21"/>
+    <p:notesMasterId r:id="rId23"/>
   </p:notesMasterIdLst>
+  <p:handoutMasterIdLst>
+    <p:handoutMasterId r:id="rId24"/>
+  </p:handoutMasterIdLst>
   <p:sldIdLst>
     <p:sldId id="269" r:id="rId2"/>
     <p:sldId id="278" r:id="rId3"/>
@@ -27,6 +30,8 @@
     <p:sldId id="274" r:id="rId18"/>
     <p:sldId id="275" r:id="rId19"/>
     <p:sldId id="276" r:id="rId20"/>
+    <p:sldId id="284" r:id="rId21"/>
+    <p:sldId id="283" r:id="rId22"/>
   </p:sldIdLst>
   <p:sldSz cx="9144000" cy="6858000" type="screen4x3"/>
   <p:notesSz cx="6858000" cy="9144000"/>
@@ -161,6 +166,8 @@
             <p14:sldId id="274"/>
             <p14:sldId id="275"/>
             <p14:sldId id="276"/>
+            <p14:sldId id="284"/>
+            <p14:sldId id="283"/>
           </p14:sldIdLst>
         </p14:section>
       </p14:sectionLst>
@@ -194,8 +201,8 @@
   <ax:ocxPr ax:name="SAMIFilename" ax:value=""/>
   <ax:ocxPr ax:name="captioningID" ax:value=""/>
   <ax:ocxPr ax:name="enableErrorDialogs" ax:value="0"/>
-  <ax:ocxPr ax:name="_cx" ax:value="25400"/>
-  <ax:ocxPr ax:name="_cy" ax:value="19059"/>
+  <ax:ocxPr ax:name="_cx" ax:value="25422"/>
+  <ax:ocxPr ax:name="_cy" ax:value="19046"/>
 </ax:ocx>
 </file>
 
@@ -267,11 +274,11 @@
           <c:showPercent val="0"/>
           <c:showBubbleSize val="0"/>
         </c:dLbls>
-        <c:axId val="172010496"/>
-        <c:axId val="119538432"/>
+        <c:axId val="46158208"/>
+        <c:axId val="46159744"/>
       </c:scatterChart>
       <c:valAx>
-        <c:axId val="172010496"/>
+        <c:axId val="46158208"/>
         <c:scaling>
           <c:orientation val="minMax"/>
           <c:max val="8"/>
@@ -293,12 +300,12 @@
             <a:endParaRPr lang="nl-NL"/>
           </a:p>
         </c:txPr>
-        <c:crossAx val="119538432"/>
+        <c:crossAx val="46159744"/>
         <c:crosses val="autoZero"/>
         <c:crossBetween val="midCat"/>
       </c:valAx>
       <c:valAx>
-        <c:axId val="119538432"/>
+        <c:axId val="46159744"/>
         <c:scaling>
           <c:orientation val="minMax"/>
           <c:max val="8"/>
@@ -320,7 +327,7 @@
             <a:endParaRPr lang="nl-NL"/>
           </a:p>
         </c:txPr>
-        <c:crossAx val="172010496"/>
+        <c:crossAx val="46158208"/>
         <c:crosses val="autoZero"/>
         <c:crossBetween val="midCat"/>
       </c:valAx>
@@ -419,11 +426,11 @@
           <c:showPercent val="0"/>
           <c:showBubbleSize val="0"/>
         </c:dLbls>
-        <c:axId val="170262528"/>
-        <c:axId val="170264064"/>
+        <c:axId val="46179456"/>
+        <c:axId val="46180992"/>
       </c:scatterChart>
       <c:valAx>
-        <c:axId val="170262528"/>
+        <c:axId val="46179456"/>
         <c:scaling>
           <c:orientation val="minMax"/>
           <c:max val="8"/>
@@ -445,12 +452,12 @@
             <a:endParaRPr lang="nl-NL"/>
           </a:p>
         </c:txPr>
-        <c:crossAx val="170264064"/>
+        <c:crossAx val="46180992"/>
         <c:crosses val="autoZero"/>
         <c:crossBetween val="midCat"/>
       </c:valAx>
       <c:valAx>
-        <c:axId val="170264064"/>
+        <c:axId val="46180992"/>
         <c:scaling>
           <c:orientation val="minMax"/>
           <c:max val="8"/>
@@ -472,7 +479,7 @@
             <a:endParaRPr lang="nl-NL"/>
           </a:p>
         </c:txPr>
-        <c:crossAx val="170262528"/>
+        <c:crossAx val="46179456"/>
         <c:crosses val="autoZero"/>
         <c:crossBetween val="midCat"/>
       </c:valAx>
@@ -577,11 +584,11 @@
           <c:showPercent val="0"/>
           <c:showBubbleSize val="0"/>
         </c:dLbls>
-        <c:axId val="170459904"/>
-        <c:axId val="170461440"/>
+        <c:axId val="131131264"/>
+        <c:axId val="131132800"/>
       </c:scatterChart>
       <c:valAx>
-        <c:axId val="170459904"/>
+        <c:axId val="131131264"/>
         <c:scaling>
           <c:orientation val="minMax"/>
           <c:max val="8"/>
@@ -603,12 +610,12 @@
             <a:endParaRPr lang="nl-NL"/>
           </a:p>
         </c:txPr>
-        <c:crossAx val="170461440"/>
+        <c:crossAx val="131132800"/>
         <c:crosses val="autoZero"/>
         <c:crossBetween val="midCat"/>
       </c:valAx>
       <c:valAx>
-        <c:axId val="170461440"/>
+        <c:axId val="131132800"/>
         <c:scaling>
           <c:orientation val="minMax"/>
           <c:max val="8"/>
@@ -630,7 +637,7 @@
             <a:endParaRPr lang="nl-NL"/>
           </a:p>
         </c:txPr>
-        <c:crossAx val="170459904"/>
+        <c:crossAx val="131131264"/>
         <c:crosses val="autoZero"/>
         <c:crossBetween val="midCat"/>
       </c:valAx>
@@ -741,11 +748,11 @@
           <c:showPercent val="0"/>
           <c:showBubbleSize val="0"/>
         </c:dLbls>
-        <c:axId val="175044096"/>
-        <c:axId val="175045632"/>
+        <c:axId val="130820736"/>
+        <c:axId val="130834816"/>
       </c:scatterChart>
       <c:valAx>
-        <c:axId val="175044096"/>
+        <c:axId val="130820736"/>
         <c:scaling>
           <c:orientation val="minMax"/>
           <c:max val="8"/>
@@ -767,12 +774,12 @@
             <a:endParaRPr lang="nl-NL"/>
           </a:p>
         </c:txPr>
-        <c:crossAx val="175045632"/>
+        <c:crossAx val="130834816"/>
         <c:crosses val="autoZero"/>
         <c:crossBetween val="midCat"/>
       </c:valAx>
       <c:valAx>
-        <c:axId val="175045632"/>
+        <c:axId val="130834816"/>
         <c:scaling>
           <c:orientation val="minMax"/>
           <c:max val="8"/>
@@ -794,7 +801,7 @@
             <a:endParaRPr lang="nl-NL"/>
           </a:p>
         </c:txPr>
-        <c:crossAx val="175044096"/>
+        <c:crossAx val="130820736"/>
         <c:crosses val="autoZero"/>
         <c:crossBetween val="midCat"/>
       </c:valAx>
@@ -911,11 +918,11 @@
           <c:showPercent val="0"/>
           <c:showBubbleSize val="0"/>
         </c:dLbls>
-        <c:axId val="112335104"/>
-        <c:axId val="112345088"/>
+        <c:axId val="130891136"/>
+        <c:axId val="130892928"/>
       </c:scatterChart>
       <c:valAx>
-        <c:axId val="112335104"/>
+        <c:axId val="130891136"/>
         <c:scaling>
           <c:orientation val="minMax"/>
           <c:max val="8"/>
@@ -937,12 +944,12 @@
             <a:endParaRPr lang="nl-NL"/>
           </a:p>
         </c:txPr>
-        <c:crossAx val="112345088"/>
+        <c:crossAx val="130892928"/>
         <c:crosses val="autoZero"/>
         <c:crossBetween val="midCat"/>
       </c:valAx>
       <c:valAx>
-        <c:axId val="112345088"/>
+        <c:axId val="130892928"/>
         <c:scaling>
           <c:orientation val="minMax"/>
           <c:max val="8"/>
@@ -964,7 +971,7 @@
             <a:endParaRPr lang="nl-NL"/>
           </a:p>
         </c:txPr>
-        <c:crossAx val="112335104"/>
+        <c:crossAx val="130891136"/>
         <c:crosses val="autoZero"/>
         <c:crossBetween val="midCat"/>
       </c:valAx>
@@ -1087,11 +1094,11 @@
           <c:showPercent val="0"/>
           <c:showBubbleSize val="0"/>
         </c:dLbls>
-        <c:axId val="112364544"/>
-        <c:axId val="112366336"/>
+        <c:axId val="130912640"/>
+        <c:axId val="130914176"/>
       </c:scatterChart>
       <c:valAx>
-        <c:axId val="112364544"/>
+        <c:axId val="130912640"/>
         <c:scaling>
           <c:orientation val="minMax"/>
           <c:max val="8"/>
@@ -1113,12 +1120,12 @@
             <a:endParaRPr lang="nl-NL"/>
           </a:p>
         </c:txPr>
-        <c:crossAx val="112366336"/>
+        <c:crossAx val="130914176"/>
         <c:crosses val="autoZero"/>
         <c:crossBetween val="midCat"/>
       </c:valAx>
       <c:valAx>
-        <c:axId val="112366336"/>
+        <c:axId val="130914176"/>
         <c:scaling>
           <c:orientation val="minMax"/>
           <c:max val="8"/>
@@ -1140,7 +1147,7 @@
             <a:endParaRPr lang="nl-NL"/>
           </a:p>
         </c:txPr>
-        <c:crossAx val="112364544"/>
+        <c:crossAx val="130912640"/>
         <c:crosses val="autoZero"/>
         <c:crossBetween val="midCat"/>
       </c:valAx>
@@ -1269,11 +1276,11 @@
           <c:showPercent val="0"/>
           <c:showBubbleSize val="0"/>
         </c:dLbls>
-        <c:axId val="112545792"/>
-        <c:axId val="112547328"/>
+        <c:axId val="130909312"/>
+        <c:axId val="130910848"/>
       </c:scatterChart>
       <c:valAx>
-        <c:axId val="112545792"/>
+        <c:axId val="130909312"/>
         <c:scaling>
           <c:orientation val="minMax"/>
           <c:max val="8"/>
@@ -1295,12 +1302,12 @@
             <a:endParaRPr lang="nl-NL"/>
           </a:p>
         </c:txPr>
-        <c:crossAx val="112547328"/>
+        <c:crossAx val="130910848"/>
         <c:crosses val="autoZero"/>
         <c:crossBetween val="midCat"/>
       </c:valAx>
       <c:valAx>
-        <c:axId val="112547328"/>
+        <c:axId val="130910848"/>
         <c:scaling>
           <c:orientation val="minMax"/>
           <c:max val="8"/>
@@ -1322,7 +1329,7 @@
             <a:endParaRPr lang="nl-NL"/>
           </a:p>
         </c:txPr>
-        <c:crossAx val="112545792"/>
+        <c:crossAx val="130909312"/>
         <c:crosses val="autoZero"/>
         <c:crossBetween val="midCat"/>
       </c:valAx>
@@ -1457,11 +1464,11 @@
           <c:showPercent val="0"/>
           <c:showBubbleSize val="0"/>
         </c:dLbls>
-        <c:axId val="112567040"/>
-        <c:axId val="112568576"/>
+        <c:axId val="130992000"/>
+        <c:axId val="130993536"/>
       </c:scatterChart>
       <c:valAx>
-        <c:axId val="112567040"/>
+        <c:axId val="130992000"/>
         <c:scaling>
           <c:orientation val="minMax"/>
           <c:max val="8"/>
@@ -1483,12 +1490,12 @@
             <a:endParaRPr lang="nl-NL"/>
           </a:p>
         </c:txPr>
-        <c:crossAx val="112568576"/>
+        <c:crossAx val="130993536"/>
         <c:crosses val="autoZero"/>
         <c:crossBetween val="midCat"/>
       </c:valAx>
       <c:valAx>
-        <c:axId val="112568576"/>
+        <c:axId val="130993536"/>
         <c:scaling>
           <c:orientation val="minMax"/>
           <c:max val="8"/>
@@ -1510,7 +1517,7 @@
             <a:endParaRPr lang="nl-NL"/>
           </a:p>
         </c:txPr>
-        <c:crossAx val="112567040"/>
+        <c:crossAx val="130992000"/>
         <c:crosses val="autoZero"/>
         <c:crossBetween val="midCat"/>
       </c:valAx>
@@ -1651,11 +1658,11 @@
           <c:showPercent val="0"/>
           <c:showBubbleSize val="0"/>
         </c:dLbls>
-        <c:axId val="112727552"/>
-        <c:axId val="112729088"/>
+        <c:axId val="120119296"/>
+        <c:axId val="120120832"/>
       </c:scatterChart>
       <c:valAx>
-        <c:axId val="112727552"/>
+        <c:axId val="120119296"/>
         <c:scaling>
           <c:orientation val="minMax"/>
           <c:max val="8"/>
@@ -1677,13 +1684,13 @@
             <a:endParaRPr lang="nl-NL"/>
           </a:p>
         </c:txPr>
-        <c:crossAx val="112729088"/>
+        <c:crossAx val="120120832"/>
         <c:crosses val="autoZero"/>
         <c:crossBetween val="midCat"/>
         <c:majorUnit val="2"/>
       </c:valAx>
       <c:valAx>
-        <c:axId val="112729088"/>
+        <c:axId val="120120832"/>
         <c:scaling>
           <c:orientation val="minMax"/>
           <c:max val="8"/>
@@ -1705,7 +1712,7 @@
             <a:endParaRPr lang="nl-NL"/>
           </a:p>
         </c:txPr>
-        <c:crossAx val="112727552"/>
+        <c:crossAx val="120119296"/>
         <c:crosses val="autoZero"/>
         <c:crossBetween val="midCat"/>
       </c:valAx>
@@ -1730,6 +1737,39 @@
 </c:chartSpace>
 </file>
 
+<file path=ppt/handoutMasters/handoutMaster1.xml><?xml version="1.0" encoding="utf-8"?>
+<p:handoutMaster xmlns:a="http://schemas.openxmlformats.org/drawingml/2006/main" xmlns:r="http://schemas.openxmlformats.org/officeDocument/2006/relationships" xmlns:p="http://schemas.openxmlformats.org/presentationml/2006/main">
+  <p:cSld>
+    <p:bg>
+      <p:bgRef idx="1001">
+        <a:schemeClr val="bg1"/>
+      </p:bgRef>
+    </p:bg>
+    <p:spTree>
+      <p:nvGrpSpPr>
+        <p:cNvPr id="1" name=""/>
+        <p:cNvGrpSpPr/>
+        <p:nvPr/>
+      </p:nvGrpSpPr>
+      <p:grpSpPr>
+        <a:xfrm>
+          <a:off x="0" y="0"/>
+          <a:ext cx="0" cy="0"/>
+          <a:chOff x="0" y="0"/>
+          <a:chExt cx="0" cy="0"/>
+        </a:xfrm>
+      </p:grpSpPr>
+    </p:spTree>
+    <p:extLst>
+      <p:ext uri="{BB962C8B-B14F-4D97-AF65-F5344CB8AC3E}">
+        <p14:creationId xmlns:p14="http://schemas.microsoft.com/office/powerpoint/2010/main" val="3809736115"/>
+      </p:ext>
+    </p:extLst>
+  </p:cSld>
+  <p:clrMap bg1="lt1" tx1="dk1" bg2="lt2" tx2="dk2" accent1="accent1" accent2="accent2" accent3="accent3" accent4="accent4" accent5="accent5" accent6="accent6" hlink="hlink" folHlink="folHlink"/>
+</p:handoutMaster>
+</file>
+
 <file path=ppt/notesMasters/notesMaster1.xml><?xml version="1.0" encoding="utf-8"?>
 <p:notesMaster xmlns:a="http://schemas.openxmlformats.org/drawingml/2006/main" xmlns:r="http://schemas.openxmlformats.org/officeDocument/2006/relationships" xmlns:p="http://schemas.openxmlformats.org/presentationml/2006/main">
   <p:cSld>
@@ -1812,7 +1852,7 @@
           <a:p>
             <a:fld id="{9B672E7A-3E5D-4AB0-B300-1A3301431166}" type="datetimeFigureOut">
               <a:rPr lang="nl-NL" smtClean="0"/>
-              <a:t>13-12-2016</a:t>
+              <a:t>14-12-2016</a:t>
             </a:fld>
             <a:endParaRPr lang="nl-NL"/>
           </a:p>
@@ -2107,7 +2147,12 @@
             <p:ph type="sldImg"/>
           </p:nvPr>
         </p:nvSpPr>
-        <p:spPr/>
+        <p:spPr>
+          <a:xfrm>
+            <a:off x="1143000" y="685800"/>
+            <a:ext cx="4572000" cy="3429000"/>
+          </a:xfrm>
+        </p:spPr>
       </p:sp>
       <p:sp>
         <p:nvSpPr>
@@ -2124,7 +2169,7 @@
           <a:bodyPr/>
           <a:lstStyle/>
           <a:p>
-            <a:endParaRPr lang="nl-NL"/>
+            <a:endParaRPr lang="nl-NL" dirty="0"/>
           </a:p>
         </p:txBody>
       </p:sp>
@@ -2155,6 +2200,426 @@
     <p:extLst>
       <p:ext uri="{BB962C8B-B14F-4D97-AF65-F5344CB8AC3E}">
         <p14:creationId xmlns:p14="http://schemas.microsoft.com/office/powerpoint/2010/main" val="2193829826"/>
+      </p:ext>
+    </p:extLst>
+  </p:cSld>
+  <p:clrMapOvr>
+    <a:masterClrMapping/>
+  </p:clrMapOvr>
+</p:notes>
+</file>
+
+<file path=ppt/notesSlides/notesSlide2.xml><?xml version="1.0" encoding="utf-8"?>
+<p:notes xmlns:a="http://schemas.openxmlformats.org/drawingml/2006/main" xmlns:r="http://schemas.openxmlformats.org/officeDocument/2006/relationships" xmlns:p="http://schemas.openxmlformats.org/presentationml/2006/main">
+  <p:cSld>
+    <p:spTree>
+      <p:nvGrpSpPr>
+        <p:cNvPr id="1" name=""/>
+        <p:cNvGrpSpPr/>
+        <p:nvPr/>
+      </p:nvGrpSpPr>
+      <p:grpSpPr>
+        <a:xfrm>
+          <a:off x="0" y="0"/>
+          <a:ext cx="0" cy="0"/>
+          <a:chOff x="0" y="0"/>
+          <a:chExt cx="0" cy="0"/>
+        </a:xfrm>
+      </p:grpSpPr>
+      <p:sp>
+        <p:nvSpPr>
+          <p:cNvPr id="2" name="Tijdelijke aanduiding voor dia-afbeelding 1"/>
+          <p:cNvSpPr>
+            <a:spLocks noGrp="1" noRot="1" noChangeAspect="1"/>
+          </p:cNvSpPr>
+          <p:nvPr>
+            <p:ph type="sldImg"/>
+          </p:nvPr>
+        </p:nvSpPr>
+        <p:spPr/>
+      </p:sp>
+      <p:sp>
+        <p:nvSpPr>
+          <p:cNvPr id="3" name="Tijdelijke aanduiding voor notities 2"/>
+          <p:cNvSpPr>
+            <a:spLocks noGrp="1"/>
+          </p:cNvSpPr>
+          <p:nvPr>
+            <p:ph type="body" idx="1"/>
+          </p:nvPr>
+        </p:nvSpPr>
+        <p:spPr/>
+        <p:txBody>
+          <a:bodyPr/>
+          <a:lstStyle/>
+          <a:p>
+            <a:endParaRPr lang="nl-NL" dirty="0"/>
+          </a:p>
+        </p:txBody>
+      </p:sp>
+      <p:sp>
+        <p:nvSpPr>
+          <p:cNvPr id="4" name="Tijdelijke aanduiding voor dianummer 3"/>
+          <p:cNvSpPr>
+            <a:spLocks noGrp="1"/>
+          </p:cNvSpPr>
+          <p:nvPr>
+            <p:ph type="sldNum" sz="quarter" idx="10"/>
+          </p:nvPr>
+        </p:nvSpPr>
+        <p:spPr/>
+        <p:txBody>
+          <a:bodyPr/>
+          <a:lstStyle/>
+          <a:p>
+            <a:fld id="{763CB1AC-7512-428E-8D64-A7F319414701}" type="slidenum">
+              <a:rPr lang="nl-NL" smtClean="0"/>
+              <a:t>1</a:t>
+            </a:fld>
+            <a:endParaRPr lang="nl-NL"/>
+          </a:p>
+        </p:txBody>
+      </p:sp>
+    </p:spTree>
+    <p:extLst>
+      <p:ext uri="{BB962C8B-B14F-4D97-AF65-F5344CB8AC3E}">
+        <p14:creationId xmlns:p14="http://schemas.microsoft.com/office/powerpoint/2010/main" val="3441769001"/>
+      </p:ext>
+    </p:extLst>
+  </p:cSld>
+  <p:clrMapOvr>
+    <a:masterClrMapping/>
+  </p:clrMapOvr>
+</p:notes>
+</file>
+
+<file path=ppt/notesSlides/notesSlide3.xml><?xml version="1.0" encoding="utf-8"?>
+<p:notes xmlns:a="http://schemas.openxmlformats.org/drawingml/2006/main" xmlns:r="http://schemas.openxmlformats.org/officeDocument/2006/relationships" xmlns:p="http://schemas.openxmlformats.org/presentationml/2006/main">
+  <p:cSld>
+    <p:spTree>
+      <p:nvGrpSpPr>
+        <p:cNvPr id="1" name=""/>
+        <p:cNvGrpSpPr/>
+        <p:nvPr/>
+      </p:nvGrpSpPr>
+      <p:grpSpPr>
+        <a:xfrm>
+          <a:off x="0" y="0"/>
+          <a:ext cx="0" cy="0"/>
+          <a:chOff x="0" y="0"/>
+          <a:chExt cx="0" cy="0"/>
+        </a:xfrm>
+      </p:grpSpPr>
+      <p:sp>
+        <p:nvSpPr>
+          <p:cNvPr id="2" name="Tijdelijke aanduiding voor dia-afbeelding 1"/>
+          <p:cNvSpPr>
+            <a:spLocks noGrp="1" noRot="1" noChangeAspect="1"/>
+          </p:cNvSpPr>
+          <p:nvPr>
+            <p:ph type="sldImg"/>
+          </p:nvPr>
+        </p:nvSpPr>
+        <p:spPr/>
+      </p:sp>
+      <p:sp>
+        <p:nvSpPr>
+          <p:cNvPr id="3" name="Tijdelijke aanduiding voor notities 2"/>
+          <p:cNvSpPr>
+            <a:spLocks noGrp="1"/>
+          </p:cNvSpPr>
+          <p:nvPr>
+            <p:ph type="body" idx="1"/>
+          </p:nvPr>
+        </p:nvSpPr>
+        <p:spPr/>
+        <p:txBody>
+          <a:bodyPr/>
+          <a:lstStyle/>
+          <a:p>
+            <a:endParaRPr lang="en-US" dirty="0" smtClean="0"/>
+          </a:p>
+        </p:txBody>
+      </p:sp>
+      <p:sp>
+        <p:nvSpPr>
+          <p:cNvPr id="4" name="Tijdelijke aanduiding voor dianummer 3"/>
+          <p:cNvSpPr>
+            <a:spLocks noGrp="1"/>
+          </p:cNvSpPr>
+          <p:nvPr>
+            <p:ph type="sldNum" sz="quarter" idx="10"/>
+          </p:nvPr>
+        </p:nvSpPr>
+        <p:spPr/>
+        <p:txBody>
+          <a:bodyPr/>
+          <a:lstStyle/>
+          <a:p>
+            <a:fld id="{763CB1AC-7512-428E-8D64-A7F319414701}" type="slidenum">
+              <a:rPr lang="nl-NL" smtClean="0"/>
+              <a:t>2</a:t>
+            </a:fld>
+            <a:endParaRPr lang="nl-NL"/>
+          </a:p>
+        </p:txBody>
+      </p:sp>
+    </p:spTree>
+    <p:extLst>
+      <p:ext uri="{BB962C8B-B14F-4D97-AF65-F5344CB8AC3E}">
+        <p14:creationId xmlns:p14="http://schemas.microsoft.com/office/powerpoint/2010/main" val="2405718723"/>
+      </p:ext>
+    </p:extLst>
+  </p:cSld>
+  <p:clrMapOvr>
+    <a:masterClrMapping/>
+  </p:clrMapOvr>
+</p:notes>
+</file>
+
+<file path=ppt/notesSlides/notesSlide4.xml><?xml version="1.0" encoding="utf-8"?>
+<p:notes xmlns:a="http://schemas.openxmlformats.org/drawingml/2006/main" xmlns:r="http://schemas.openxmlformats.org/officeDocument/2006/relationships" xmlns:p="http://schemas.openxmlformats.org/presentationml/2006/main">
+  <p:cSld>
+    <p:spTree>
+      <p:nvGrpSpPr>
+        <p:cNvPr id="1" name=""/>
+        <p:cNvGrpSpPr/>
+        <p:nvPr/>
+      </p:nvGrpSpPr>
+      <p:grpSpPr>
+        <a:xfrm>
+          <a:off x="0" y="0"/>
+          <a:ext cx="0" cy="0"/>
+          <a:chOff x="0" y="0"/>
+          <a:chExt cx="0" cy="0"/>
+        </a:xfrm>
+      </p:grpSpPr>
+      <p:sp>
+        <p:nvSpPr>
+          <p:cNvPr id="2" name="Tijdelijke aanduiding voor dia-afbeelding 1"/>
+          <p:cNvSpPr>
+            <a:spLocks noGrp="1" noRot="1" noChangeAspect="1"/>
+          </p:cNvSpPr>
+          <p:nvPr>
+            <p:ph type="sldImg"/>
+          </p:nvPr>
+        </p:nvSpPr>
+        <p:spPr/>
+      </p:sp>
+      <p:sp>
+        <p:nvSpPr>
+          <p:cNvPr id="3" name="Tijdelijke aanduiding voor notities 2"/>
+          <p:cNvSpPr>
+            <a:spLocks noGrp="1"/>
+          </p:cNvSpPr>
+          <p:nvPr>
+            <p:ph type="body" idx="1"/>
+          </p:nvPr>
+        </p:nvSpPr>
+        <p:spPr/>
+        <p:txBody>
+          <a:bodyPr/>
+          <a:lstStyle/>
+          <a:p>
+            <a:endParaRPr lang="nl-NL" dirty="0"/>
+          </a:p>
+        </p:txBody>
+      </p:sp>
+      <p:sp>
+        <p:nvSpPr>
+          <p:cNvPr id="4" name="Tijdelijke aanduiding voor dianummer 3"/>
+          <p:cNvSpPr>
+            <a:spLocks noGrp="1"/>
+          </p:cNvSpPr>
+          <p:nvPr>
+            <p:ph type="sldNum" sz="quarter" idx="10"/>
+          </p:nvPr>
+        </p:nvSpPr>
+        <p:spPr/>
+        <p:txBody>
+          <a:bodyPr/>
+          <a:lstStyle/>
+          <a:p>
+            <a:fld id="{763CB1AC-7512-428E-8D64-A7F319414701}" type="slidenum">
+              <a:rPr lang="nl-NL" smtClean="0"/>
+              <a:t>5</a:t>
+            </a:fld>
+            <a:endParaRPr lang="nl-NL"/>
+          </a:p>
+        </p:txBody>
+      </p:sp>
+    </p:spTree>
+    <p:extLst>
+      <p:ext uri="{BB962C8B-B14F-4D97-AF65-F5344CB8AC3E}">
+        <p14:creationId xmlns:p14="http://schemas.microsoft.com/office/powerpoint/2010/main" val="855678041"/>
+      </p:ext>
+    </p:extLst>
+  </p:cSld>
+  <p:clrMapOvr>
+    <a:masterClrMapping/>
+  </p:clrMapOvr>
+</p:notes>
+</file>
+
+<file path=ppt/notesSlides/notesSlide5.xml><?xml version="1.0" encoding="utf-8"?>
+<p:notes xmlns:a="http://schemas.openxmlformats.org/drawingml/2006/main" xmlns:r="http://schemas.openxmlformats.org/officeDocument/2006/relationships" xmlns:p="http://schemas.openxmlformats.org/presentationml/2006/main">
+  <p:cSld>
+    <p:spTree>
+      <p:nvGrpSpPr>
+        <p:cNvPr id="1" name=""/>
+        <p:cNvGrpSpPr/>
+        <p:nvPr/>
+      </p:nvGrpSpPr>
+      <p:grpSpPr>
+        <a:xfrm>
+          <a:off x="0" y="0"/>
+          <a:ext cx="0" cy="0"/>
+          <a:chOff x="0" y="0"/>
+          <a:chExt cx="0" cy="0"/>
+        </a:xfrm>
+      </p:grpSpPr>
+      <p:sp>
+        <p:nvSpPr>
+          <p:cNvPr id="2" name="Tijdelijke aanduiding voor dia-afbeelding 1"/>
+          <p:cNvSpPr>
+            <a:spLocks noGrp="1" noRot="1" noChangeAspect="1"/>
+          </p:cNvSpPr>
+          <p:nvPr>
+            <p:ph type="sldImg"/>
+          </p:nvPr>
+        </p:nvSpPr>
+        <p:spPr/>
+      </p:sp>
+      <p:sp>
+        <p:nvSpPr>
+          <p:cNvPr id="3" name="Tijdelijke aanduiding voor notities 2"/>
+          <p:cNvSpPr>
+            <a:spLocks noGrp="1"/>
+          </p:cNvSpPr>
+          <p:nvPr>
+            <p:ph type="body" idx="1"/>
+          </p:nvPr>
+        </p:nvSpPr>
+        <p:spPr/>
+        <p:txBody>
+          <a:bodyPr/>
+          <a:lstStyle/>
+          <a:p>
+            <a:endParaRPr lang="nl-NL" dirty="0"/>
+          </a:p>
+        </p:txBody>
+      </p:sp>
+      <p:sp>
+        <p:nvSpPr>
+          <p:cNvPr id="4" name="Tijdelijke aanduiding voor dianummer 3"/>
+          <p:cNvSpPr>
+            <a:spLocks noGrp="1"/>
+          </p:cNvSpPr>
+          <p:nvPr>
+            <p:ph type="sldNum" sz="quarter" idx="10"/>
+          </p:nvPr>
+        </p:nvSpPr>
+        <p:spPr/>
+        <p:txBody>
+          <a:bodyPr/>
+          <a:lstStyle/>
+          <a:p>
+            <a:fld id="{763CB1AC-7512-428E-8D64-A7F319414701}" type="slidenum">
+              <a:rPr lang="nl-NL" smtClean="0"/>
+              <a:t>9</a:t>
+            </a:fld>
+            <a:endParaRPr lang="nl-NL"/>
+          </a:p>
+        </p:txBody>
+      </p:sp>
+    </p:spTree>
+    <p:extLst>
+      <p:ext uri="{BB962C8B-B14F-4D97-AF65-F5344CB8AC3E}">
+        <p14:creationId xmlns:p14="http://schemas.microsoft.com/office/powerpoint/2010/main" val="2744096702"/>
+      </p:ext>
+    </p:extLst>
+  </p:cSld>
+  <p:clrMapOvr>
+    <a:masterClrMapping/>
+  </p:clrMapOvr>
+</p:notes>
+</file>
+
+<file path=ppt/notesSlides/notesSlide6.xml><?xml version="1.0" encoding="utf-8"?>
+<p:notes xmlns:a="http://schemas.openxmlformats.org/drawingml/2006/main" xmlns:r="http://schemas.openxmlformats.org/officeDocument/2006/relationships" xmlns:p="http://schemas.openxmlformats.org/presentationml/2006/main">
+  <p:cSld>
+    <p:spTree>
+      <p:nvGrpSpPr>
+        <p:cNvPr id="1" name=""/>
+        <p:cNvGrpSpPr/>
+        <p:nvPr/>
+      </p:nvGrpSpPr>
+      <p:grpSpPr>
+        <a:xfrm>
+          <a:off x="0" y="0"/>
+          <a:ext cx="0" cy="0"/>
+          <a:chOff x="0" y="0"/>
+          <a:chExt cx="0" cy="0"/>
+        </a:xfrm>
+      </p:grpSpPr>
+      <p:sp>
+        <p:nvSpPr>
+          <p:cNvPr id="2" name="Tijdelijke aanduiding voor dia-afbeelding 1"/>
+          <p:cNvSpPr>
+            <a:spLocks noGrp="1" noRot="1" noChangeAspect="1"/>
+          </p:cNvSpPr>
+          <p:nvPr>
+            <p:ph type="sldImg"/>
+          </p:nvPr>
+        </p:nvSpPr>
+        <p:spPr/>
+      </p:sp>
+      <p:sp>
+        <p:nvSpPr>
+          <p:cNvPr id="3" name="Tijdelijke aanduiding voor notities 2"/>
+          <p:cNvSpPr>
+            <a:spLocks noGrp="1"/>
+          </p:cNvSpPr>
+          <p:nvPr>
+            <p:ph type="body" idx="1"/>
+          </p:nvPr>
+        </p:nvSpPr>
+        <p:spPr/>
+        <p:txBody>
+          <a:bodyPr/>
+          <a:lstStyle/>
+          <a:p>
+            <a:endParaRPr lang="nl-NL"/>
+          </a:p>
+        </p:txBody>
+      </p:sp>
+      <p:sp>
+        <p:nvSpPr>
+          <p:cNvPr id="4" name="Tijdelijke aanduiding voor dianummer 3"/>
+          <p:cNvSpPr>
+            <a:spLocks noGrp="1"/>
+          </p:cNvSpPr>
+          <p:nvPr>
+            <p:ph type="sldNum" sz="quarter" idx="10"/>
+          </p:nvPr>
+        </p:nvSpPr>
+        <p:spPr/>
+        <p:txBody>
+          <a:bodyPr/>
+          <a:lstStyle/>
+          <a:p>
+            <a:fld id="{763CB1AC-7512-428E-8D64-A7F319414701}" type="slidenum">
+              <a:rPr lang="nl-NL" smtClean="0"/>
+              <a:t>18</a:t>
+            </a:fld>
+            <a:endParaRPr lang="nl-NL"/>
+          </a:p>
+        </p:txBody>
+      </p:sp>
+    </p:spTree>
+    <p:extLst>
+      <p:ext uri="{BB962C8B-B14F-4D97-AF65-F5344CB8AC3E}">
+        <p14:creationId xmlns:p14="http://schemas.microsoft.com/office/powerpoint/2010/main" val="1736169086"/>
       </p:ext>
     </p:extLst>
   </p:cSld>
@@ -2193,7 +2658,7 @@
         </p:nvSpPr>
         <p:spPr>
           <a:xfrm>
-            <a:off x="685800" y="2130425"/>
+            <a:off x="685800" y="2130426"/>
             <a:ext cx="7772400" cy="1470025"/>
           </a:xfrm>
         </p:spPr>
@@ -2545,7 +3010,7 @@
         </p:nvSpPr>
         <p:spPr>
           <a:xfrm>
-            <a:off x="457200" y="273050"/>
+            <a:off x="457201" y="273050"/>
             <a:ext cx="3008313" cy="1162050"/>
           </a:xfrm>
         </p:spPr>
@@ -2577,8 +3042,8 @@
         </p:nvSpPr>
         <p:spPr>
           <a:xfrm>
-            <a:off x="3575050" y="273050"/>
-            <a:ext cx="5111750" cy="5853113"/>
+            <a:off x="3575050" y="273051"/>
+            <a:ext cx="5111751" cy="5853113"/>
           </a:xfrm>
         </p:spPr>
         <p:txBody>
@@ -2662,7 +3127,7 @@
         </p:nvSpPr>
         <p:spPr>
           <a:xfrm>
-            <a:off x="457200" y="1435100"/>
+            <a:off x="457201" y="1435101"/>
             <a:ext cx="3008313" cy="4691063"/>
           </a:xfrm>
         </p:spPr>
@@ -2826,7 +3291,7 @@
         </p:nvSpPr>
         <p:spPr>
           <a:xfrm>
-            <a:off x="1792288" y="4800600"/>
+            <a:off x="1792288" y="4800601"/>
             <a:ext cx="5486400" cy="566738"/>
           </a:xfrm>
         </p:spPr>
@@ -2919,7 +3384,7 @@
         </p:nvSpPr>
         <p:spPr>
           <a:xfrm>
-            <a:off x="1792288" y="5367338"/>
+            <a:off x="1792288" y="5367339"/>
             <a:ext cx="5486400" cy="804862"/>
           </a:xfrm>
         </p:spPr>
@@ -3257,7 +3722,7 @@
         </p:nvSpPr>
         <p:spPr>
           <a:xfrm>
-            <a:off x="6629400" y="274638"/>
+            <a:off x="6629400" y="274639"/>
             <a:ext cx="2057400" cy="5851525"/>
           </a:xfrm>
         </p:spPr>
@@ -3285,7 +3750,7 @@
         </p:nvSpPr>
         <p:spPr>
           <a:xfrm>
-            <a:off x="457200" y="274638"/>
+            <a:off x="457200" y="274639"/>
             <a:ext cx="6019800" cy="5851525"/>
           </a:xfrm>
         </p:spPr>
@@ -3661,7 +4126,7 @@
         </p:nvSpPr>
         <p:spPr>
           <a:xfrm>
-            <a:off x="722313" y="2906713"/>
+            <a:off x="722313" y="2906714"/>
             <a:ext cx="7772400" cy="1500187"/>
           </a:xfrm>
         </p:spPr>
@@ -3909,7 +4374,7 @@
         </p:nvSpPr>
         <p:spPr>
           <a:xfrm>
-            <a:off x="457200" y="1600200"/>
+            <a:off x="457200" y="1600201"/>
             <a:ext cx="4038600" cy="4525963"/>
           </a:xfrm>
         </p:spPr>
@@ -3994,7 +4459,7 @@
         </p:nvSpPr>
         <p:spPr>
           <a:xfrm>
-            <a:off x="4648200" y="1600200"/>
+            <a:off x="4648200" y="1600201"/>
             <a:ext cx="4038600" cy="4525963"/>
           </a:xfrm>
         </p:spPr>
@@ -4208,8 +4673,8 @@
         </p:nvSpPr>
         <p:spPr>
           <a:xfrm>
-            <a:off x="457200" y="1600201"/>
-            <a:ext cx="8233794" cy="2188840"/>
+            <a:off x="457200" y="1600202"/>
+            <a:ext cx="8233795" cy="2188840"/>
           </a:xfrm>
         </p:spPr>
         <p:txBody>
@@ -4293,7 +4758,7 @@
         </p:nvSpPr>
         <p:spPr>
           <a:xfrm>
-            <a:off x="467544" y="3933056"/>
+            <a:off x="467544" y="3933057"/>
             <a:ext cx="8219256" cy="2193107"/>
           </a:xfrm>
         </p:spPr>
@@ -4507,7 +4972,7 @@
         </p:nvSpPr>
         <p:spPr>
           <a:xfrm>
-            <a:off x="457200" y="1600201"/>
+            <a:off x="457200" y="1600202"/>
             <a:ext cx="4038600" cy="2188839"/>
           </a:xfrm>
         </p:spPr>
@@ -4746,7 +5211,7 @@
         </p:nvSpPr>
         <p:spPr>
           <a:xfrm>
-            <a:off x="457200" y="3933056"/>
+            <a:off x="457200" y="3933057"/>
             <a:ext cx="4038600" cy="2194907"/>
           </a:xfrm>
         </p:spPr>
@@ -4891,7 +5356,7 @@
         </p:nvSpPr>
         <p:spPr>
           <a:xfrm>
-            <a:off x="457200" y="1600201"/>
+            <a:off x="457200" y="1600202"/>
             <a:ext cx="4038600" cy="2188839"/>
           </a:xfrm>
         </p:spPr>
@@ -4976,7 +5441,7 @@
         </p:nvSpPr>
         <p:spPr>
           <a:xfrm>
-            <a:off x="4648200" y="1600201"/>
+            <a:off x="4648200" y="1600202"/>
             <a:ext cx="4038600" cy="2188839"/>
           </a:xfrm>
         </p:spPr>
@@ -5130,7 +5595,7 @@
         </p:nvSpPr>
         <p:spPr>
           <a:xfrm>
-            <a:off x="457200" y="3933056"/>
+            <a:off x="457200" y="3933057"/>
             <a:ext cx="4038600" cy="2194907"/>
           </a:xfrm>
         </p:spPr>
@@ -5215,7 +5680,7 @@
         </p:nvSpPr>
         <p:spPr>
           <a:xfrm>
-            <a:off x="4647600" y="3933056"/>
+            <a:off x="4647600" y="3933057"/>
             <a:ext cx="4038600" cy="2194907"/>
           </a:xfrm>
         </p:spPr>
@@ -5364,7 +5829,7 @@
         </p:nvSpPr>
         <p:spPr>
           <a:xfrm>
-            <a:off x="457200" y="1535113"/>
+            <a:off x="457201" y="1535113"/>
             <a:ext cx="4040188" cy="639762"/>
           </a:xfrm>
         </p:spPr>
@@ -5429,7 +5894,7 @@
         </p:nvSpPr>
         <p:spPr>
           <a:xfrm>
-            <a:off x="457200" y="2174875"/>
+            <a:off x="457201" y="2174875"/>
             <a:ext cx="4040188" cy="3951288"/>
           </a:xfrm>
         </p:spPr>
@@ -5514,7 +5979,7 @@
         </p:nvSpPr>
         <p:spPr>
           <a:xfrm>
-            <a:off x="4645025" y="1535113"/>
+            <a:off x="4645026" y="1535113"/>
             <a:ext cx="4041775" cy="639762"/>
           </a:xfrm>
         </p:spPr>
@@ -5579,7 +6044,7 @@
         </p:nvSpPr>
         <p:spPr>
           <a:xfrm>
-            <a:off x="4645025" y="2174875"/>
+            <a:off x="4645026" y="2174875"/>
             <a:ext cx="4041775" cy="3951288"/>
           </a:xfrm>
         </p:spPr>
@@ -5930,7 +6395,7 @@
         </p:nvSpPr>
         <p:spPr>
           <a:xfrm>
-            <a:off x="457200" y="1600200"/>
+            <a:off x="457200" y="1600201"/>
             <a:ext cx="8229600" cy="4525963"/>
           </a:xfrm>
           <a:prstGeom prst="rect">
@@ -5992,7 +6457,7 @@
         </p:nvSpPr>
         <p:spPr>
           <a:xfrm>
-            <a:off x="457200" y="6356350"/>
+            <a:off x="457200" y="6356351"/>
             <a:ext cx="2133600" cy="365125"/>
           </a:xfrm>
           <a:prstGeom prst="rect">
@@ -6033,7 +6498,7 @@
         </p:nvSpPr>
         <p:spPr>
           <a:xfrm>
-            <a:off x="3124200" y="6356350"/>
+            <a:off x="3124200" y="6356351"/>
             <a:ext cx="2895600" cy="365125"/>
           </a:xfrm>
           <a:prstGeom prst="rect">
@@ -6074,7 +6539,7 @@
         </p:nvSpPr>
         <p:spPr>
           <a:xfrm>
-            <a:off x="6553200" y="6356350"/>
+            <a:off x="6553200" y="6356351"/>
             <a:ext cx="2133600" cy="365125"/>
           </a:xfrm>
           <a:prstGeom prst="rect">
@@ -6417,7 +6882,7 @@
         </p:nvSpPr>
         <p:spPr>
           <a:xfrm>
-            <a:off x="179512" y="1772816"/>
+            <a:off x="179512" y="1772817"/>
             <a:ext cx="8784976" cy="1470025"/>
           </a:xfrm>
         </p:spPr>
@@ -7010,11 +7475,7 @@
             </a:r>
             <a:r>
               <a:rPr lang="nl-NL" dirty="0" smtClean="0"/>
-              <a:t> </a:t>
-            </a:r>
-            <a:r>
-              <a:rPr lang="nl-NL" dirty="0" smtClean="0"/>
-              <a:t>source</a:t>
+              <a:t> source</a:t>
             </a:r>
             <a:endParaRPr lang="nl-NL" dirty="0"/>
           </a:p>
@@ -7082,10 +7543,6 @@
               <a:rPr lang="nl-NL" dirty="0" smtClean="0"/>
               <a:t> of time</a:t>
             </a:r>
-            <a:r>
-              <a:rPr lang="nl-NL" dirty="0" smtClean="0"/>
-              <a:t/>
-            </a:r>
             <a:br>
               <a:rPr lang="nl-NL" dirty="0" smtClean="0"/>
             </a:br>
@@ -7117,13 +7574,8 @@
             <a:pPr lvl="1"/>
             <a:r>
               <a:rPr lang="nl-NL" dirty="0" smtClean="0"/>
-              <a:t>Network </a:t>
-            </a:r>
-            <a:r>
-              <a:rPr lang="nl-NL" dirty="0" smtClean="0"/>
-              <a:t>response</a:t>
-            </a:r>
-            <a:endParaRPr lang="nl-NL" dirty="0" smtClean="0"/>
+              <a:t>Network response</a:t>
+            </a:r>
           </a:p>
         </p:txBody>
       </p:sp>
@@ -8064,7 +8516,7 @@
         </p:nvSpPr>
         <p:spPr>
           <a:xfrm>
-            <a:off x="6340885" y="2483354"/>
+            <a:off x="6340885" y="2483355"/>
             <a:ext cx="1440160" cy="369332"/>
           </a:xfrm>
           <a:prstGeom prst="rect">
@@ -8108,7 +8560,7 @@
         </p:nvSpPr>
         <p:spPr>
           <a:xfrm>
-            <a:off x="4648697" y="2483354"/>
+            <a:off x="4648697" y="2483355"/>
             <a:ext cx="1440160" cy="369332"/>
           </a:xfrm>
           <a:prstGeom prst="rect">
@@ -8152,7 +8604,7 @@
         </p:nvSpPr>
         <p:spPr>
           <a:xfrm>
-            <a:off x="2940168" y="2483354"/>
+            <a:off x="2940168" y="2483355"/>
             <a:ext cx="1440160" cy="369332"/>
           </a:xfrm>
           <a:prstGeom prst="rect">
@@ -8196,7 +8648,7 @@
         </p:nvSpPr>
         <p:spPr>
           <a:xfrm>
-            <a:off x="1247980" y="2483604"/>
+            <a:off x="1247980" y="2483605"/>
             <a:ext cx="1440160" cy="369332"/>
           </a:xfrm>
           <a:prstGeom prst="rect">
@@ -8240,7 +8692,7 @@
         </p:nvSpPr>
         <p:spPr>
           <a:xfrm>
-            <a:off x="1547664" y="1755533"/>
+            <a:off x="1547664" y="1755534"/>
             <a:ext cx="648072" cy="307777"/>
           </a:xfrm>
           <a:prstGeom prst="rect">
@@ -8277,7 +8729,7 @@
         </p:nvSpPr>
         <p:spPr>
           <a:xfrm>
-            <a:off x="3275856" y="1755533"/>
+            <a:off x="3275856" y="1755534"/>
             <a:ext cx="648072" cy="307777"/>
           </a:xfrm>
           <a:prstGeom prst="rect">
@@ -8314,7 +8766,7 @@
         </p:nvSpPr>
         <p:spPr>
           <a:xfrm>
-            <a:off x="5004048" y="1755533"/>
+            <a:off x="5004048" y="1755534"/>
             <a:ext cx="648072" cy="307777"/>
           </a:xfrm>
           <a:prstGeom prst="rect">
@@ -8351,7 +8803,7 @@
         </p:nvSpPr>
         <p:spPr>
           <a:xfrm>
-            <a:off x="6732240" y="1755777"/>
+            <a:off x="6732240" y="1755778"/>
             <a:ext cx="648072" cy="307777"/>
           </a:xfrm>
           <a:prstGeom prst="rect">
@@ -8388,7 +8840,7 @@
         </p:nvSpPr>
         <p:spPr>
           <a:xfrm>
-            <a:off x="539552" y="3861048"/>
+            <a:off x="539553" y="3861049"/>
             <a:ext cx="1260140" cy="369332"/>
           </a:xfrm>
           <a:prstGeom prst="rect">
@@ -8428,7 +8880,7 @@
         </p:nvSpPr>
         <p:spPr>
           <a:xfrm>
-            <a:off x="2015716" y="3861048"/>
+            <a:off x="2015717" y="3861049"/>
             <a:ext cx="1260140" cy="369332"/>
           </a:xfrm>
           <a:prstGeom prst="rect">
@@ -8468,7 +8920,7 @@
         </p:nvSpPr>
         <p:spPr>
           <a:xfrm>
-            <a:off x="1476640" y="4643844"/>
+            <a:off x="1476641" y="4643845"/>
             <a:ext cx="827108" cy="369332"/>
           </a:xfrm>
           <a:prstGeom prst="rect">
@@ -8511,7 +8963,7 @@
         </p:nvCxnSpPr>
         <p:spPr>
           <a:xfrm>
-            <a:off x="1169622" y="4230380"/>
+            <a:off x="1169623" y="4230381"/>
             <a:ext cx="720572" cy="413464"/>
           </a:xfrm>
           <a:prstGeom prst="straightConnector1">
@@ -8547,7 +8999,7 @@
         </p:nvCxnSpPr>
         <p:spPr>
           <a:xfrm flipH="1">
-            <a:off x="1890194" y="4230380"/>
+            <a:off x="1890195" y="4230381"/>
             <a:ext cx="755592" cy="413464"/>
           </a:xfrm>
           <a:prstGeom prst="straightConnector1">
@@ -8623,8 +9075,8 @@
         </p:nvCxnSpPr>
         <p:spPr>
           <a:xfrm>
-            <a:off x="1890194" y="5013176"/>
-            <a:ext cx="4197" cy="504056"/>
+            <a:off x="1890195" y="5013177"/>
+            <a:ext cx="4196" cy="504055"/>
           </a:xfrm>
           <a:prstGeom prst="straightConnector1">
             <a:avLst/>
@@ -8659,12 +9111,12 @@
         </p:nvCxnSpPr>
         <p:spPr>
           <a:xfrm flipH="1" flipV="1">
-            <a:off x="2303748" y="4828510"/>
-            <a:ext cx="166707" cy="873388"/>
+            <a:off x="2303749" y="4828511"/>
+            <a:ext cx="166706" cy="873387"/>
           </a:xfrm>
           <a:prstGeom prst="curvedConnector3">
             <a:avLst>
-              <a:gd name="adj1" fmla="val -248958"/>
+              <a:gd name="adj1" fmla="val -137128"/>
             </a:avLst>
           </a:prstGeom>
           <a:ln w="12700">
@@ -8694,7 +9146,7 @@
         </p:nvSpPr>
         <p:spPr>
           <a:xfrm>
-            <a:off x="2875123" y="5080538"/>
+            <a:off x="2875123" y="5080539"/>
             <a:ext cx="1440160" cy="369332"/>
           </a:xfrm>
           <a:prstGeom prst="rect">
@@ -8722,6 +9174,119 @@
                 <a:cs typeface="Consolas" panose="020B0609020204030204" pitchFamily="49" charset="0"/>
               </a:rPr>
               <a:t>(5)</a:t>
+            </a:r>
+            <a:endParaRPr lang="nl-NL" dirty="0">
+              <a:latin typeface="Consolas" panose="020B0609020204030204" pitchFamily="49" charset="0"/>
+              <a:cs typeface="Consolas" panose="020B0609020204030204" pitchFamily="49" charset="0"/>
+            </a:endParaRPr>
+          </a:p>
+        </p:txBody>
+      </p:sp>
+      <p:sp>
+        <p:nvSpPr>
+          <p:cNvPr id="3" name="Tekstvak 2"/>
+          <p:cNvSpPr txBox="1"/>
+          <p:nvPr/>
+        </p:nvSpPr>
+        <p:spPr>
+          <a:xfrm>
+            <a:off x="4633816" y="4045714"/>
+            <a:ext cx="3846078" cy="646331"/>
+          </a:xfrm>
+          <a:prstGeom prst="rect">
+            <a:avLst/>
+          </a:prstGeom>
+        </p:spPr>
+        <p:style>
+          <a:lnRef idx="2">
+            <a:schemeClr val="dk1"/>
+          </a:lnRef>
+          <a:fillRef idx="1">
+            <a:schemeClr val="lt1"/>
+          </a:fillRef>
+          <a:effectRef idx="0">
+            <a:schemeClr val="dk1"/>
+          </a:effectRef>
+          <a:fontRef idx="minor">
+            <a:schemeClr val="dk1"/>
+          </a:fontRef>
+        </p:style>
+        <p:txBody>
+          <a:bodyPr wrap="square" rtlCol="0">
+            <a:spAutoFit/>
+          </a:bodyPr>
+          <a:lstStyle/>
+          <a:p>
+            <a:r>
+              <a:rPr lang="nl-NL" dirty="0">
+                <a:solidFill>
+                  <a:srgbClr val="5E5EFF"/>
+                </a:solidFill>
+                <a:latin typeface="Consolas" panose="020B0609020204030204" pitchFamily="49" charset="0"/>
+                <a:cs typeface="Consolas" panose="020B0609020204030204" pitchFamily="49" charset="0"/>
+              </a:rPr>
+              <a:t>producer1</a:t>
+            </a:r>
+            <a:r>
+              <a:rPr lang="nl-NL" dirty="0">
+                <a:latin typeface="Consolas" panose="020B0609020204030204" pitchFamily="49" charset="0"/>
+                <a:cs typeface="Consolas" panose="020B0609020204030204" pitchFamily="49" charset="0"/>
+              </a:rPr>
+              <a:t>.merge(</a:t>
+            </a:r>
+            <a:r>
+              <a:rPr lang="nl-NL" dirty="0">
+                <a:solidFill>
+                  <a:srgbClr val="5E5EFF"/>
+                </a:solidFill>
+                <a:latin typeface="Consolas" panose="020B0609020204030204" pitchFamily="49" charset="0"/>
+                <a:cs typeface="Consolas" panose="020B0609020204030204" pitchFamily="49" charset="0"/>
+              </a:rPr>
+              <a:t>producer2</a:t>
+            </a:r>
+            <a:r>
+              <a:rPr lang="nl-NL" dirty="0" smtClean="0">
+                <a:latin typeface="Consolas" panose="020B0609020204030204" pitchFamily="49" charset="0"/>
+                <a:cs typeface="Consolas" panose="020B0609020204030204" pitchFamily="49" charset="0"/>
+              </a:rPr>
+              <a:t>)</a:t>
+            </a:r>
+          </a:p>
+          <a:p>
+            <a:r>
+              <a:rPr lang="nl-NL" dirty="0" smtClean="0">
+                <a:latin typeface="Consolas" panose="020B0609020204030204" pitchFamily="49" charset="0"/>
+                <a:cs typeface="Consolas" panose="020B0609020204030204" pitchFamily="49" charset="0"/>
+              </a:rPr>
+              <a:t>  .</a:t>
+            </a:r>
+            <a:r>
+              <a:rPr lang="nl-NL" dirty="0" err="1" smtClean="0">
+                <a:latin typeface="Consolas" panose="020B0609020204030204" pitchFamily="49" charset="0"/>
+                <a:cs typeface="Consolas" panose="020B0609020204030204" pitchFamily="49" charset="0"/>
+              </a:rPr>
+              <a:t>subscribe</a:t>
+            </a:r>
+            <a:r>
+              <a:rPr lang="nl-NL" dirty="0" smtClean="0">
+                <a:latin typeface="Consolas" panose="020B0609020204030204" pitchFamily="49" charset="0"/>
+                <a:cs typeface="Consolas" panose="020B0609020204030204" pitchFamily="49" charset="0"/>
+              </a:rPr>
+              <a:t>(</a:t>
+            </a:r>
+            <a:r>
+              <a:rPr lang="nl-NL" i="1" dirty="0" err="1" smtClean="0">
+                <a:latin typeface="Consolas" panose="020B0609020204030204" pitchFamily="49" charset="0"/>
+                <a:cs typeface="Consolas" panose="020B0609020204030204" pitchFamily="49" charset="0"/>
+              </a:rPr>
+              <a:t>println</a:t>
+            </a:r>
+            <a:r>
+              <a:rPr lang="nl-NL" dirty="0" smtClean="0">
+                <a:latin typeface="Consolas" panose="020B0609020204030204" pitchFamily="49" charset="0"/>
+                <a:cs typeface="Consolas" panose="020B0609020204030204" pitchFamily="49" charset="0"/>
+              </a:rPr>
+              <a:t>(_))</a:t>
             </a:r>
             <a:endParaRPr lang="nl-NL" dirty="0">
               <a:latin typeface="Consolas" panose="020B0609020204030204" pitchFamily="49" charset="0"/>
@@ -9723,6 +10288,33 @@
                                   </p:childTnLst>
                                 </p:cTn>
                               </p:par>
+                              <p:par>
+                                <p:cTn id="82" presetID="1" presetClass="entr" presetSubtype="0" fill="hold" grpId="0" nodeType="withEffect">
+                                  <p:stCondLst>
+                                    <p:cond delay="0"/>
+                                  </p:stCondLst>
+                                  <p:childTnLst>
+                                    <p:set>
+                                      <p:cBhvr>
+                                        <p:cTn id="83" dur="1" fill="hold">
+                                          <p:stCondLst>
+                                            <p:cond delay="0"/>
+                                          </p:stCondLst>
+                                        </p:cTn>
+                                        <p:tgtEl>
+                                          <p:spTgt spid="3"/>
+                                        </p:tgtEl>
+                                        <p:attrNameLst>
+                                          <p:attrName>style.visibility</p:attrName>
+                                        </p:attrNameLst>
+                                      </p:cBhvr>
+                                      <p:to>
+                                        <p:strVal val="visible"/>
+                                      </p:to>
+                                    </p:set>
+                                  </p:childTnLst>
+                                </p:cTn>
+                              </p:par>
                             </p:childTnLst>
                           </p:cTn>
                         </p:par>
@@ -9769,6 +10361,7 @@
       <p:bldP spid="58" grpId="0" animBg="1"/>
       <p:bldP spid="69" grpId="0" animBg="1"/>
       <p:bldP spid="78" grpId="0"/>
+      <p:bldP spid="3" grpId="0" animBg="1"/>
     </p:bldLst>
   </p:timing>
 </p:sld>
@@ -9978,7 +10571,7 @@
         </p:nvSpPr>
         <p:spPr>
           <a:xfrm>
-            <a:off x="4648200" y="1600200"/>
+            <a:off x="4648200" y="1600201"/>
             <a:ext cx="4244400" cy="4525963"/>
           </a:xfrm>
         </p:spPr>
@@ -10247,7 +10840,7 @@
         </p:nvSpPr>
         <p:spPr>
           <a:xfrm>
-            <a:off x="457200" y="2174875"/>
+            <a:off x="457201" y="2174875"/>
             <a:ext cx="4040188" cy="4566494"/>
           </a:xfrm>
         </p:spPr>
@@ -10543,7 +11136,6 @@
               <a:rPr lang="nl-NL" dirty="0" smtClean="0"/>
               <a:t> operators</a:t>
             </a:r>
-            <a:endParaRPr lang="nl-NL" dirty="0" smtClean="0"/>
           </a:p>
         </p:txBody>
       </p:sp>
@@ -10800,25 +11392,6 @@
       </p:sp>
       <p:sp>
         <p:nvSpPr>
-          <p:cNvPr id="8" name="Tijdelijke aanduiding voor inhoud 7"/>
-          <p:cNvSpPr>
-            <a:spLocks noGrp="1"/>
-          </p:cNvSpPr>
-          <p:nvPr>
-            <p:ph idx="1"/>
-          </p:nvPr>
-        </p:nvSpPr>
-        <p:spPr/>
-        <p:txBody>
-          <a:bodyPr/>
-          <a:lstStyle/>
-          <a:p>
-            <a:endParaRPr lang="nl-NL"/>
-          </a:p>
-        </p:txBody>
-      </p:sp>
-      <p:sp>
-        <p:nvSpPr>
           <p:cNvPr id="5" name="Tijdelijke aanduiding voor datum 4"/>
           <p:cNvSpPr>
             <a:spLocks noGrp="1"/>
@@ -10833,10 +11406,10 @@
           <a:lstStyle/>
           <a:p>
             <a:r>
-              <a:rPr lang="nl-NL" smtClean="0"/>
+              <a:rPr lang="nl-NL" dirty="0" smtClean="0"/>
               <a:t>2016-12-16</a:t>
             </a:r>
-            <a:endParaRPr lang="nl-NL"/>
+            <a:endParaRPr lang="nl-NL" dirty="0"/>
           </a:p>
         </p:txBody>
       </p:sp>
@@ -10856,10 +11429,14 @@
           <a:lstStyle/>
           <a:p>
             <a:r>
-              <a:rPr lang="nl-NL" smtClean="0"/>
-              <a:t>Master Thesis Defense</a:t>
-            </a:r>
-            <a:endParaRPr lang="nl-NL"/>
+              <a:rPr lang="nl-NL" dirty="0" smtClean="0"/>
+              <a:t>Master Thesis </a:t>
+            </a:r>
+            <a:r>
+              <a:rPr lang="nl-NL" dirty="0" err="1" smtClean="0"/>
+              <a:t>Defense</a:t>
+            </a:r>
+            <a:endParaRPr lang="nl-NL" dirty="0"/>
           </a:p>
         </p:txBody>
       </p:sp>
@@ -10883,6 +11460,357 @@
               <a:t>14</a:t>
             </a:fld>
             <a:endParaRPr lang="nl-NL" dirty="0"/>
+          </a:p>
+        </p:txBody>
+      </p:sp>
+      <mc:AlternateContent xmlns:mc="http://schemas.openxmlformats.org/markup-compatibility/2006">
+        <mc:Choice xmlns:a14="http://schemas.microsoft.com/office/drawing/2010/main" Requires="a14">
+          <p:sp>
+            <p:nvSpPr>
+              <p:cNvPr id="13" name="Tekstvak 12"/>
+              <p:cNvSpPr txBox="1"/>
+              <p:nvPr/>
+            </p:nvSpPr>
+            <p:spPr>
+              <a:xfrm>
+                <a:off x="971600" y="2204864"/>
+                <a:ext cx="5344989" cy="1060483"/>
+              </a:xfrm>
+              <a:prstGeom prst="rect">
+                <a:avLst/>
+              </a:prstGeom>
+              <a:noFill/>
+            </p:spPr>
+            <p:txBody>
+              <a:bodyPr wrap="none" rtlCol="0">
+                <a:spAutoFit/>
+              </a:bodyPr>
+              <a:lstStyle/>
+              <a:p>
+                <a14:m>
+                  <m:oMathPara xmlns:m="http://schemas.openxmlformats.org/officeDocument/2006/math">
+                    <m:oMathParaPr>
+                      <m:jc m:val="centerGroup"/>
+                    </m:oMathParaPr>
+                    <m:oMath xmlns:m="http://schemas.openxmlformats.org/officeDocument/2006/math">
+                      <m:r>
+                        <a:rPr lang="nl-NL" sz="2800" b="0" i="1" smtClean="0">
+                          <a:latin typeface="Cambria Math"/>
+                        </a:rPr>
+                        <m:t>𝑌</m:t>
+                      </m:r>
+                      <m:d>
+                        <m:dPr>
+                          <m:ctrlPr>
+                            <a:rPr lang="nl-NL" sz="2800" b="0" i="1" smtClean="0">
+                              <a:latin typeface="Cambria Math"/>
+                            </a:rPr>
+                          </m:ctrlPr>
+                        </m:dPr>
+                        <m:e>
+                          <m:r>
+                            <a:rPr lang="nl-NL" sz="2800" b="0" i="1" smtClean="0">
+                              <a:latin typeface="Cambria Math"/>
+                            </a:rPr>
+                            <m:t>𝑠</m:t>
+                          </m:r>
+                        </m:e>
+                      </m:d>
+                      <m:r>
+                        <a:rPr lang="nl-NL" sz="2800" b="0" i="1" smtClean="0">
+                          <a:latin typeface="Cambria Math"/>
+                        </a:rPr>
+                        <m:t>=</m:t>
+                      </m:r>
+                      <m:d>
+                        <m:dPr>
+                          <m:ctrlPr>
+                            <a:rPr lang="nl-NL" sz="2800" b="0" i="1" smtClean="0">
+                              <a:latin typeface="Cambria Math"/>
+                            </a:rPr>
+                          </m:ctrlPr>
+                        </m:dPr>
+                        <m:e>
+                          <m:f>
+                            <m:fPr>
+                              <m:ctrlPr>
+                                <a:rPr lang="nl-NL" sz="2800" b="0" i="1" smtClean="0">
+                                  <a:latin typeface="Cambria Math"/>
+                                </a:rPr>
+                              </m:ctrlPr>
+                            </m:fPr>
+                            <m:num>
+                              <m:r>
+                                <a:rPr lang="nl-NL" sz="2800" b="0" i="1" smtClean="0">
+                                  <a:latin typeface="Cambria Math"/>
+                                </a:rPr>
+                                <m:t>𝑃</m:t>
+                              </m:r>
+                              <m:d>
+                                <m:dPr>
+                                  <m:ctrlPr>
+                                    <a:rPr lang="nl-NL" sz="2800" b="0" i="1" smtClean="0">
+                                      <a:latin typeface="Cambria Math"/>
+                                    </a:rPr>
+                                  </m:ctrlPr>
+                                </m:dPr>
+                                <m:e>
+                                  <m:r>
+                                    <a:rPr lang="nl-NL" sz="2800" b="0" i="1" smtClean="0">
+                                      <a:latin typeface="Cambria Math"/>
+                                    </a:rPr>
+                                    <m:t>𝑠</m:t>
+                                  </m:r>
+                                </m:e>
+                              </m:d>
+                              <m:r>
+                                <a:rPr lang="nl-NL" sz="2800" b="0" i="1" smtClean="0">
+                                  <a:latin typeface="Cambria Math"/>
+                                </a:rPr>
+                                <m:t>𝐶</m:t>
+                              </m:r>
+                              <m:d>
+                                <m:dPr>
+                                  <m:ctrlPr>
+                                    <a:rPr lang="nl-NL" sz="2800" b="0" i="1" smtClean="0">
+                                      <a:latin typeface="Cambria Math"/>
+                                    </a:rPr>
+                                  </m:ctrlPr>
+                                </m:dPr>
+                                <m:e>
+                                  <m:r>
+                                    <a:rPr lang="nl-NL" sz="2800" b="0" i="1" smtClean="0">
+                                      <a:latin typeface="Cambria Math"/>
+                                    </a:rPr>
+                                    <m:t>𝑠</m:t>
+                                  </m:r>
+                                </m:e>
+                              </m:d>
+                            </m:num>
+                            <m:den>
+                              <m:r>
+                                <a:rPr lang="nl-NL" sz="2800" b="0" i="1" smtClean="0">
+                                  <a:latin typeface="Cambria Math"/>
+                                </a:rPr>
+                                <m:t>1+</m:t>
+                              </m:r>
+                              <m:r>
+                                <a:rPr lang="nl-NL" sz="2800" b="0" i="1" smtClean="0">
+                                  <a:latin typeface="Cambria Math"/>
+                                </a:rPr>
+                                <m:t>𝐹</m:t>
+                              </m:r>
+                              <m:d>
+                                <m:dPr>
+                                  <m:ctrlPr>
+                                    <a:rPr lang="nl-NL" sz="2800" b="0" i="1" smtClean="0">
+                                      <a:latin typeface="Cambria Math"/>
+                                    </a:rPr>
+                                  </m:ctrlPr>
+                                </m:dPr>
+                                <m:e>
+                                  <m:r>
+                                    <a:rPr lang="nl-NL" sz="2800" b="0" i="1" smtClean="0">
+                                      <a:latin typeface="Cambria Math"/>
+                                    </a:rPr>
+                                    <m:t>𝑠</m:t>
+                                  </m:r>
+                                </m:e>
+                              </m:d>
+                              <m:r>
+                                <a:rPr lang="nl-NL" sz="2800" b="0" i="1" smtClean="0">
+                                  <a:latin typeface="Cambria Math"/>
+                                </a:rPr>
+                                <m:t>𝑃</m:t>
+                              </m:r>
+                              <m:d>
+                                <m:dPr>
+                                  <m:ctrlPr>
+                                    <a:rPr lang="nl-NL" sz="2800" b="0" i="1" smtClean="0">
+                                      <a:latin typeface="Cambria Math"/>
+                                    </a:rPr>
+                                  </m:ctrlPr>
+                                </m:dPr>
+                                <m:e>
+                                  <m:r>
+                                    <a:rPr lang="nl-NL" sz="2800" b="0" i="1" smtClean="0">
+                                      <a:latin typeface="Cambria Math"/>
+                                    </a:rPr>
+                                    <m:t>𝑠</m:t>
+                                  </m:r>
+                                </m:e>
+                              </m:d>
+                              <m:r>
+                                <a:rPr lang="nl-NL" sz="2800" b="0" i="1" smtClean="0">
+                                  <a:latin typeface="Cambria Math"/>
+                                </a:rPr>
+                                <m:t>𝐶</m:t>
+                              </m:r>
+                              <m:d>
+                                <m:dPr>
+                                  <m:ctrlPr>
+                                    <a:rPr lang="nl-NL" sz="2800" b="0" i="1" smtClean="0">
+                                      <a:latin typeface="Cambria Math"/>
+                                    </a:rPr>
+                                  </m:ctrlPr>
+                                </m:dPr>
+                                <m:e>
+                                  <m:r>
+                                    <a:rPr lang="nl-NL" sz="2800" b="0" i="1" smtClean="0">
+                                      <a:latin typeface="Cambria Math"/>
+                                    </a:rPr>
+                                    <m:t>𝑠</m:t>
+                                  </m:r>
+                                </m:e>
+                              </m:d>
+                            </m:den>
+                          </m:f>
+                        </m:e>
+                      </m:d>
+                      <m:r>
+                        <a:rPr lang="nl-NL" sz="2800" b="0" i="1" smtClean="0">
+                          <a:latin typeface="Cambria Math"/>
+                        </a:rPr>
+                        <m:t>𝑅</m:t>
+                      </m:r>
+                      <m:r>
+                        <a:rPr lang="nl-NL" sz="2800" b="0" i="1" smtClean="0">
+                          <a:latin typeface="Cambria Math"/>
+                        </a:rPr>
+                        <m:t>(</m:t>
+                      </m:r>
+                      <m:r>
+                        <a:rPr lang="nl-NL" sz="2800" b="0" i="1" smtClean="0">
+                          <a:latin typeface="Cambria Math"/>
+                        </a:rPr>
+                        <m:t>𝑠</m:t>
+                      </m:r>
+                      <m:r>
+                        <a:rPr lang="nl-NL" sz="2800" b="0" i="1" smtClean="0">
+                          <a:latin typeface="Cambria Math"/>
+                        </a:rPr>
+                        <m:t>)</m:t>
+                      </m:r>
+                    </m:oMath>
+                  </m:oMathPara>
+                </a14:m>
+                <a:endParaRPr lang="nl-NL" sz="2800" dirty="0"/>
+              </a:p>
+            </p:txBody>
+          </p:sp>
+        </mc:Choice>
+        <mc:Fallback>
+          <p:sp>
+            <p:nvSpPr>
+              <p:cNvPr id="13" name="Tekstvak 12"/>
+              <p:cNvSpPr txBox="1">
+                <a:spLocks noRot="1" noChangeAspect="1" noMove="1" noResize="1" noEditPoints="1" noAdjustHandles="1" noChangeArrowheads="1" noChangeShapeType="1" noTextEdit="1"/>
+              </p:cNvSpPr>
+              <p:nvPr/>
+            </p:nvSpPr>
+            <p:spPr>
+              <a:xfrm>
+                <a:off x="971600" y="2204864"/>
+                <a:ext cx="5344989" cy="1060483"/>
+              </a:xfrm>
+              <a:prstGeom prst="rect">
+                <a:avLst/>
+              </a:prstGeom>
+              <a:blipFill rotWithShape="1">
+                <a:blip r:embed="rId2"/>
+                <a:stretch>
+                  <a:fillRect/>
+                </a:stretch>
+              </a:blipFill>
+            </p:spPr>
+            <p:txBody>
+              <a:bodyPr/>
+              <a:lstStyle/>
+              <a:p>
+                <a:r>
+                  <a:rPr lang="nl-NL">
+                    <a:noFill/>
+                  </a:rPr>
+                  <a:t> </a:t>
+                </a:r>
+              </a:p>
+            </p:txBody>
+          </p:sp>
+        </mc:Fallback>
+      </mc:AlternateContent>
+      <p:pic>
+        <p:nvPicPr>
+          <p:cNvPr id="4108" name="Picture 12" descr="https://upload.wikimedia.org/wikipedia/commons/thumb/9/90/Simple_feedback_control_loop2.svg/1280px-Simple_feedback_control_loop2.svg.png"/>
+          <p:cNvPicPr>
+            <a:picLocks noChangeAspect="1" noChangeArrowheads="1"/>
+          </p:cNvPicPr>
+          <p:nvPr/>
+        </p:nvPicPr>
+        <p:blipFill>
+          <a:blip r:embed="rId3">
+            <a:extLst>
+              <a:ext uri="{28A0092B-C50C-407E-A947-70E740481C1C}">
+                <a14:useLocalDpi xmlns:a14="http://schemas.microsoft.com/office/drawing/2010/main" val="0"/>
+              </a:ext>
+            </a:extLst>
+          </a:blip>
+          <a:srcRect/>
+          <a:stretch>
+            <a:fillRect/>
+          </a:stretch>
+        </p:blipFill>
+        <p:spPr bwMode="auto">
+          <a:xfrm>
+            <a:off x="1763689" y="3710956"/>
+            <a:ext cx="7064128" cy="2466926"/>
+          </a:xfrm>
+          <a:prstGeom prst="rect">
+            <a:avLst/>
+          </a:prstGeom>
+          <a:noFill/>
+          <a:extLst>
+            <a:ext uri="{909E8E84-426E-40DD-AFC4-6F175D3DCCD1}">
+              <a14:hiddenFill xmlns:a14="http://schemas.microsoft.com/office/drawing/2010/main">
+                <a:solidFill>
+                  <a:srgbClr val="FFFFFF"/>
+                </a:solidFill>
+              </a14:hiddenFill>
+            </a:ext>
+          </a:extLst>
+        </p:spPr>
+      </p:pic>
+      <p:sp>
+        <p:nvSpPr>
+          <p:cNvPr id="14" name="Tekstvak 13"/>
+          <p:cNvSpPr txBox="1"/>
+          <p:nvPr/>
+        </p:nvSpPr>
+        <p:spPr>
+          <a:xfrm>
+            <a:off x="2118022" y="1628800"/>
+            <a:ext cx="3101249" cy="461665"/>
+          </a:xfrm>
+          <a:prstGeom prst="rect">
+            <a:avLst/>
+          </a:prstGeom>
+          <a:noFill/>
+        </p:spPr>
+        <p:txBody>
+          <a:bodyPr wrap="square" rtlCol="0">
+            <a:spAutoFit/>
+          </a:bodyPr>
+          <a:lstStyle/>
+          <a:p>
+            <a:pPr algn="ctr"/>
+            <a:r>
+              <a:rPr lang="nl-NL" sz="2400" i="1" dirty="0" smtClean="0"/>
+              <a:t>Laplace </a:t>
+            </a:r>
+            <a:r>
+              <a:rPr lang="en-US" sz="2400" i="1" dirty="0" smtClean="0"/>
+              <a:t>transformation</a:t>
+            </a:r>
+            <a:endParaRPr lang="en-US" sz="2400" i="1" dirty="0"/>
           </a:p>
         </p:txBody>
       </p:sp>
@@ -10945,7 +11873,7 @@
         </p:blipFill>
         <p:spPr>
           <a:xfrm>
-            <a:off x="-3955" y="-2721"/>
+            <a:off x="-3955" y="-2720"/>
             <a:ext cx="5944107" cy="2362069"/>
           </a:xfrm>
           <a:prstGeom prst="rect">
@@ -11222,7 +12150,7 @@
     <p:controls>
       <mc:AlternateContent xmlns:mc="http://schemas.openxmlformats.org/markup-compatibility/2006">
         <mc:Choice xmlns:v="urn:schemas-microsoft-com:vml" Requires="v">
-          <p:control spid="3077" name="WindowsMediaPlayer1" r:id="rId2" imgW="9142857" imgH="6857143"/>
+          <p:control spid="3079" name="WindowsMediaPlayer1" r:id="rId2" imgW="9142857" imgH="6857143"/>
         </mc:Choice>
         <mc:Fallback>
           <p:control name="WindowsMediaPlayer1" r:id="rId2" imgW="9142857" imgH="6857143">
@@ -11249,8 +12177,8 @@
               </p:blipFill>
               <p:spPr bwMode="auto">
                 <a:xfrm>
-                  <a:off x="0" y="0"/>
-                  <a:ext cx="9144000" cy="6861175"/>
+                  <a:off x="-3175" y="0"/>
+                  <a:ext cx="9150350" cy="6861175"/>
                 </a:xfrm>
                 <a:prstGeom prst="rect">
                   <a:avLst/>
@@ -11299,11 +12227,11 @@
   <p:clrMapOvr>
     <a:masterClrMapping/>
   </p:clrMapOvr>
-  <mc:AlternateContent xmlns:mc="http://schemas.openxmlformats.org/markup-compatibility/2006">
-    <mc:Choice xmlns:p14="http://schemas.microsoft.com/office/powerpoint/2010/main" Requires="p14">
+  <mc:AlternateContent xmlns:mc="http://schemas.openxmlformats.org/markup-compatibility/2006" xmlns:p14="http://schemas.microsoft.com/office/powerpoint/2010/main">
+    <mc:Choice Requires="p14">
       <p:transition spd="slow" p14:dur="2000" advClick="0" advTm="20000"/>
     </mc:Choice>
-    <mc:Fallback>
+    <mc:Fallback xmlns="">
       <p:transition spd="slow" advClick="0" advTm="20000"/>
     </mc:Fallback>
   </mc:AlternateContent>
@@ -11381,7 +12309,7 @@
         </p:blipFill>
         <p:spPr>
           <a:xfrm>
-            <a:off x="457200" y="1916311"/>
+            <a:off x="457201" y="1412776"/>
             <a:ext cx="8234363" cy="1556940"/>
           </a:xfrm>
         </p:spPr>
@@ -11485,6 +12413,430 @@
           </a:prstGeom>
         </p:spPr>
       </p:pic>
+      <p:pic>
+        <p:nvPicPr>
+          <p:cNvPr id="6146" name="Picture 2" descr="G:\Richard van Heest\TU Delft\Jaar 4\IN5000 Master Thesis\Report and Presentation\presentation\img\pid.png"/>
+          <p:cNvPicPr>
+            <a:picLocks noChangeAspect="1" noChangeArrowheads="1"/>
+          </p:cNvPicPr>
+          <p:nvPr/>
+        </p:nvPicPr>
+        <p:blipFill>
+          <a:blip r:embed="rId4" cstate="print">
+            <a:extLst>
+              <a:ext uri="{28A0092B-C50C-407E-A947-70E740481C1C}">
+                <a14:useLocalDpi xmlns:a14="http://schemas.microsoft.com/office/drawing/2010/main" val="0"/>
+              </a:ext>
+            </a:extLst>
+          </a:blip>
+          <a:srcRect/>
+          <a:stretch>
+            <a:fillRect/>
+          </a:stretch>
+        </p:blipFill>
+        <p:spPr bwMode="auto">
+          <a:xfrm>
+            <a:off x="395536" y="4221088"/>
+            <a:ext cx="4032449" cy="2453577"/>
+          </a:xfrm>
+          <a:prstGeom prst="rect">
+            <a:avLst/>
+          </a:prstGeom>
+          <a:noFill/>
+          <a:extLst>
+            <a:ext uri="{909E8E84-426E-40DD-AFC4-6F175D3DCCD1}">
+              <a14:hiddenFill xmlns:a14="http://schemas.microsoft.com/office/drawing/2010/main">
+                <a:solidFill>
+                  <a:srgbClr val="FFFFFF"/>
+                </a:solidFill>
+              </a14:hiddenFill>
+            </a:ext>
+          </a:extLst>
+        </p:spPr>
+      </p:pic>
+      <p:sp>
+        <p:nvSpPr>
+          <p:cNvPr id="5" name="Tekstvak 4"/>
+          <p:cNvSpPr txBox="1"/>
+          <p:nvPr/>
+        </p:nvSpPr>
+        <p:spPr>
+          <a:xfrm>
+            <a:off x="1475656" y="3059668"/>
+            <a:ext cx="1519792" cy="369332"/>
+          </a:xfrm>
+          <a:prstGeom prst="rect">
+            <a:avLst/>
+          </a:prstGeom>
+          <a:noFill/>
+        </p:spPr>
+        <p:txBody>
+          <a:bodyPr wrap="square" rtlCol="0">
+            <a:spAutoFit/>
+          </a:bodyPr>
+          <a:lstStyle/>
+          <a:p>
+            <a:pPr algn="ctr"/>
+            <a:r>
+              <a:rPr lang="nl-NL" i="1" dirty="0" smtClean="0"/>
+              <a:t>PID controller</a:t>
+            </a:r>
+          </a:p>
+        </p:txBody>
+      </p:sp>
+      <mc:AlternateContent xmlns:mc="http://schemas.openxmlformats.org/markup-compatibility/2006">
+        <mc:Choice xmlns:a14="http://schemas.microsoft.com/office/drawing/2010/main" Requires="a14">
+          <p:sp>
+            <p:nvSpPr>
+              <p:cNvPr id="6" name="Tekstvak 5"/>
+              <p:cNvSpPr txBox="1"/>
+              <p:nvPr/>
+            </p:nvSpPr>
+            <p:spPr>
+              <a:xfrm>
+                <a:off x="143222" y="3429000"/>
+                <a:ext cx="4537076" cy="737894"/>
+              </a:xfrm>
+              <a:prstGeom prst="rect">
+                <a:avLst/>
+              </a:prstGeom>
+              <a:noFill/>
+            </p:spPr>
+            <p:txBody>
+              <a:bodyPr wrap="none" rtlCol="0">
+                <a:spAutoFit/>
+              </a:bodyPr>
+              <a:lstStyle/>
+              <a:p>
+                <a14:m>
+                  <m:oMathPara xmlns:m="http://schemas.openxmlformats.org/officeDocument/2006/math">
+                    <m:oMathParaPr>
+                      <m:jc m:val="centerGroup"/>
+                    </m:oMathParaPr>
+                    <m:oMath xmlns:m="http://schemas.openxmlformats.org/officeDocument/2006/math">
+                      <m:r>
+                        <a:rPr lang="nl-NL" b="0" i="1" smtClean="0">
+                          <a:latin typeface="Cambria Math"/>
+                        </a:rPr>
+                        <m:t>𝑢</m:t>
+                      </m:r>
+                      <m:d>
+                        <m:dPr>
+                          <m:ctrlPr>
+                            <a:rPr lang="nl-NL" b="0" i="1" smtClean="0">
+                              <a:latin typeface="Cambria Math"/>
+                            </a:rPr>
+                          </m:ctrlPr>
+                        </m:dPr>
+                        <m:e>
+                          <m:r>
+                            <a:rPr lang="nl-NL" b="0" i="1" smtClean="0">
+                              <a:latin typeface="Cambria Math"/>
+                            </a:rPr>
+                            <m:t>𝑡</m:t>
+                          </m:r>
+                        </m:e>
+                      </m:d>
+                      <m:r>
+                        <a:rPr lang="nl-NL" b="0" i="1" smtClean="0">
+                          <a:latin typeface="Cambria Math"/>
+                        </a:rPr>
+                        <m:t>=</m:t>
+                      </m:r>
+                      <m:sSub>
+                        <m:sSubPr>
+                          <m:ctrlPr>
+                            <a:rPr lang="nl-NL" b="0" i="1" smtClean="0">
+                              <a:latin typeface="Cambria Math"/>
+                            </a:rPr>
+                          </m:ctrlPr>
+                        </m:sSubPr>
+                        <m:e>
+                          <m:r>
+                            <a:rPr lang="nl-NL" b="0" i="1" smtClean="0">
+                              <a:latin typeface="Cambria Math"/>
+                            </a:rPr>
+                            <m:t>𝑘</m:t>
+                          </m:r>
+                        </m:e>
+                        <m:sub>
+                          <m:r>
+                            <a:rPr lang="nl-NL" b="0" i="1" smtClean="0">
+                              <a:latin typeface="Cambria Math"/>
+                            </a:rPr>
+                            <m:t>𝑝</m:t>
+                          </m:r>
+                        </m:sub>
+                      </m:sSub>
+                      <m:r>
+                        <a:rPr lang="nl-NL" b="0" i="1" smtClean="0">
+                          <a:latin typeface="Cambria Math"/>
+                        </a:rPr>
+                        <m:t>⋅</m:t>
+                      </m:r>
+                      <m:r>
+                        <a:rPr lang="nl-NL" b="0" i="1" smtClean="0">
+                          <a:latin typeface="Cambria Math"/>
+                        </a:rPr>
+                        <m:t>𝑒</m:t>
+                      </m:r>
+                      <m:d>
+                        <m:dPr>
+                          <m:ctrlPr>
+                            <a:rPr lang="nl-NL" b="0" i="1" smtClean="0">
+                              <a:latin typeface="Cambria Math"/>
+                            </a:rPr>
+                          </m:ctrlPr>
+                        </m:dPr>
+                        <m:e>
+                          <m:r>
+                            <a:rPr lang="nl-NL" b="0" i="1" smtClean="0">
+                              <a:latin typeface="Cambria Math"/>
+                            </a:rPr>
+                            <m:t>𝑡</m:t>
+                          </m:r>
+                        </m:e>
+                      </m:d>
+                      <m:r>
+                        <a:rPr lang="nl-NL" b="0" i="1" smtClean="0">
+                          <a:latin typeface="Cambria Math"/>
+                        </a:rPr>
+                        <m:t>+</m:t>
+                      </m:r>
+                      <m:sSub>
+                        <m:sSubPr>
+                          <m:ctrlPr>
+                            <a:rPr lang="nl-NL" b="0" i="1" smtClean="0">
+                              <a:latin typeface="Cambria Math"/>
+                            </a:rPr>
+                          </m:ctrlPr>
+                        </m:sSubPr>
+                        <m:e>
+                          <m:r>
+                            <a:rPr lang="nl-NL" b="0" i="1" smtClean="0">
+                              <a:latin typeface="Cambria Math"/>
+                            </a:rPr>
+                            <m:t>𝑘</m:t>
+                          </m:r>
+                        </m:e>
+                        <m:sub>
+                          <m:r>
+                            <a:rPr lang="nl-NL" b="0" i="1" smtClean="0">
+                              <a:latin typeface="Cambria Math"/>
+                            </a:rPr>
+                            <m:t>𝑖</m:t>
+                          </m:r>
+                        </m:sub>
+                      </m:sSub>
+                      <m:nary>
+                        <m:naryPr>
+                          <m:ctrlPr>
+                            <a:rPr lang="nl-NL" b="0" i="1" smtClean="0">
+                              <a:latin typeface="Cambria Math"/>
+                            </a:rPr>
+                          </m:ctrlPr>
+                        </m:naryPr>
+                        <m:sub>
+                          <m:r>
+                            <m:rPr>
+                              <m:brk m:alnAt="23"/>
+                            </m:rPr>
+                            <a:rPr lang="nl-NL" b="0" i="1" smtClean="0">
+                              <a:latin typeface="Cambria Math"/>
+                            </a:rPr>
+                            <m:t>0</m:t>
+                          </m:r>
+                        </m:sub>
+                        <m:sup>
+                          <m:r>
+                            <a:rPr lang="nl-NL" b="0" i="1" smtClean="0">
+                              <a:latin typeface="Cambria Math"/>
+                            </a:rPr>
+                            <m:t>𝑡</m:t>
+                          </m:r>
+                        </m:sup>
+                        <m:e>
+                          <m:r>
+                            <a:rPr lang="nl-NL" i="1">
+                              <a:latin typeface="Cambria Math"/>
+                            </a:rPr>
+                            <m:t>𝑒</m:t>
+                          </m:r>
+                          <m:d>
+                            <m:dPr>
+                              <m:ctrlPr>
+                                <a:rPr lang="nl-NL" i="1">
+                                  <a:latin typeface="Cambria Math"/>
+                                </a:rPr>
+                              </m:ctrlPr>
+                            </m:dPr>
+                            <m:e>
+                              <m:r>
+                                <a:rPr lang="nl-NL" i="1">
+                                  <a:latin typeface="Cambria Math"/>
+                                </a:rPr>
+                                <m:t>𝜏</m:t>
+                              </m:r>
+                            </m:e>
+                          </m:d>
+                          <m:r>
+                            <a:rPr lang="nl-NL" i="1">
+                              <a:latin typeface="Cambria Math"/>
+                            </a:rPr>
+                            <m:t>𝑑</m:t>
+                          </m:r>
+                          <m:r>
+                            <a:rPr lang="nl-NL" i="1">
+                              <a:latin typeface="Cambria Math"/>
+                            </a:rPr>
+                            <m:t>𝜏</m:t>
+                          </m:r>
+                        </m:e>
+                      </m:nary>
+                      <m:r>
+                        <a:rPr lang="nl-NL" b="0" i="1" smtClean="0">
+                          <a:latin typeface="Cambria Math"/>
+                        </a:rPr>
+                        <m:t>+</m:t>
+                      </m:r>
+                      <m:sSub>
+                        <m:sSubPr>
+                          <m:ctrlPr>
+                            <a:rPr lang="nl-NL" b="0" i="1" smtClean="0">
+                              <a:latin typeface="Cambria Math"/>
+                            </a:rPr>
+                          </m:ctrlPr>
+                        </m:sSubPr>
+                        <m:e>
+                          <m:r>
+                            <a:rPr lang="nl-NL" b="0" i="1" smtClean="0">
+                              <a:latin typeface="Cambria Math"/>
+                            </a:rPr>
+                            <m:t>𝑘</m:t>
+                          </m:r>
+                        </m:e>
+                        <m:sub>
+                          <m:r>
+                            <a:rPr lang="nl-NL" b="0" i="1" smtClean="0">
+                              <a:latin typeface="Cambria Math"/>
+                            </a:rPr>
+                            <m:t>𝑑</m:t>
+                          </m:r>
+                        </m:sub>
+                      </m:sSub>
+                      <m:r>
+                        <a:rPr lang="nl-NL" b="0" i="1" smtClean="0">
+                          <a:latin typeface="Cambria Math"/>
+                        </a:rPr>
+                        <m:t>⋅</m:t>
+                      </m:r>
+                      <m:f>
+                        <m:fPr>
+                          <m:ctrlPr>
+                            <a:rPr lang="nl-NL" b="0" i="1" smtClean="0">
+                              <a:latin typeface="Cambria Math"/>
+                            </a:rPr>
+                          </m:ctrlPr>
+                        </m:fPr>
+                        <m:num>
+                          <m:r>
+                            <m:rPr>
+                              <m:nor/>
+                            </m:rPr>
+                            <a:rPr lang="nl-NL" b="0" i="0" smtClean="0">
+                              <a:latin typeface="Cambria Math"/>
+                            </a:rPr>
+                            <m:t>d</m:t>
+                          </m:r>
+                          <m:r>
+                            <a:rPr lang="nl-NL" b="0" i="1" smtClean="0">
+                              <a:latin typeface="Cambria Math"/>
+                            </a:rPr>
+                            <m:t>𝑒</m:t>
+                          </m:r>
+                          <m:d>
+                            <m:dPr>
+                              <m:ctrlPr>
+                                <a:rPr lang="nl-NL" b="0" i="1" smtClean="0">
+                                  <a:latin typeface="Cambria Math"/>
+                                </a:rPr>
+                              </m:ctrlPr>
+                            </m:dPr>
+                            <m:e>
+                              <m:r>
+                                <a:rPr lang="nl-NL" b="0" i="1" smtClean="0">
+                                  <a:latin typeface="Cambria Math"/>
+                                </a:rPr>
+                                <m:t>𝑡</m:t>
+                              </m:r>
+                            </m:e>
+                          </m:d>
+                        </m:num>
+                        <m:den>
+                          <m:r>
+                            <m:rPr>
+                              <m:nor/>
+                            </m:rPr>
+                            <a:rPr lang="nl-NL" b="0" i="0" smtClean="0">
+                              <a:latin typeface="Cambria Math"/>
+                            </a:rPr>
+                            <m:t>d</m:t>
+                          </m:r>
+                          <m:r>
+                            <a:rPr lang="nl-NL" b="0" i="1" smtClean="0">
+                              <a:latin typeface="Cambria Math"/>
+                            </a:rPr>
+                            <m:t>𝑡</m:t>
+                          </m:r>
+                        </m:den>
+                      </m:f>
+                    </m:oMath>
+                  </m:oMathPara>
+                </a14:m>
+                <a:endParaRPr lang="nl-NL" dirty="0"/>
+              </a:p>
+            </p:txBody>
+          </p:sp>
+        </mc:Choice>
+        <mc:Fallback>
+          <p:sp>
+            <p:nvSpPr>
+              <p:cNvPr id="6" name="Tekstvak 5"/>
+              <p:cNvSpPr txBox="1">
+                <a:spLocks noRot="1" noChangeAspect="1" noMove="1" noResize="1" noEditPoints="1" noAdjustHandles="1" noChangeArrowheads="1" noChangeShapeType="1" noTextEdit="1"/>
+              </p:cNvSpPr>
+              <p:nvPr/>
+            </p:nvSpPr>
+            <p:spPr>
+              <a:xfrm>
+                <a:off x="143222" y="3429000"/>
+                <a:ext cx="4537076" cy="737894"/>
+              </a:xfrm>
+              <a:prstGeom prst="rect">
+                <a:avLst/>
+              </a:prstGeom>
+              <a:blipFill rotWithShape="1">
+                <a:blip r:embed="rId5"/>
+                <a:stretch>
+                  <a:fillRect/>
+                </a:stretch>
+              </a:blipFill>
+            </p:spPr>
+            <p:txBody>
+              <a:bodyPr/>
+              <a:lstStyle/>
+              <a:p>
+                <a:r>
+                  <a:rPr lang="nl-NL">
+                    <a:noFill/>
+                  </a:rPr>
+                  <a:t> </a:t>
+                </a:r>
+              </a:p>
+            </p:txBody>
+          </p:sp>
+        </mc:Fallback>
+      </mc:AlternateContent>
     </p:spTree>
     <p:extLst>
       <p:ext uri="{BB962C8B-B14F-4D97-AF65-F5344CB8AC3E}">
@@ -11555,12 +12907,507 @@
             <p:ph idx="1"/>
           </p:nvPr>
         </p:nvSpPr>
-        <p:spPr/>
-        <p:txBody>
-          <a:bodyPr/>
-          <a:lstStyle/>
-          <a:p>
-            <a:endParaRPr lang="nl-NL"/>
+        <p:spPr>
+          <a:xfrm>
+            <a:off x="457200" y="1268761"/>
+            <a:ext cx="8507288" cy="4857404"/>
+          </a:xfrm>
+        </p:spPr>
+        <p:txBody>
+          <a:bodyPr>
+            <a:noAutofit/>
+          </a:bodyPr>
+          <a:lstStyle/>
+          <a:p>
+            <a:pPr marL="0" indent="0">
+              <a:buNone/>
+            </a:pPr>
+            <a:r>
+              <a:rPr lang="nl-NL" sz="2800" dirty="0" err="1" smtClean="0"/>
+              <a:t>Components</a:t>
+            </a:r>
+            <a:r>
+              <a:rPr lang="nl-NL" sz="2800" dirty="0" smtClean="0"/>
+              <a:t> are </a:t>
+            </a:r>
+            <a:r>
+              <a:rPr lang="nl-NL" sz="2800" dirty="0" err="1" smtClean="0"/>
+              <a:t>transformations</a:t>
+            </a:r>
+            <a:r>
+              <a:rPr lang="nl-NL" sz="2800" dirty="0" smtClean="0"/>
+              <a:t> over </a:t>
+            </a:r>
+            <a:r>
+              <a:rPr lang="nl-NL" sz="2400" i="1" dirty="0" err="1" smtClean="0">
+                <a:latin typeface="Consolas" panose="020B0609020204030204" pitchFamily="49" charset="0"/>
+                <a:cs typeface="Consolas" panose="020B0609020204030204" pitchFamily="49" charset="0"/>
+              </a:rPr>
+              <a:t>Observable</a:t>
+            </a:r>
+            <a:r>
+              <a:rPr lang="nl-NL" sz="2800" dirty="0" err="1" smtClean="0"/>
+              <a:t>s</a:t>
+            </a:r>
+            <a:r>
+              <a:rPr lang="nl-NL" sz="2800" dirty="0" smtClean="0"/>
+              <a:t>:</a:t>
+            </a:r>
+            <a:endParaRPr lang="nl-NL" sz="2400" dirty="0">
+              <a:latin typeface="Consolas" panose="020B0609020204030204" pitchFamily="49" charset="0"/>
+              <a:cs typeface="Consolas" panose="020B0609020204030204" pitchFamily="49" charset="0"/>
+            </a:endParaRPr>
+          </a:p>
+          <a:p>
+            <a:pPr marL="0" indent="0">
+              <a:buNone/>
+            </a:pPr>
+            <a:endParaRPr lang="nl-NL" sz="700" dirty="0">
+              <a:latin typeface="Consolas" panose="020B0609020204030204" pitchFamily="49" charset="0"/>
+              <a:cs typeface="Consolas" panose="020B0609020204030204" pitchFamily="49" charset="0"/>
+            </a:endParaRPr>
+          </a:p>
+          <a:p>
+            <a:pPr marL="0" indent="0">
+              <a:buNone/>
+            </a:pPr>
+            <a:r>
+              <a:rPr lang="pt-BR" sz="1800" b="1" dirty="0">
+                <a:solidFill>
+                  <a:srgbClr val="7F0055"/>
+                </a:solidFill>
+                <a:latin typeface="Consolas" panose="020B0609020204030204" pitchFamily="49" charset="0"/>
+                <a:cs typeface="Consolas" panose="020B0609020204030204" pitchFamily="49" charset="0"/>
+              </a:rPr>
+              <a:t>class</a:t>
+            </a:r>
+            <a:r>
+              <a:rPr lang="pt-BR" sz="1800" dirty="0">
+                <a:latin typeface="Consolas" panose="020B0609020204030204" pitchFamily="49" charset="0"/>
+                <a:cs typeface="Consolas" panose="020B0609020204030204" pitchFamily="49" charset="0"/>
+              </a:rPr>
+              <a:t> Component[I, O](transform: Observable[I] =&gt; Observable[O</a:t>
+            </a:r>
+            <a:r>
+              <a:rPr lang="pt-BR" sz="1800" dirty="0" smtClean="0">
+                <a:latin typeface="Consolas" panose="020B0609020204030204" pitchFamily="49" charset="0"/>
+                <a:cs typeface="Consolas" panose="020B0609020204030204" pitchFamily="49" charset="0"/>
+              </a:rPr>
+              <a:t>]) {</a:t>
+            </a:r>
+          </a:p>
+          <a:p>
+            <a:pPr marL="0" indent="0">
+              <a:buNone/>
+            </a:pPr>
+            <a:r>
+              <a:rPr lang="en-US" sz="1800" dirty="0">
+                <a:latin typeface="Consolas" panose="020B0609020204030204" pitchFamily="49" charset="0"/>
+                <a:cs typeface="Consolas" panose="020B0609020204030204" pitchFamily="49" charset="0"/>
+              </a:rPr>
+              <a:t> </a:t>
+            </a:r>
+            <a:r>
+              <a:rPr lang="en-US" sz="1800" dirty="0" smtClean="0">
+                <a:latin typeface="Consolas" panose="020B0609020204030204" pitchFamily="49" charset="0"/>
+                <a:cs typeface="Consolas" panose="020B0609020204030204" pitchFamily="49" charset="0"/>
+              </a:rPr>
+              <a:t>   </a:t>
+            </a:r>
+            <a:r>
+              <a:rPr lang="en-US" sz="1800" b="1" dirty="0" err="1" smtClean="0">
+                <a:solidFill>
+                  <a:srgbClr val="7F0055"/>
+                </a:solidFill>
+                <a:latin typeface="Consolas" panose="020B0609020204030204" pitchFamily="49" charset="0"/>
+                <a:cs typeface="Consolas" panose="020B0609020204030204" pitchFamily="49" charset="0"/>
+              </a:rPr>
+              <a:t>def</a:t>
+            </a:r>
+            <a:r>
+              <a:rPr lang="en-US" sz="1800" dirty="0" smtClean="0">
+                <a:latin typeface="Consolas" panose="020B0609020204030204" pitchFamily="49" charset="0"/>
+                <a:cs typeface="Consolas" panose="020B0609020204030204" pitchFamily="49" charset="0"/>
+              </a:rPr>
+              <a:t> </a:t>
+            </a:r>
+            <a:r>
+              <a:rPr lang="en-US" sz="1800" dirty="0">
+                <a:latin typeface="Consolas" panose="020B0609020204030204" pitchFamily="49" charset="0"/>
+                <a:cs typeface="Consolas" panose="020B0609020204030204" pitchFamily="49" charset="0"/>
+              </a:rPr>
+              <a:t>run(is: Observable[I]): Observable[O] </a:t>
+            </a:r>
+            <a:r>
+              <a:rPr lang="en-US" sz="1800" dirty="0" smtClean="0">
+                <a:latin typeface="Consolas" panose="020B0609020204030204" pitchFamily="49" charset="0"/>
+                <a:cs typeface="Consolas" panose="020B0609020204030204" pitchFamily="49" charset="0"/>
+              </a:rPr>
+              <a:t>= transform(is)</a:t>
+            </a:r>
+          </a:p>
+          <a:p>
+            <a:pPr marL="0" indent="0">
+              <a:buNone/>
+            </a:pPr>
+            <a:endParaRPr lang="en-US" sz="1800" dirty="0">
+              <a:latin typeface="Consolas" panose="020B0609020204030204" pitchFamily="49" charset="0"/>
+              <a:cs typeface="Consolas" panose="020B0609020204030204" pitchFamily="49" charset="0"/>
+            </a:endParaRPr>
+          </a:p>
+          <a:p>
+            <a:pPr marL="0" indent="0">
+              <a:buNone/>
+            </a:pPr>
+            <a:r>
+              <a:rPr lang="en-US" sz="1800" dirty="0">
+                <a:latin typeface="Consolas" panose="020B0609020204030204" pitchFamily="49" charset="0"/>
+                <a:cs typeface="Consolas" panose="020B0609020204030204" pitchFamily="49" charset="0"/>
+              </a:rPr>
+              <a:t>    </a:t>
+            </a:r>
+            <a:r>
+              <a:rPr lang="en-US" sz="1800" b="1" dirty="0" err="1">
+                <a:solidFill>
+                  <a:srgbClr val="7F0055"/>
+                </a:solidFill>
+                <a:latin typeface="Consolas" panose="020B0609020204030204" pitchFamily="49" charset="0"/>
+                <a:cs typeface="Consolas" panose="020B0609020204030204" pitchFamily="49" charset="0"/>
+              </a:rPr>
+              <a:t>def</a:t>
+            </a:r>
+            <a:r>
+              <a:rPr lang="en-US" sz="1800" dirty="0">
+                <a:latin typeface="Consolas" panose="020B0609020204030204" pitchFamily="49" charset="0"/>
+                <a:cs typeface="Consolas" panose="020B0609020204030204" pitchFamily="49" charset="0"/>
+              </a:rPr>
+              <a:t> &gt;&gt;&gt;[X](other: Component[O, X]): Component[I, X] </a:t>
+            </a:r>
+            <a:r>
+              <a:rPr lang="en-US" sz="1800" dirty="0" smtClean="0">
+                <a:latin typeface="Consolas" panose="020B0609020204030204" pitchFamily="49" charset="0"/>
+                <a:cs typeface="Consolas" panose="020B0609020204030204" pitchFamily="49" charset="0"/>
+              </a:rPr>
+              <a:t>=</a:t>
+            </a:r>
+          </a:p>
+          <a:p>
+            <a:pPr marL="0" indent="0">
+              <a:buNone/>
+            </a:pPr>
+            <a:r>
+              <a:rPr lang="en-US" sz="1800" dirty="0">
+                <a:latin typeface="Consolas" panose="020B0609020204030204" pitchFamily="49" charset="0"/>
+                <a:cs typeface="Consolas" panose="020B0609020204030204" pitchFamily="49" charset="0"/>
+              </a:rPr>
+              <a:t> </a:t>
+            </a:r>
+            <a:r>
+              <a:rPr lang="en-US" sz="1800" dirty="0" smtClean="0">
+                <a:latin typeface="Consolas" panose="020B0609020204030204" pitchFamily="49" charset="0"/>
+                <a:cs typeface="Consolas" panose="020B0609020204030204" pitchFamily="49" charset="0"/>
+              </a:rPr>
+              <a:t>       Component(</a:t>
+            </a:r>
+            <a:r>
+              <a:rPr lang="en-US" sz="1800" dirty="0" err="1" smtClean="0">
+                <a:latin typeface="Consolas" panose="020B0609020204030204" pitchFamily="49" charset="0"/>
+                <a:cs typeface="Consolas" panose="020B0609020204030204" pitchFamily="49" charset="0"/>
+              </a:rPr>
+              <a:t>other.run</a:t>
+            </a:r>
+            <a:r>
+              <a:rPr lang="en-US" sz="1800" dirty="0" smtClean="0">
+                <a:latin typeface="Consolas" panose="020B0609020204030204" pitchFamily="49" charset="0"/>
+                <a:cs typeface="Consolas" panose="020B0609020204030204" pitchFamily="49" charset="0"/>
+              </a:rPr>
+              <a:t> _ compose </a:t>
+            </a:r>
+            <a:r>
+              <a:rPr lang="en-US" sz="1800" b="1" dirty="0" err="1">
+                <a:solidFill>
+                  <a:srgbClr val="7F0055"/>
+                </a:solidFill>
+                <a:latin typeface="Consolas" panose="020B0609020204030204" pitchFamily="49" charset="0"/>
+                <a:cs typeface="Consolas" panose="020B0609020204030204" pitchFamily="49" charset="0"/>
+              </a:rPr>
+              <a:t>this</a:t>
+            </a:r>
+            <a:r>
+              <a:rPr lang="en-US" sz="1800" dirty="0" err="1" smtClean="0">
+                <a:latin typeface="Consolas" panose="020B0609020204030204" pitchFamily="49" charset="0"/>
+                <a:cs typeface="Consolas" panose="020B0609020204030204" pitchFamily="49" charset="0"/>
+              </a:rPr>
+              <a:t>.run</a:t>
+            </a:r>
+            <a:r>
+              <a:rPr lang="en-US" sz="1800" dirty="0" smtClean="0">
+                <a:latin typeface="Consolas" panose="020B0609020204030204" pitchFamily="49" charset="0"/>
+                <a:cs typeface="Consolas" panose="020B0609020204030204" pitchFamily="49" charset="0"/>
+              </a:rPr>
+              <a:t>)</a:t>
+            </a:r>
+          </a:p>
+          <a:p>
+            <a:pPr marL="0" indent="0">
+              <a:buNone/>
+            </a:pPr>
+            <a:endParaRPr lang="en-US" sz="1800" dirty="0">
+              <a:latin typeface="Consolas" panose="020B0609020204030204" pitchFamily="49" charset="0"/>
+              <a:cs typeface="Consolas" panose="020B0609020204030204" pitchFamily="49" charset="0"/>
+            </a:endParaRPr>
+          </a:p>
+          <a:p>
+            <a:pPr marL="0" indent="0">
+              <a:buNone/>
+            </a:pPr>
+            <a:r>
+              <a:rPr lang="en-US" sz="1800" dirty="0" smtClean="0">
+                <a:latin typeface="Consolas" panose="020B0609020204030204" pitchFamily="49" charset="0"/>
+                <a:cs typeface="Consolas" panose="020B0609020204030204" pitchFamily="49" charset="0"/>
+              </a:rPr>
+              <a:t>    </a:t>
+            </a:r>
+            <a:r>
+              <a:rPr lang="en-US" sz="1800" b="1" dirty="0" err="1">
+                <a:solidFill>
+                  <a:srgbClr val="7F0055"/>
+                </a:solidFill>
+                <a:latin typeface="Consolas" panose="020B0609020204030204" pitchFamily="49" charset="0"/>
+                <a:cs typeface="Consolas" panose="020B0609020204030204" pitchFamily="49" charset="0"/>
+              </a:rPr>
+              <a:t>def</a:t>
+            </a:r>
+            <a:r>
+              <a:rPr lang="en-US" sz="1800" dirty="0" smtClean="0">
+                <a:latin typeface="Consolas" panose="020B0609020204030204" pitchFamily="49" charset="0"/>
+                <a:cs typeface="Consolas" panose="020B0609020204030204" pitchFamily="49" charset="0"/>
+              </a:rPr>
+              <a:t> </a:t>
+            </a:r>
+            <a:r>
+              <a:rPr lang="en-US" sz="1800" dirty="0">
+                <a:latin typeface="Consolas" panose="020B0609020204030204" pitchFamily="49" charset="0"/>
+                <a:cs typeface="Consolas" panose="020B0609020204030204" pitchFamily="49" charset="0"/>
+              </a:rPr>
+              <a:t>map[X](f: O =&gt; X): Component[I, X] </a:t>
+            </a:r>
+            <a:r>
+              <a:rPr lang="en-US" sz="1800" dirty="0" smtClean="0">
+                <a:latin typeface="Consolas" panose="020B0609020204030204" pitchFamily="49" charset="0"/>
+                <a:cs typeface="Consolas" panose="020B0609020204030204" pitchFamily="49" charset="0"/>
+              </a:rPr>
+              <a:t>= </a:t>
+            </a:r>
+            <a:r>
+              <a:rPr lang="en-US" sz="1800" b="1" dirty="0">
+                <a:solidFill>
+                  <a:srgbClr val="7F0055"/>
+                </a:solidFill>
+                <a:latin typeface="Consolas" panose="020B0609020204030204" pitchFamily="49" charset="0"/>
+                <a:cs typeface="Consolas" panose="020B0609020204030204" pitchFamily="49" charset="0"/>
+              </a:rPr>
+              <a:t>this</a:t>
+            </a:r>
+            <a:r>
+              <a:rPr lang="en-US" sz="1800" dirty="0" smtClean="0">
+                <a:latin typeface="Consolas" panose="020B0609020204030204" pitchFamily="49" charset="0"/>
+                <a:cs typeface="Consolas" panose="020B0609020204030204" pitchFamily="49" charset="0"/>
+              </a:rPr>
+              <a:t> </a:t>
+            </a:r>
+            <a:r>
+              <a:rPr lang="en-US" sz="1800" dirty="0">
+                <a:latin typeface="Consolas" panose="020B0609020204030204" pitchFamily="49" charset="0"/>
+                <a:cs typeface="Consolas" panose="020B0609020204030204" pitchFamily="49" charset="0"/>
+              </a:rPr>
+              <a:t>&gt;&gt;&gt; </a:t>
+            </a:r>
+            <a:r>
+              <a:rPr lang="en-US" sz="1800" dirty="0" smtClean="0">
+                <a:latin typeface="Consolas" panose="020B0609020204030204" pitchFamily="49" charset="0"/>
+                <a:cs typeface="Consolas" panose="020B0609020204030204" pitchFamily="49" charset="0"/>
+              </a:rPr>
+              <a:t>create(f</a:t>
+            </a:r>
+            <a:r>
+              <a:rPr lang="en-US" sz="1800" dirty="0">
+                <a:latin typeface="Consolas" panose="020B0609020204030204" pitchFamily="49" charset="0"/>
+                <a:cs typeface="Consolas" panose="020B0609020204030204" pitchFamily="49" charset="0"/>
+              </a:rPr>
+              <a:t>)</a:t>
+            </a:r>
+          </a:p>
+          <a:p>
+            <a:pPr marL="0" indent="0">
+              <a:buNone/>
+            </a:pPr>
+            <a:endParaRPr lang="en-US" sz="1800" dirty="0" smtClean="0">
+              <a:latin typeface="Consolas" panose="020B0609020204030204" pitchFamily="49" charset="0"/>
+              <a:cs typeface="Consolas" panose="020B0609020204030204" pitchFamily="49" charset="0"/>
+            </a:endParaRPr>
+          </a:p>
+          <a:p>
+            <a:pPr marL="0" indent="0">
+              <a:buNone/>
+            </a:pPr>
+            <a:r>
+              <a:rPr lang="en-US" sz="1800" dirty="0">
+                <a:latin typeface="Consolas" panose="020B0609020204030204" pitchFamily="49" charset="0"/>
+                <a:cs typeface="Consolas" panose="020B0609020204030204" pitchFamily="49" charset="0"/>
+              </a:rPr>
+              <a:t> </a:t>
+            </a:r>
+            <a:r>
+              <a:rPr lang="en-US" sz="1800" dirty="0" smtClean="0">
+                <a:latin typeface="Consolas" panose="020B0609020204030204" pitchFamily="49" charset="0"/>
+                <a:cs typeface="Consolas" panose="020B0609020204030204" pitchFamily="49" charset="0"/>
+              </a:rPr>
+              <a:t>   </a:t>
+            </a:r>
+            <a:r>
+              <a:rPr lang="en-US" sz="1800" dirty="0">
+                <a:solidFill>
+                  <a:srgbClr val="3F7F5F"/>
+                </a:solidFill>
+                <a:latin typeface="Consolas" panose="020B0609020204030204" pitchFamily="49" charset="0"/>
+                <a:cs typeface="Consolas" panose="020B0609020204030204" pitchFamily="49" charset="0"/>
+              </a:rPr>
+              <a:t>// many more operators</a:t>
+            </a:r>
+          </a:p>
+          <a:p>
+            <a:pPr marL="0" indent="0">
+              <a:buNone/>
+            </a:pPr>
+            <a:r>
+              <a:rPr lang="en-US" sz="1800" dirty="0" smtClean="0">
+                <a:latin typeface="Consolas" panose="020B0609020204030204" pitchFamily="49" charset="0"/>
+                <a:cs typeface="Consolas" panose="020B0609020204030204" pitchFamily="49" charset="0"/>
+              </a:rPr>
+              <a:t>}</a:t>
+            </a:r>
+          </a:p>
+          <a:p>
+            <a:pPr marL="0" indent="0">
+              <a:buNone/>
+            </a:pPr>
+            <a:r>
+              <a:rPr lang="en-US" sz="1800" b="1" dirty="0" smtClean="0">
+                <a:solidFill>
+                  <a:srgbClr val="7F0055"/>
+                </a:solidFill>
+                <a:latin typeface="Consolas" panose="020B0609020204030204" pitchFamily="49" charset="0"/>
+                <a:cs typeface="Consolas" panose="020B0609020204030204" pitchFamily="49" charset="0"/>
+              </a:rPr>
+              <a:t>object</a:t>
+            </a:r>
+            <a:r>
+              <a:rPr lang="en-US" sz="1800" dirty="0" smtClean="0">
+                <a:latin typeface="Consolas" panose="020B0609020204030204" pitchFamily="49" charset="0"/>
+                <a:cs typeface="Consolas" panose="020B0609020204030204" pitchFamily="49" charset="0"/>
+              </a:rPr>
+              <a:t> Component {</a:t>
+            </a:r>
+          </a:p>
+          <a:p>
+            <a:pPr marL="0" indent="0">
+              <a:buNone/>
+            </a:pPr>
+            <a:r>
+              <a:rPr lang="en-US" sz="1800" dirty="0">
+                <a:latin typeface="Consolas" panose="020B0609020204030204" pitchFamily="49" charset="0"/>
+                <a:cs typeface="Consolas" panose="020B0609020204030204" pitchFamily="49" charset="0"/>
+              </a:rPr>
+              <a:t>    </a:t>
+            </a:r>
+            <a:r>
+              <a:rPr lang="en-US" sz="1800" b="1" dirty="0" err="1">
+                <a:solidFill>
+                  <a:srgbClr val="7F0055"/>
+                </a:solidFill>
+                <a:latin typeface="Consolas" panose="020B0609020204030204" pitchFamily="49" charset="0"/>
+                <a:cs typeface="Consolas" panose="020B0609020204030204" pitchFamily="49" charset="0"/>
+              </a:rPr>
+              <a:t>def</a:t>
+            </a:r>
+            <a:r>
+              <a:rPr lang="en-US" sz="1800" dirty="0">
+                <a:latin typeface="Consolas" panose="020B0609020204030204" pitchFamily="49" charset="0"/>
+                <a:cs typeface="Consolas" panose="020B0609020204030204" pitchFamily="49" charset="0"/>
+              </a:rPr>
+              <a:t> create[I, O](f: I =&gt; O): Component[I, O] </a:t>
+            </a:r>
+            <a:r>
+              <a:rPr lang="en-US" sz="1800" dirty="0" smtClean="0">
+                <a:latin typeface="Consolas" panose="020B0609020204030204" pitchFamily="49" charset="0"/>
+                <a:cs typeface="Consolas" panose="020B0609020204030204" pitchFamily="49" charset="0"/>
+              </a:rPr>
+              <a:t>=</a:t>
+            </a:r>
+            <a:endParaRPr lang="en-US" sz="1800" dirty="0">
+              <a:latin typeface="Consolas" panose="020B0609020204030204" pitchFamily="49" charset="0"/>
+              <a:cs typeface="Consolas" panose="020B0609020204030204" pitchFamily="49" charset="0"/>
+            </a:endParaRPr>
+          </a:p>
+          <a:p>
+            <a:pPr marL="0" indent="0">
+              <a:buNone/>
+            </a:pPr>
+            <a:r>
+              <a:rPr lang="en-US" sz="1800" dirty="0" smtClean="0">
+                <a:latin typeface="Consolas" panose="020B0609020204030204" pitchFamily="49" charset="0"/>
+                <a:cs typeface="Consolas" panose="020B0609020204030204" pitchFamily="49" charset="0"/>
+              </a:rPr>
+              <a:t>        </a:t>
+            </a:r>
+            <a:r>
+              <a:rPr lang="en-US" sz="1800" b="1" dirty="0">
+                <a:solidFill>
+                  <a:srgbClr val="7F0055"/>
+                </a:solidFill>
+                <a:latin typeface="Consolas" panose="020B0609020204030204" pitchFamily="49" charset="0"/>
+                <a:cs typeface="Consolas" panose="020B0609020204030204" pitchFamily="49" charset="0"/>
+              </a:rPr>
+              <a:t>new</a:t>
+            </a:r>
+            <a:r>
+              <a:rPr lang="en-US" sz="1800" dirty="0" smtClean="0">
+                <a:latin typeface="Consolas" panose="020B0609020204030204" pitchFamily="49" charset="0"/>
+                <a:cs typeface="Consolas" panose="020B0609020204030204" pitchFamily="49" charset="0"/>
+              </a:rPr>
+              <a:t> Component</a:t>
+            </a:r>
+            <a:r>
+              <a:rPr lang="en-US" sz="1800" dirty="0">
+                <a:latin typeface="Consolas" panose="020B0609020204030204" pitchFamily="49" charset="0"/>
+                <a:cs typeface="Consolas" panose="020B0609020204030204" pitchFamily="49" charset="0"/>
+              </a:rPr>
+              <a:t>(_ map f</a:t>
+            </a:r>
+            <a:r>
+              <a:rPr lang="en-US" sz="1800" dirty="0" smtClean="0">
+                <a:latin typeface="Consolas" panose="020B0609020204030204" pitchFamily="49" charset="0"/>
+                <a:cs typeface="Consolas" panose="020B0609020204030204" pitchFamily="49" charset="0"/>
+              </a:rPr>
+              <a:t>)</a:t>
+            </a:r>
+          </a:p>
+          <a:p>
+            <a:pPr marL="0" indent="0">
+              <a:buNone/>
+            </a:pPr>
+            <a:r>
+              <a:rPr lang="en-US" sz="1800" dirty="0">
+                <a:latin typeface="Consolas" panose="020B0609020204030204" pitchFamily="49" charset="0"/>
+                <a:cs typeface="Consolas" panose="020B0609020204030204" pitchFamily="49" charset="0"/>
+              </a:rPr>
+              <a:t>}</a:t>
+            </a:r>
+            <a:endParaRPr lang="nl-NL" sz="1800" dirty="0">
+              <a:latin typeface="Consolas" panose="020B0609020204030204" pitchFamily="49" charset="0"/>
+              <a:cs typeface="Consolas" panose="020B0609020204030204" pitchFamily="49" charset="0"/>
+            </a:endParaRPr>
           </a:p>
         </p:txBody>
       </p:sp>
@@ -11685,12 +13532,12 @@
             <a:avLst/>
           </a:prstGeom>
           <a:blipFill dpi="0" rotWithShape="1">
-            <a:blip r:embed="rId2">
+            <a:blip r:embed="rId3">
               <a:alphaModFix amt="70000"/>
               <a:extLst>
                 <a:ext uri="{BEBA8EAE-BF5A-486C-A8C5-ECC9F3942E4B}">
                   <a14:imgProps xmlns:a14="http://schemas.microsoft.com/office/drawing/2010/main">
-                    <a14:imgLayer r:embed="rId3">
+                    <a14:imgLayer r:embed="rId4">
                       <a14:imgEffect>
                         <a14:sharpenSoften amount="25000"/>
                       </a14:imgEffect>
@@ -11756,7 +13603,7 @@
             <a:avLst/>
           </a:prstGeom>
           <a:blipFill dpi="0" rotWithShape="1">
-            <a:blip r:embed="rId4"/>
+            <a:blip r:embed="rId5"/>
             <a:srcRect/>
             <a:stretch>
               <a:fillRect/>
@@ -11915,7 +13762,7 @@
         </p:nvSpPr>
         <p:spPr>
           <a:xfrm>
-            <a:off x="4648200" y="1600200"/>
+            <a:off x="4648200" y="1600201"/>
             <a:ext cx="4244400" cy="4525963"/>
           </a:xfrm>
         </p:spPr>
@@ -12404,6 +14251,668 @@
 </p:sld>
 </file>
 
+<file path=ppt/slides/slide20.xml><?xml version="1.0" encoding="utf-8"?>
+<p:sld xmlns:a="http://schemas.openxmlformats.org/drawingml/2006/main" xmlns:r="http://schemas.openxmlformats.org/officeDocument/2006/relationships" xmlns:p="http://schemas.openxmlformats.org/presentationml/2006/main">
+  <p:cSld>
+    <p:spTree>
+      <p:nvGrpSpPr>
+        <p:cNvPr id="1" name=""/>
+        <p:cNvGrpSpPr/>
+        <p:nvPr/>
+      </p:nvGrpSpPr>
+      <p:grpSpPr>
+        <a:xfrm>
+          <a:off x="0" y="0"/>
+          <a:ext cx="0" cy="0"/>
+          <a:chOff x="0" y="0"/>
+          <a:chExt cx="0" cy="0"/>
+        </a:xfrm>
+      </p:grpSpPr>
+      <p:sp>
+        <p:nvSpPr>
+          <p:cNvPr id="2" name="Titel 1"/>
+          <p:cNvSpPr>
+            <a:spLocks noGrp="1"/>
+          </p:cNvSpPr>
+          <p:nvPr>
+            <p:ph type="title"/>
+          </p:nvPr>
+        </p:nvSpPr>
+        <p:spPr/>
+        <p:txBody>
+          <a:bodyPr/>
+          <a:lstStyle/>
+          <a:p>
+            <a:r>
+              <a:rPr lang="nl-NL" dirty="0" smtClean="0"/>
+              <a:t>feedback4s</a:t>
+            </a:r>
+            <a:endParaRPr lang="nl-NL" dirty="0"/>
+          </a:p>
+        </p:txBody>
+      </p:sp>
+      <p:sp>
+        <p:nvSpPr>
+          <p:cNvPr id="4" name="Tijdelijke aanduiding voor datum 3"/>
+          <p:cNvSpPr>
+            <a:spLocks noGrp="1"/>
+          </p:cNvSpPr>
+          <p:nvPr>
+            <p:ph type="dt" sz="half" idx="10"/>
+          </p:nvPr>
+        </p:nvSpPr>
+        <p:spPr/>
+        <p:txBody>
+          <a:bodyPr/>
+          <a:lstStyle/>
+          <a:p>
+            <a:r>
+              <a:rPr lang="nl-NL" smtClean="0"/>
+              <a:t>2016-12-16</a:t>
+            </a:r>
+            <a:endParaRPr lang="nl-NL"/>
+          </a:p>
+        </p:txBody>
+      </p:sp>
+      <p:sp>
+        <p:nvSpPr>
+          <p:cNvPr id="5" name="Tijdelijke aanduiding voor voettekst 4"/>
+          <p:cNvSpPr>
+            <a:spLocks noGrp="1"/>
+          </p:cNvSpPr>
+          <p:nvPr>
+            <p:ph type="ftr" sz="quarter" idx="11"/>
+          </p:nvPr>
+        </p:nvSpPr>
+        <p:spPr/>
+        <p:txBody>
+          <a:bodyPr/>
+          <a:lstStyle/>
+          <a:p>
+            <a:r>
+              <a:rPr lang="nl-NL" smtClean="0"/>
+              <a:t>Master Thesis Defense</a:t>
+            </a:r>
+            <a:endParaRPr lang="nl-NL"/>
+          </a:p>
+        </p:txBody>
+      </p:sp>
+      <p:sp>
+        <p:nvSpPr>
+          <p:cNvPr id="6" name="Tijdelijke aanduiding voor dianummer 5"/>
+          <p:cNvSpPr>
+            <a:spLocks noGrp="1"/>
+          </p:cNvSpPr>
+          <p:nvPr>
+            <p:ph type="sldNum" sz="quarter" idx="12"/>
+          </p:nvPr>
+        </p:nvSpPr>
+        <p:spPr/>
+        <p:txBody>
+          <a:bodyPr/>
+          <a:lstStyle/>
+          <a:p>
+            <a:fld id="{8DAA958F-F7E5-4D37-8D07-9800021E7F9F}" type="slidenum">
+              <a:rPr lang="nl-NL" smtClean="0"/>
+              <a:t>19</a:t>
+            </a:fld>
+            <a:endParaRPr lang="nl-NL"/>
+          </a:p>
+        </p:txBody>
+      </p:sp>
+      <p:sp>
+        <p:nvSpPr>
+          <p:cNvPr id="7" name="Tekstvak 6"/>
+          <p:cNvSpPr txBox="1"/>
+          <p:nvPr/>
+        </p:nvSpPr>
+        <p:spPr>
+          <a:xfrm>
+            <a:off x="467544" y="1612180"/>
+            <a:ext cx="4392488" cy="1477328"/>
+          </a:xfrm>
+          <a:prstGeom prst="rect">
+            <a:avLst/>
+          </a:prstGeom>
+          <a:noFill/>
+        </p:spPr>
+        <p:txBody>
+          <a:bodyPr wrap="square" rtlCol="0">
+            <a:spAutoFit/>
+          </a:bodyPr>
+          <a:lstStyle/>
+          <a:p>
+            <a:r>
+              <a:rPr lang="nl-NL" dirty="0">
+                <a:solidFill>
+                  <a:srgbClr val="008080"/>
+                </a:solidFill>
+              </a:rPr>
+              <a:t>&lt;</a:t>
+            </a:r>
+            <a:r>
+              <a:rPr lang="nl-NL" dirty="0" err="1">
+                <a:solidFill>
+                  <a:srgbClr val="3F7F7F"/>
+                </a:solidFill>
+              </a:rPr>
+              <a:t>dependency</a:t>
+            </a:r>
+            <a:r>
+              <a:rPr lang="nl-NL" dirty="0">
+                <a:solidFill>
+                  <a:srgbClr val="008080"/>
+                </a:solidFill>
+              </a:rPr>
+              <a:t>&gt;</a:t>
+            </a:r>
+            <a:br>
+              <a:rPr lang="nl-NL" dirty="0">
+                <a:solidFill>
+                  <a:srgbClr val="008080"/>
+                </a:solidFill>
+              </a:rPr>
+            </a:br>
+            <a:r>
+              <a:rPr lang="nl-NL" dirty="0">
+                <a:solidFill>
+                  <a:srgbClr val="008080"/>
+                </a:solidFill>
+              </a:rPr>
+              <a:t>   &lt;</a:t>
+            </a:r>
+            <a:r>
+              <a:rPr lang="nl-NL" dirty="0" err="1">
+                <a:solidFill>
+                  <a:srgbClr val="3F7F7F"/>
+                </a:solidFill>
+              </a:rPr>
+              <a:t>groupId</a:t>
+            </a:r>
+            <a:r>
+              <a:rPr lang="nl-NL" dirty="0">
+                <a:solidFill>
+                  <a:srgbClr val="008080"/>
+                </a:solidFill>
+              </a:rPr>
+              <a:t>&gt;</a:t>
+            </a:r>
+            <a:r>
+              <a:rPr lang="nl-NL" dirty="0" err="1"/>
+              <a:t>com.github.rvanheest</a:t>
+            </a:r>
+            <a:r>
+              <a:rPr lang="nl-NL" dirty="0">
+                <a:solidFill>
+                  <a:srgbClr val="008080"/>
+                </a:solidFill>
+              </a:rPr>
+              <a:t>&lt;/</a:t>
+            </a:r>
+            <a:r>
+              <a:rPr lang="nl-NL" dirty="0" err="1">
+                <a:solidFill>
+                  <a:srgbClr val="3F7F7F"/>
+                </a:solidFill>
+              </a:rPr>
+              <a:t>groupId</a:t>
+            </a:r>
+            <a:r>
+              <a:rPr lang="nl-NL" dirty="0">
+                <a:solidFill>
+                  <a:srgbClr val="008080"/>
+                </a:solidFill>
+              </a:rPr>
+              <a:t>&gt;</a:t>
+            </a:r>
+            <a:br>
+              <a:rPr lang="nl-NL" dirty="0">
+                <a:solidFill>
+                  <a:srgbClr val="008080"/>
+                </a:solidFill>
+              </a:rPr>
+            </a:br>
+            <a:r>
+              <a:rPr lang="nl-NL" dirty="0">
+                <a:solidFill>
+                  <a:srgbClr val="008080"/>
+                </a:solidFill>
+              </a:rPr>
+              <a:t>   &lt;</a:t>
+            </a:r>
+            <a:r>
+              <a:rPr lang="nl-NL" dirty="0" err="1">
+                <a:solidFill>
+                  <a:srgbClr val="3F7F7F"/>
+                </a:solidFill>
+              </a:rPr>
+              <a:t>artifactId</a:t>
+            </a:r>
+            <a:r>
+              <a:rPr lang="nl-NL" dirty="0">
+                <a:solidFill>
+                  <a:srgbClr val="008080"/>
+                </a:solidFill>
+              </a:rPr>
+              <a:t>&gt;</a:t>
+            </a:r>
+            <a:r>
+              <a:rPr lang="nl-NL" dirty="0"/>
+              <a:t>feedback4s</a:t>
+            </a:r>
+            <a:r>
+              <a:rPr lang="nl-NL" dirty="0">
+                <a:solidFill>
+                  <a:srgbClr val="008080"/>
+                </a:solidFill>
+              </a:rPr>
+              <a:t>&lt;/</a:t>
+            </a:r>
+            <a:r>
+              <a:rPr lang="nl-NL" dirty="0" err="1">
+                <a:solidFill>
+                  <a:srgbClr val="3F7F7F"/>
+                </a:solidFill>
+              </a:rPr>
+              <a:t>artifactId</a:t>
+            </a:r>
+            <a:r>
+              <a:rPr lang="nl-NL" dirty="0">
+                <a:solidFill>
+                  <a:srgbClr val="008080"/>
+                </a:solidFill>
+              </a:rPr>
+              <a:t>&gt;</a:t>
+            </a:r>
+            <a:br>
+              <a:rPr lang="nl-NL" dirty="0">
+                <a:solidFill>
+                  <a:srgbClr val="008080"/>
+                </a:solidFill>
+              </a:rPr>
+            </a:br>
+            <a:r>
+              <a:rPr lang="nl-NL" dirty="0">
+                <a:solidFill>
+                  <a:srgbClr val="008080"/>
+                </a:solidFill>
+              </a:rPr>
+              <a:t>   &lt;</a:t>
+            </a:r>
+            <a:r>
+              <a:rPr lang="nl-NL" dirty="0" err="1">
+                <a:solidFill>
+                  <a:srgbClr val="3F7F7F"/>
+                </a:solidFill>
+              </a:rPr>
+              <a:t>version</a:t>
+            </a:r>
+            <a:r>
+              <a:rPr lang="nl-NL" dirty="0">
+                <a:solidFill>
+                  <a:srgbClr val="008080"/>
+                </a:solidFill>
+              </a:rPr>
+              <a:t>&gt;</a:t>
+            </a:r>
+            <a:r>
+              <a:rPr lang="nl-NL" dirty="0"/>
+              <a:t>1.0</a:t>
+            </a:r>
+            <a:r>
+              <a:rPr lang="nl-NL" dirty="0">
+                <a:solidFill>
+                  <a:srgbClr val="008080"/>
+                </a:solidFill>
+              </a:rPr>
+              <a:t>&lt;/</a:t>
+            </a:r>
+            <a:r>
+              <a:rPr lang="nl-NL" dirty="0" err="1">
+                <a:solidFill>
+                  <a:srgbClr val="3F7F7F"/>
+                </a:solidFill>
+              </a:rPr>
+              <a:t>version</a:t>
+            </a:r>
+            <a:r>
+              <a:rPr lang="nl-NL" dirty="0">
+                <a:solidFill>
+                  <a:srgbClr val="008080"/>
+                </a:solidFill>
+              </a:rPr>
+              <a:t>&gt;</a:t>
+            </a:r>
+            <a:br>
+              <a:rPr lang="nl-NL" dirty="0">
+                <a:solidFill>
+                  <a:srgbClr val="008080"/>
+                </a:solidFill>
+              </a:rPr>
+            </a:br>
+            <a:r>
+              <a:rPr lang="nl-NL" dirty="0">
+                <a:solidFill>
+                  <a:srgbClr val="008080"/>
+                </a:solidFill>
+              </a:rPr>
+              <a:t>&lt;/</a:t>
+            </a:r>
+            <a:r>
+              <a:rPr lang="nl-NL" dirty="0" err="1">
+                <a:solidFill>
+                  <a:srgbClr val="3F7F7F"/>
+                </a:solidFill>
+              </a:rPr>
+              <a:t>dependency</a:t>
+            </a:r>
+            <a:r>
+              <a:rPr lang="nl-NL" dirty="0">
+                <a:solidFill>
+                  <a:srgbClr val="008080"/>
+                </a:solidFill>
+              </a:rPr>
+              <a:t>&gt;</a:t>
+            </a:r>
+            <a:endParaRPr lang="nl-NL" dirty="0"/>
+          </a:p>
+        </p:txBody>
+      </p:sp>
+      <p:sp>
+        <p:nvSpPr>
+          <p:cNvPr id="8" name="Tekstvak 7"/>
+          <p:cNvSpPr txBox="1"/>
+          <p:nvPr/>
+        </p:nvSpPr>
+        <p:spPr>
+          <a:xfrm>
+            <a:off x="467633" y="3203684"/>
+            <a:ext cx="4104456" cy="369332"/>
+          </a:xfrm>
+          <a:prstGeom prst="rect">
+            <a:avLst/>
+          </a:prstGeom>
+          <a:noFill/>
+        </p:spPr>
+        <p:txBody>
+          <a:bodyPr wrap="square" rtlCol="0">
+            <a:spAutoFit/>
+          </a:bodyPr>
+          <a:lstStyle/>
+          <a:p>
+            <a:r>
+              <a:rPr lang="nl-NL" dirty="0">
+                <a:hlinkClick r:id="rId2"/>
+              </a:rPr>
+              <a:t>https://</a:t>
+            </a:r>
+            <a:r>
+              <a:rPr lang="nl-NL" dirty="0" smtClean="0">
+                <a:hlinkClick r:id="rId2"/>
+              </a:rPr>
+              <a:t>github.com/rvanheest/feedback4s</a:t>
+            </a:r>
+            <a:endParaRPr lang="nl-NL" dirty="0"/>
+          </a:p>
+        </p:txBody>
+      </p:sp>
+      <p:sp>
+        <p:nvSpPr>
+          <p:cNvPr id="10" name="Tekstvak 9"/>
+          <p:cNvSpPr txBox="1"/>
+          <p:nvPr/>
+        </p:nvSpPr>
+        <p:spPr>
+          <a:xfrm>
+            <a:off x="467544" y="3707740"/>
+            <a:ext cx="3888432" cy="369332"/>
+          </a:xfrm>
+          <a:prstGeom prst="rect">
+            <a:avLst/>
+          </a:prstGeom>
+          <a:noFill/>
+        </p:spPr>
+        <p:txBody>
+          <a:bodyPr wrap="square" rtlCol="0">
+            <a:spAutoFit/>
+          </a:bodyPr>
+          <a:lstStyle/>
+          <a:p>
+            <a:r>
+              <a:rPr lang="nl-NL" dirty="0">
+                <a:hlinkClick r:id="rId3"/>
+              </a:rPr>
+              <a:t>http://</a:t>
+            </a:r>
+            <a:r>
+              <a:rPr lang="nl-NL" dirty="0" smtClean="0">
+                <a:hlinkClick r:id="rId3"/>
+              </a:rPr>
+              <a:t>doi.org/10.5281/zenodo.169095</a:t>
+            </a:r>
+            <a:endParaRPr lang="nl-NL" dirty="0"/>
+          </a:p>
+        </p:txBody>
+      </p:sp>
+    </p:spTree>
+    <p:extLst>
+      <p:ext uri="{BB962C8B-B14F-4D97-AF65-F5344CB8AC3E}">
+        <p14:creationId xmlns:p14="http://schemas.microsoft.com/office/powerpoint/2010/main" val="1152219143"/>
+      </p:ext>
+    </p:extLst>
+  </p:cSld>
+  <p:clrMapOvr>
+    <a:masterClrMapping/>
+  </p:clrMapOvr>
+  <p:timing>
+    <p:tnLst>
+      <p:par>
+        <p:cTn id="1" dur="indefinite" restart="never" nodeType="tmRoot"/>
+      </p:par>
+    </p:tnLst>
+  </p:timing>
+</p:sld>
+</file>
+
+<file path=ppt/slides/slide21.xml><?xml version="1.0" encoding="utf-8"?>
+<p:sld xmlns:a="http://schemas.openxmlformats.org/drawingml/2006/main" xmlns:r="http://schemas.openxmlformats.org/officeDocument/2006/relationships" xmlns:p="http://schemas.openxmlformats.org/presentationml/2006/main">
+  <p:cSld>
+    <p:spTree>
+      <p:nvGrpSpPr>
+        <p:cNvPr id="1" name=""/>
+        <p:cNvGrpSpPr/>
+        <p:nvPr/>
+      </p:nvGrpSpPr>
+      <p:grpSpPr>
+        <a:xfrm>
+          <a:off x="0" y="0"/>
+          <a:ext cx="0" cy="0"/>
+          <a:chOff x="0" y="0"/>
+          <a:chExt cx="0" cy="0"/>
+        </a:xfrm>
+      </p:grpSpPr>
+      <p:pic>
+        <p:nvPicPr>
+          <p:cNvPr id="10" name="Picture 2" descr="G:\Richard van Heest\TU Delft\Jaar 4\IN5000 Master Thesis\Report and Presentation\report\figures\BallTracker-moving.png"/>
+          <p:cNvPicPr>
+            <a:picLocks noGrp="1" noChangeAspect="1" noChangeArrowheads="1"/>
+          </p:cNvPicPr>
+          <p:nvPr>
+            <p:ph sz="half" idx="1"/>
+          </p:nvPr>
+        </p:nvPicPr>
+        <p:blipFill rotWithShape="1">
+          <a:blip r:embed="rId2">
+            <a:extLst>
+              <a:ext uri="{28A0092B-C50C-407E-A947-70E740481C1C}">
+                <a14:useLocalDpi xmlns:a14="http://schemas.microsoft.com/office/drawing/2010/main" val="0"/>
+              </a:ext>
+            </a:extLst>
+          </a:blip>
+          <a:srcRect r="15234" b="41218"/>
+          <a:stretch/>
+        </p:blipFill>
+        <p:spPr bwMode="auto">
+          <a:xfrm>
+            <a:off x="0" y="0"/>
+            <a:ext cx="9144000" cy="4755760"/>
+          </a:xfrm>
+          <a:prstGeom prst="rect">
+            <a:avLst/>
+          </a:prstGeom>
+          <a:noFill/>
+          <a:extLst>
+            <a:ext uri="{909E8E84-426E-40DD-AFC4-6F175D3DCCD1}">
+              <a14:hiddenFill xmlns:a14="http://schemas.microsoft.com/office/drawing/2010/main">
+                <a:solidFill>
+                  <a:srgbClr val="FFFFFF"/>
+                </a:solidFill>
+              </a14:hiddenFill>
+            </a:ext>
+          </a:extLst>
+        </p:spPr>
+      </p:pic>
+      <p:sp>
+        <p:nvSpPr>
+          <p:cNvPr id="2" name="Titel 1"/>
+          <p:cNvSpPr>
+            <a:spLocks noGrp="1"/>
+          </p:cNvSpPr>
+          <p:nvPr>
+            <p:ph type="title"/>
+          </p:nvPr>
+        </p:nvSpPr>
+        <p:spPr/>
+        <p:txBody>
+          <a:bodyPr/>
+          <a:lstStyle/>
+          <a:p>
+            <a:r>
+              <a:rPr lang="nl-NL" dirty="0" smtClean="0"/>
+              <a:t>Demo</a:t>
+            </a:r>
+            <a:endParaRPr lang="nl-NL" dirty="0"/>
+          </a:p>
+        </p:txBody>
+      </p:sp>
+      <p:sp>
+        <p:nvSpPr>
+          <p:cNvPr id="4" name="Tijdelijke aanduiding voor datum 3"/>
+          <p:cNvSpPr>
+            <a:spLocks noGrp="1"/>
+          </p:cNvSpPr>
+          <p:nvPr>
+            <p:ph type="dt" sz="half" idx="10"/>
+          </p:nvPr>
+        </p:nvSpPr>
+        <p:spPr/>
+        <p:txBody>
+          <a:bodyPr/>
+          <a:lstStyle/>
+          <a:p>
+            <a:r>
+              <a:rPr lang="nl-NL" smtClean="0"/>
+              <a:t>2016-12-16</a:t>
+            </a:r>
+            <a:endParaRPr lang="nl-NL"/>
+          </a:p>
+        </p:txBody>
+      </p:sp>
+      <p:sp>
+        <p:nvSpPr>
+          <p:cNvPr id="5" name="Tijdelijke aanduiding voor voettekst 4"/>
+          <p:cNvSpPr>
+            <a:spLocks noGrp="1"/>
+          </p:cNvSpPr>
+          <p:nvPr>
+            <p:ph type="ftr" sz="quarter" idx="11"/>
+          </p:nvPr>
+        </p:nvSpPr>
+        <p:spPr/>
+        <p:txBody>
+          <a:bodyPr/>
+          <a:lstStyle/>
+          <a:p>
+            <a:r>
+              <a:rPr lang="nl-NL" smtClean="0"/>
+              <a:t>Master Thesis Defense</a:t>
+            </a:r>
+            <a:endParaRPr lang="nl-NL"/>
+          </a:p>
+        </p:txBody>
+      </p:sp>
+      <p:sp>
+        <p:nvSpPr>
+          <p:cNvPr id="6" name="Tijdelijke aanduiding voor dianummer 5"/>
+          <p:cNvSpPr>
+            <a:spLocks noGrp="1"/>
+          </p:cNvSpPr>
+          <p:nvPr>
+            <p:ph type="sldNum" sz="quarter" idx="12"/>
+          </p:nvPr>
+        </p:nvSpPr>
+        <p:spPr/>
+        <p:txBody>
+          <a:bodyPr/>
+          <a:lstStyle/>
+          <a:p>
+            <a:fld id="{8DAA958F-F7E5-4D37-8D07-9800021E7F9F}" type="slidenum">
+              <a:rPr lang="nl-NL" smtClean="0"/>
+              <a:t>20</a:t>
+            </a:fld>
+            <a:endParaRPr lang="nl-NL"/>
+          </a:p>
+        </p:txBody>
+      </p:sp>
+      <p:pic>
+        <p:nvPicPr>
+          <p:cNvPr id="11" name="Tijdelijke aanduiding voor inhoud 10"/>
+          <p:cNvPicPr>
+            <a:picLocks noGrp="1" noChangeAspect="1"/>
+          </p:cNvPicPr>
+          <p:nvPr>
+            <p:ph sz="half" idx="2"/>
+          </p:nvPr>
+        </p:nvPicPr>
+        <p:blipFill>
+          <a:blip r:embed="rId3" cstate="print">
+            <a:extLst>
+              <a:ext uri="{28A0092B-C50C-407E-A947-70E740481C1C}">
+                <a14:useLocalDpi xmlns:a14="http://schemas.microsoft.com/office/drawing/2010/main" val="0"/>
+              </a:ext>
+            </a:extLst>
+          </a:blip>
+          <a:stretch>
+            <a:fillRect/>
+          </a:stretch>
+        </p:blipFill>
+        <p:spPr>
+          <a:xfrm>
+            <a:off x="207776" y="4437112"/>
+            <a:ext cx="8728449" cy="1838573"/>
+          </a:xfrm>
+        </p:spPr>
+      </p:pic>
+    </p:spTree>
+    <p:extLst>
+      <p:ext uri="{BB962C8B-B14F-4D97-AF65-F5344CB8AC3E}">
+        <p14:creationId xmlns:p14="http://schemas.microsoft.com/office/powerpoint/2010/main" val="2714251617"/>
+      </p:ext>
+    </p:extLst>
+  </p:cSld>
+  <p:clrMapOvr>
+    <a:masterClrMapping/>
+  </p:clrMapOvr>
+  <p:timing>
+    <p:tnLst>
+      <p:par>
+        <p:cTn id="1" dur="indefinite" restart="never" nodeType="tmRoot"/>
+      </p:par>
+    </p:tnLst>
+  </p:timing>
+</p:sld>
+</file>
+
 <file path=ppt/slides/slide3.xml><?xml version="1.0" encoding="utf-8"?>
 <p:sld xmlns:a="http://schemas.openxmlformats.org/drawingml/2006/main" xmlns:r="http://schemas.openxmlformats.org/officeDocument/2006/relationships" xmlns:p="http://schemas.openxmlformats.org/presentationml/2006/main">
   <p:cSld>
@@ -13408,7 +15917,7 @@
         </p:nvSpPr>
         <p:spPr>
           <a:xfrm>
-            <a:off x="457200" y="1600200"/>
+            <a:off x="457200" y="1600201"/>
             <a:ext cx="4038600" cy="5141168"/>
           </a:xfrm>
         </p:spPr>
@@ -14025,7 +16534,7 @@
               <a:t>(</a:t>
             </a:r>
             <a:r>
-              <a:rPr lang="nl-NL" sz="1800" dirty="0" err="1">
+              <a:rPr lang="nl-NL" sz="1800" i="1" dirty="0" err="1">
                 <a:latin typeface="Consolas" panose="020B0609020204030204" pitchFamily="49" charset="0"/>
                 <a:cs typeface="Consolas" panose="020B0609020204030204" pitchFamily="49" charset="0"/>
               </a:rPr>
@@ -14515,7 +17024,7 @@
               <a:t>(</a:t>
             </a:r>
             <a:r>
-              <a:rPr lang="nl-NL" sz="1800" dirty="0" err="1" smtClean="0">
+              <a:rPr lang="nl-NL" sz="1800" i="1" dirty="0" err="1" smtClean="0">
                 <a:latin typeface="Consolas" panose="020B0609020204030204" pitchFamily="49" charset="0"/>
                 <a:cs typeface="Consolas" panose="020B0609020204030204" pitchFamily="49" charset="0"/>
               </a:rPr>
@@ -14678,7 +17187,7 @@
         </p:nvGraphicFramePr>
         <p:xfrm>
           <a:off x="1290464" y="2377440"/>
-          <a:ext cx="6563072" cy="2103120"/>
+          <a:ext cx="6563072" cy="3931920"/>
         </p:xfrm>
         <a:graphic>
           <a:graphicData uri="http://schemas.openxmlformats.org/drawingml/2006/table">
@@ -14691,7 +17200,7 @@
                 <a:gridCol w="2232248"/>
                 <a:gridCol w="2304256"/>
               </a:tblGrid>
-              <a:tr h="370840">
+              <a:tr h="822960">
                 <a:tc>
                   <a:txBody>
                     <a:bodyPr/>
@@ -14734,7 +17243,7 @@
                   <a:tcPr anchor="ctr"/>
                 </a:tc>
               </a:tr>
-              <a:tr h="370840">
+              <a:tr h="1554480">
                 <a:tc>
                   <a:txBody>
                     <a:bodyPr/>
@@ -14819,7 +17328,7 @@
                   <a:tcPr anchor="ctr"/>
                 </a:tc>
               </a:tr>
-              <a:tr h="370840">
+              <a:tr h="1554480">
                 <a:tc>
                   <a:txBody>
                     <a:bodyPr/>
@@ -14991,11 +17500,11 @@
   <p:clrMapOvr>
     <a:masterClrMapping/>
   </p:clrMapOvr>
-  <mc:AlternateContent xmlns:mc="http://schemas.openxmlformats.org/markup-compatibility/2006">
-    <mc:Choice xmlns:p14="http://schemas.microsoft.com/office/powerpoint/2010/main" Requires="p14">
+  <mc:AlternateContent xmlns:mc="http://schemas.openxmlformats.org/markup-compatibility/2006" xmlns:p14="http://schemas.microsoft.com/office/powerpoint/2010/main">
+    <mc:Choice Requires="p14">
       <p:transition spd="slow" p14:dur="2000"/>
     </mc:Choice>
-    <mc:Fallback>
+    <mc:Fallback xmlns="">
       <p:transition spd="slow"/>
     </mc:Fallback>
   </mc:AlternateContent>
@@ -15065,7 +17574,7 @@
         </p:nvSpPr>
         <p:spPr>
           <a:xfrm>
-            <a:off x="4013938" y="1403484"/>
+            <a:off x="4013939" y="1403485"/>
             <a:ext cx="1116124" cy="369332"/>
           </a:xfrm>
           <a:prstGeom prst="rect">
@@ -15104,7 +17613,7 @@
         </p:nvCxnSpPr>
         <p:spPr>
           <a:xfrm>
-            <a:off x="4572000" y="1772816"/>
+            <a:off x="4572001" y="1772817"/>
             <a:ext cx="0" cy="3951148"/>
           </a:xfrm>
           <a:prstGeom prst="straightConnector1">
@@ -15140,7 +17649,7 @@
         </p:nvSpPr>
         <p:spPr>
           <a:xfrm>
-            <a:off x="4013938" y="5723964"/>
+            <a:off x="4013939" y="5723965"/>
             <a:ext cx="1116124" cy="369332"/>
           </a:xfrm>
           <a:prstGeom prst="rect">
@@ -15176,7 +17685,7 @@
         </p:nvSpPr>
         <p:spPr>
           <a:xfrm>
-            <a:off x="4427984" y="5157192"/>
+            <a:off x="4427984" y="5157193"/>
             <a:ext cx="288032" cy="288032"/>
           </a:xfrm>
           <a:prstGeom prst="ellipse">
@@ -15233,7 +17742,7 @@
         </p:nvSpPr>
         <p:spPr>
           <a:xfrm>
-            <a:off x="4427984" y="4797152"/>
+            <a:off x="4427984" y="4797153"/>
             <a:ext cx="288032" cy="288032"/>
           </a:xfrm>
           <a:prstGeom prst="ellipse">
@@ -15404,7 +17913,7 @@
         </p:nvSpPr>
         <p:spPr>
           <a:xfrm>
-            <a:off x="4427984" y="4077072"/>
+            <a:off x="4427984" y="4077073"/>
             <a:ext cx="288032" cy="288032"/>
           </a:xfrm>
           <a:prstGeom prst="ellipse">
@@ -15461,7 +17970,7 @@
         </p:nvSpPr>
         <p:spPr>
           <a:xfrm>
-            <a:off x="4427984" y="3717032"/>
+            <a:off x="4427984" y="3717033"/>
             <a:ext cx="288032" cy="288032"/>
           </a:xfrm>
           <a:prstGeom prst="ellipse">
@@ -15632,7 +18141,7 @@
         </p:nvSpPr>
         <p:spPr>
           <a:xfrm>
-            <a:off x="6552220" y="3244334"/>
+            <a:off x="6552221" y="3244335"/>
             <a:ext cx="1116124" cy="369332"/>
           </a:xfrm>
           <a:prstGeom prst="rect">
@@ -15668,7 +18177,7 @@
         </p:nvSpPr>
         <p:spPr>
           <a:xfrm>
-            <a:off x="6552220" y="3244334"/>
+            <a:off x="6552221" y="3244335"/>
             <a:ext cx="1116124" cy="369332"/>
           </a:xfrm>
           <a:prstGeom prst="rect">
@@ -15704,7 +18213,7 @@
         </p:nvSpPr>
         <p:spPr>
           <a:xfrm>
-            <a:off x="6552220" y="3244334"/>
+            <a:off x="6552221" y="3244335"/>
             <a:ext cx="1116124" cy="369332"/>
           </a:xfrm>
           <a:prstGeom prst="rect">
@@ -15740,7 +18249,7 @@
         </p:nvSpPr>
         <p:spPr>
           <a:xfrm>
-            <a:off x="6552220" y="3244334"/>
+            <a:off x="6552221" y="3244335"/>
             <a:ext cx="1116124" cy="369332"/>
           </a:xfrm>
           <a:prstGeom prst="rect">
@@ -15776,7 +18285,7 @@
         </p:nvSpPr>
         <p:spPr>
           <a:xfrm>
-            <a:off x="6552220" y="3244334"/>
+            <a:off x="6552221" y="3244335"/>
             <a:ext cx="1116124" cy="369332"/>
           </a:xfrm>
           <a:prstGeom prst="rect">
@@ -15812,7 +18321,7 @@
         </p:nvSpPr>
         <p:spPr>
           <a:xfrm>
-            <a:off x="6552220" y="3244334"/>
+            <a:off x="6552221" y="3244335"/>
             <a:ext cx="1116124" cy="369332"/>
           </a:xfrm>
           <a:prstGeom prst="rect">
@@ -15848,7 +18357,7 @@
         </p:nvSpPr>
         <p:spPr>
           <a:xfrm>
-            <a:off x="6552220" y="3244334"/>
+            <a:off x="6552221" y="3244335"/>
             <a:ext cx="1116124" cy="369332"/>
           </a:xfrm>
           <a:prstGeom prst="rect">
@@ -15883,7 +18392,7 @@
         </p:nvSpPr>
         <p:spPr>
           <a:xfrm>
-            <a:off x="6552220" y="3240920"/>
+            <a:off x="6552221" y="3240921"/>
             <a:ext cx="1116124" cy="369332"/>
           </a:xfrm>
           <a:prstGeom prst="rect">
@@ -15919,7 +18428,7 @@
         </p:nvSpPr>
         <p:spPr>
           <a:xfrm>
-            <a:off x="6552220" y="3240920"/>
+            <a:off x="6552221" y="3240921"/>
             <a:ext cx="1116124" cy="369332"/>
           </a:xfrm>
           <a:prstGeom prst="rect">
@@ -15965,7 +18474,7 @@
         </p:xfrm>
         <a:graphic>
           <a:graphicData uri="http://schemas.openxmlformats.org/drawingml/2006/chart">
-            <c:chart xmlns:c="http://schemas.openxmlformats.org/drawingml/2006/chart" xmlns:r="http://schemas.openxmlformats.org/officeDocument/2006/relationships" r:id="rId2"/>
+            <c:chart xmlns:c="http://schemas.openxmlformats.org/drawingml/2006/chart" xmlns:r="http://schemas.openxmlformats.org/officeDocument/2006/relationships" r:id="rId3"/>
           </a:graphicData>
         </a:graphic>
       </p:graphicFrame>
@@ -15987,7 +18496,7 @@
         </p:xfrm>
         <a:graphic>
           <a:graphicData uri="http://schemas.openxmlformats.org/drawingml/2006/chart">
-            <c:chart xmlns:c="http://schemas.openxmlformats.org/drawingml/2006/chart" xmlns:r="http://schemas.openxmlformats.org/officeDocument/2006/relationships" r:id="rId3"/>
+            <c:chart xmlns:c="http://schemas.openxmlformats.org/drawingml/2006/chart" xmlns:r="http://schemas.openxmlformats.org/officeDocument/2006/relationships" r:id="rId4"/>
           </a:graphicData>
         </a:graphic>
       </p:graphicFrame>
@@ -16009,7 +18518,7 @@
         </p:xfrm>
         <a:graphic>
           <a:graphicData uri="http://schemas.openxmlformats.org/drawingml/2006/chart">
-            <c:chart xmlns:c="http://schemas.openxmlformats.org/drawingml/2006/chart" xmlns:r="http://schemas.openxmlformats.org/officeDocument/2006/relationships" r:id="rId4"/>
+            <c:chart xmlns:c="http://schemas.openxmlformats.org/drawingml/2006/chart" xmlns:r="http://schemas.openxmlformats.org/officeDocument/2006/relationships" r:id="rId5"/>
           </a:graphicData>
         </a:graphic>
       </p:graphicFrame>
@@ -16031,7 +18540,7 @@
         </p:xfrm>
         <a:graphic>
           <a:graphicData uri="http://schemas.openxmlformats.org/drawingml/2006/chart">
-            <c:chart xmlns:c="http://schemas.openxmlformats.org/drawingml/2006/chart" xmlns:r="http://schemas.openxmlformats.org/officeDocument/2006/relationships" r:id="rId5"/>
+            <c:chart xmlns:c="http://schemas.openxmlformats.org/drawingml/2006/chart" xmlns:r="http://schemas.openxmlformats.org/officeDocument/2006/relationships" r:id="rId6"/>
           </a:graphicData>
         </a:graphic>
       </p:graphicFrame>
@@ -16053,7 +18562,7 @@
         </p:xfrm>
         <a:graphic>
           <a:graphicData uri="http://schemas.openxmlformats.org/drawingml/2006/chart">
-            <c:chart xmlns:c="http://schemas.openxmlformats.org/drawingml/2006/chart" xmlns:r="http://schemas.openxmlformats.org/officeDocument/2006/relationships" r:id="rId6"/>
+            <c:chart xmlns:c="http://schemas.openxmlformats.org/drawingml/2006/chart" xmlns:r="http://schemas.openxmlformats.org/officeDocument/2006/relationships" r:id="rId7"/>
           </a:graphicData>
         </a:graphic>
       </p:graphicFrame>
@@ -16075,7 +18584,7 @@
         </p:xfrm>
         <a:graphic>
           <a:graphicData uri="http://schemas.openxmlformats.org/drawingml/2006/chart">
-            <c:chart xmlns:c="http://schemas.openxmlformats.org/drawingml/2006/chart" xmlns:r="http://schemas.openxmlformats.org/officeDocument/2006/relationships" r:id="rId7"/>
+            <c:chart xmlns:c="http://schemas.openxmlformats.org/drawingml/2006/chart" xmlns:r="http://schemas.openxmlformats.org/officeDocument/2006/relationships" r:id="rId8"/>
           </a:graphicData>
         </a:graphic>
       </p:graphicFrame>
@@ -16097,7 +18606,7 @@
         </p:xfrm>
         <a:graphic>
           <a:graphicData uri="http://schemas.openxmlformats.org/drawingml/2006/chart">
-            <c:chart xmlns:c="http://schemas.openxmlformats.org/drawingml/2006/chart" xmlns:r="http://schemas.openxmlformats.org/officeDocument/2006/relationships" r:id="rId8"/>
+            <c:chart xmlns:c="http://schemas.openxmlformats.org/drawingml/2006/chart" xmlns:r="http://schemas.openxmlformats.org/officeDocument/2006/relationships" r:id="rId9"/>
           </a:graphicData>
         </a:graphic>
       </p:graphicFrame>
@@ -16119,7 +18628,7 @@
         </p:xfrm>
         <a:graphic>
           <a:graphicData uri="http://schemas.openxmlformats.org/drawingml/2006/chart">
-            <c:chart xmlns:c="http://schemas.openxmlformats.org/drawingml/2006/chart" xmlns:r="http://schemas.openxmlformats.org/officeDocument/2006/relationships" r:id="rId9"/>
+            <c:chart xmlns:c="http://schemas.openxmlformats.org/drawingml/2006/chart" xmlns:r="http://schemas.openxmlformats.org/officeDocument/2006/relationships" r:id="rId10"/>
           </a:graphicData>
         </a:graphic>
       </p:graphicFrame>
@@ -16141,7 +18650,7 @@
         </p:xfrm>
         <a:graphic>
           <a:graphicData uri="http://schemas.openxmlformats.org/drawingml/2006/chart">
-            <c:chart xmlns:c="http://schemas.openxmlformats.org/drawingml/2006/chart" xmlns:r="http://schemas.openxmlformats.org/officeDocument/2006/relationships" r:id="rId10"/>
+            <c:chart xmlns:c="http://schemas.openxmlformats.org/drawingml/2006/chart" xmlns:r="http://schemas.openxmlformats.org/officeDocument/2006/relationships" r:id="rId11"/>
           </a:graphicData>
         </a:graphic>
       </p:graphicFrame>
@@ -18210,7 +20719,7 @@
         </p:blipFill>
         <p:spPr bwMode="auto">
           <a:xfrm>
-            <a:off x="458488" y="1732537"/>
+            <a:off x="458488" y="1732538"/>
             <a:ext cx="4036024" cy="1924489"/>
           </a:xfrm>
           <a:prstGeom prst="rect">
@@ -18252,7 +20761,7 @@
         </p:blipFill>
         <p:spPr bwMode="auto">
           <a:xfrm>
-            <a:off x="4649488" y="2904112"/>
+            <a:off x="4649488" y="2904113"/>
             <a:ext cx="4036024" cy="1924489"/>
           </a:xfrm>
           <a:prstGeom prst="rect">
@@ -18294,7 +20803,7 @@
         </p:blipFill>
         <p:spPr bwMode="auto">
           <a:xfrm>
-            <a:off x="458488" y="4068543"/>
+            <a:off x="458488" y="4068544"/>
             <a:ext cx="4036024" cy="1924489"/>
           </a:xfrm>
           <a:prstGeom prst="rect">
@@ -18710,7 +21219,7 @@
         <p:spPr bwMode="auto">
           <a:xfrm>
             <a:off x="1510839" y="1600200"/>
-            <a:ext cx="6122322" cy="5060254"/>
+            <a:ext cx="6122323" cy="5060254"/>
           </a:xfrm>
           <a:prstGeom prst="rect">
             <a:avLst/>
@@ -19384,4 +21893,289 @@
   <a:objectDefaults/>
   <a:extraClrSchemeLst/>
 </a:theme>
+</file>
+
+<file path=ppt/theme/theme3.xml><?xml version="1.0" encoding="utf-8"?>
+<a:theme xmlns:a="http://schemas.openxmlformats.org/drawingml/2006/main" name="Kantoorthema">
+  <a:themeElements>
+    <a:clrScheme name="Kantoor">
+      <a:dk1>
+        <a:sysClr val="windowText" lastClr="000000"/>
+      </a:dk1>
+      <a:lt1>
+        <a:sysClr val="window" lastClr="FFFFFF"/>
+      </a:lt1>
+      <a:dk2>
+        <a:srgbClr val="1F497D"/>
+      </a:dk2>
+      <a:lt2>
+        <a:srgbClr val="EEECE1"/>
+      </a:lt2>
+      <a:accent1>
+        <a:srgbClr val="4F81BD"/>
+      </a:accent1>
+      <a:accent2>
+        <a:srgbClr val="C0504D"/>
+      </a:accent2>
+      <a:accent3>
+        <a:srgbClr val="9BBB59"/>
+      </a:accent3>
+      <a:accent4>
+        <a:srgbClr val="8064A2"/>
+      </a:accent4>
+      <a:accent5>
+        <a:srgbClr val="4BACC6"/>
+      </a:accent5>
+      <a:accent6>
+        <a:srgbClr val="F79646"/>
+      </a:accent6>
+      <a:hlink>
+        <a:srgbClr val="0000FF"/>
+      </a:hlink>
+      <a:folHlink>
+        <a:srgbClr val="800080"/>
+      </a:folHlink>
+    </a:clrScheme>
+    <a:fontScheme name="Kantoor">
+      <a:majorFont>
+        <a:latin typeface="Calibri"/>
+        <a:ea typeface=""/>
+        <a:cs typeface=""/>
+        <a:font script="Jpan" typeface="ＭＳ Ｐゴシック"/>
+        <a:font script="Hang" typeface="맑은 고딕"/>
+        <a:font script="Hans" typeface="宋体"/>
+        <a:font script="Hant" typeface="新細明體"/>
+        <a:font script="Arab" typeface="Times New Roman"/>
+        <a:font script="Hebr" typeface="Times New Roman"/>
+        <a:font script="Thai" typeface="Angsana New"/>
+        <a:font script="Ethi" typeface="Nyala"/>
+        <a:font script="Beng" typeface="Vrinda"/>
+        <a:font script="Gujr" typeface="Shruti"/>
+        <a:font script="Khmr" typeface="MoolBoran"/>
+        <a:font script="Knda" typeface="Tunga"/>
+        <a:font script="Guru" typeface="Raavi"/>
+        <a:font script="Cans" typeface="Euphemia"/>
+        <a:font script="Cher" typeface="Plantagenet Cherokee"/>
+        <a:font script="Yiii" typeface="Microsoft Yi Baiti"/>
+        <a:font script="Tibt" typeface="Microsoft Himalaya"/>
+        <a:font script="Thaa" typeface="MV Boli"/>
+        <a:font script="Deva" typeface="Mangal"/>
+        <a:font script="Telu" typeface="Gautami"/>
+        <a:font script="Taml" typeface="Latha"/>
+        <a:font script="Syrc" typeface="Estrangelo Edessa"/>
+        <a:font script="Orya" typeface="Kalinga"/>
+        <a:font script="Mlym" typeface="Kartika"/>
+        <a:font script="Laoo" typeface="DokChampa"/>
+        <a:font script="Sinh" typeface="Iskoola Pota"/>
+        <a:font script="Mong" typeface="Mongolian Baiti"/>
+        <a:font script="Viet" typeface="Times New Roman"/>
+        <a:font script="Uigh" typeface="Microsoft Uighur"/>
+        <a:font script="Geor" typeface="Sylfaen"/>
+      </a:majorFont>
+      <a:minorFont>
+        <a:latin typeface="Calibri"/>
+        <a:ea typeface=""/>
+        <a:cs typeface=""/>
+        <a:font script="Jpan" typeface="ＭＳ Ｐゴシック"/>
+        <a:font script="Hang" typeface="맑은 고딕"/>
+        <a:font script="Hans" typeface="宋体"/>
+        <a:font script="Hant" typeface="新細明體"/>
+        <a:font script="Arab" typeface="Arial"/>
+        <a:font script="Hebr" typeface="Arial"/>
+        <a:font script="Thai" typeface="Cordia New"/>
+        <a:font script="Ethi" typeface="Nyala"/>
+        <a:font script="Beng" typeface="Vrinda"/>
+        <a:font script="Gujr" typeface="Shruti"/>
+        <a:font script="Khmr" typeface="DaunPenh"/>
+        <a:font script="Knda" typeface="Tunga"/>
+        <a:font script="Guru" typeface="Raavi"/>
+        <a:font script="Cans" typeface="Euphemia"/>
+        <a:font script="Cher" typeface="Plantagenet Cherokee"/>
+        <a:font script="Yiii" typeface="Microsoft Yi Baiti"/>
+        <a:font script="Tibt" typeface="Microsoft Himalaya"/>
+        <a:font script="Thaa" typeface="MV Boli"/>
+        <a:font script="Deva" typeface="Mangal"/>
+        <a:font script="Telu" typeface="Gautami"/>
+        <a:font script="Taml" typeface="Latha"/>
+        <a:font script="Syrc" typeface="Estrangelo Edessa"/>
+        <a:font script="Orya" typeface="Kalinga"/>
+        <a:font script="Mlym" typeface="Kartika"/>
+        <a:font script="Laoo" typeface="DokChampa"/>
+        <a:font script="Sinh" typeface="Iskoola Pota"/>
+        <a:font script="Mong" typeface="Mongolian Baiti"/>
+        <a:font script="Viet" typeface="Arial"/>
+        <a:font script="Uigh" typeface="Microsoft Uighur"/>
+        <a:font script="Geor" typeface="Sylfaen"/>
+      </a:minorFont>
+    </a:fontScheme>
+    <a:fmtScheme name="Kantoor">
+      <a:fillStyleLst>
+        <a:solidFill>
+          <a:schemeClr val="phClr"/>
+        </a:solidFill>
+        <a:gradFill rotWithShape="1">
+          <a:gsLst>
+            <a:gs pos="0">
+              <a:schemeClr val="phClr">
+                <a:tint val="50000"/>
+                <a:satMod val="300000"/>
+              </a:schemeClr>
+            </a:gs>
+            <a:gs pos="35000">
+              <a:schemeClr val="phClr">
+                <a:tint val="37000"/>
+                <a:satMod val="300000"/>
+              </a:schemeClr>
+            </a:gs>
+            <a:gs pos="100000">
+              <a:schemeClr val="phClr">
+                <a:tint val="15000"/>
+                <a:satMod val="350000"/>
+              </a:schemeClr>
+            </a:gs>
+          </a:gsLst>
+          <a:lin ang="16200000" scaled="1"/>
+        </a:gradFill>
+        <a:gradFill rotWithShape="1">
+          <a:gsLst>
+            <a:gs pos="0">
+              <a:schemeClr val="phClr">
+                <a:shade val="51000"/>
+                <a:satMod val="130000"/>
+              </a:schemeClr>
+            </a:gs>
+            <a:gs pos="80000">
+              <a:schemeClr val="phClr">
+                <a:shade val="93000"/>
+                <a:satMod val="130000"/>
+              </a:schemeClr>
+            </a:gs>
+            <a:gs pos="100000">
+              <a:schemeClr val="phClr">
+                <a:shade val="94000"/>
+                <a:satMod val="135000"/>
+              </a:schemeClr>
+            </a:gs>
+          </a:gsLst>
+          <a:lin ang="16200000" scaled="0"/>
+        </a:gradFill>
+      </a:fillStyleLst>
+      <a:lnStyleLst>
+        <a:ln w="9525" cap="flat" cmpd="sng" algn="ctr">
+          <a:solidFill>
+            <a:schemeClr val="phClr">
+              <a:shade val="95000"/>
+              <a:satMod val="105000"/>
+            </a:schemeClr>
+          </a:solidFill>
+          <a:prstDash val="solid"/>
+        </a:ln>
+        <a:ln w="25400" cap="flat" cmpd="sng" algn="ctr">
+          <a:solidFill>
+            <a:schemeClr val="phClr"/>
+          </a:solidFill>
+          <a:prstDash val="solid"/>
+        </a:ln>
+        <a:ln w="38100" cap="flat" cmpd="sng" algn="ctr">
+          <a:solidFill>
+            <a:schemeClr val="phClr"/>
+          </a:solidFill>
+          <a:prstDash val="solid"/>
+        </a:ln>
+      </a:lnStyleLst>
+      <a:effectStyleLst>
+        <a:effectStyle>
+          <a:effectLst>
+            <a:outerShdw blurRad="40000" dist="20000" dir="5400000" rotWithShape="0">
+              <a:srgbClr val="000000">
+                <a:alpha val="38000"/>
+              </a:srgbClr>
+            </a:outerShdw>
+          </a:effectLst>
+        </a:effectStyle>
+        <a:effectStyle>
+          <a:effectLst>
+            <a:outerShdw blurRad="40000" dist="23000" dir="5400000" rotWithShape="0">
+              <a:srgbClr val="000000">
+                <a:alpha val="35000"/>
+              </a:srgbClr>
+            </a:outerShdw>
+          </a:effectLst>
+        </a:effectStyle>
+        <a:effectStyle>
+          <a:effectLst>
+            <a:outerShdw blurRad="40000" dist="23000" dir="5400000" rotWithShape="0">
+              <a:srgbClr val="000000">
+                <a:alpha val="35000"/>
+              </a:srgbClr>
+            </a:outerShdw>
+          </a:effectLst>
+          <a:scene3d>
+            <a:camera prst="orthographicFront">
+              <a:rot lat="0" lon="0" rev="0"/>
+            </a:camera>
+            <a:lightRig rig="threePt" dir="t">
+              <a:rot lat="0" lon="0" rev="1200000"/>
+            </a:lightRig>
+          </a:scene3d>
+          <a:sp3d>
+            <a:bevelT w="63500" h="25400"/>
+          </a:sp3d>
+        </a:effectStyle>
+      </a:effectStyleLst>
+      <a:bgFillStyleLst>
+        <a:solidFill>
+          <a:schemeClr val="phClr"/>
+        </a:solidFill>
+        <a:gradFill rotWithShape="1">
+          <a:gsLst>
+            <a:gs pos="0">
+              <a:schemeClr val="phClr">
+                <a:tint val="40000"/>
+                <a:satMod val="350000"/>
+              </a:schemeClr>
+            </a:gs>
+            <a:gs pos="40000">
+              <a:schemeClr val="phClr">
+                <a:tint val="45000"/>
+                <a:shade val="99000"/>
+                <a:satMod val="350000"/>
+              </a:schemeClr>
+            </a:gs>
+            <a:gs pos="100000">
+              <a:schemeClr val="phClr">
+                <a:shade val="20000"/>
+                <a:satMod val="255000"/>
+              </a:schemeClr>
+            </a:gs>
+          </a:gsLst>
+          <a:path path="circle">
+            <a:fillToRect l="50000" t="-80000" r="50000" b="180000"/>
+          </a:path>
+        </a:gradFill>
+        <a:gradFill rotWithShape="1">
+          <a:gsLst>
+            <a:gs pos="0">
+              <a:schemeClr val="phClr">
+                <a:tint val="80000"/>
+                <a:satMod val="300000"/>
+              </a:schemeClr>
+            </a:gs>
+            <a:gs pos="100000">
+              <a:schemeClr val="phClr">
+                <a:shade val="30000"/>
+                <a:satMod val="200000"/>
+              </a:schemeClr>
+            </a:gs>
+          </a:gsLst>
+          <a:path path="circle">
+            <a:fillToRect l="50000" t="50000" r="50000" b="50000"/>
+          </a:path>
+        </a:gradFill>
+      </a:bgFillStyleLst>
+    </a:fmtScheme>
+  </a:themeElements>
+  <a:objectDefaults/>
+  <a:extraClrSchemeLst/>
+</a:theme>
 </file>
</xml_diff>

<commit_message>
small changes to outline and slides
</commit_message>
<xml_diff>
--- a/presentation/Presentation.pptx
+++ b/presentation/Presentation.pptx
@@ -5,10 +5,10 @@
     <p:sldMasterId id="2147483648" r:id="rId1"/>
   </p:sldMasterIdLst>
   <p:notesMasterIdLst>
-    <p:notesMasterId r:id="rId32"/>
+    <p:notesMasterId r:id="rId33"/>
   </p:notesMasterIdLst>
   <p:handoutMasterIdLst>
-    <p:handoutMasterId r:id="rId33"/>
+    <p:handoutMasterId r:id="rId34"/>
   </p:handoutMasterIdLst>
   <p:sldIdLst>
     <p:sldId id="269" r:id="rId2"/>
@@ -41,6 +41,7 @@
     <p:sldId id="296" r:id="rId29"/>
     <p:sldId id="297" r:id="rId30"/>
     <p:sldId id="298" r:id="rId31"/>
+    <p:sldId id="299" r:id="rId32"/>
   </p:sldIdLst>
   <p:sldSz cx="9144000" cy="6858000" type="screen4x3"/>
   <p:notesSz cx="6858000" cy="9144000"/>
@@ -194,6 +195,7 @@
         <p14:section name="Conclusion" id="{180BEECC-4D0B-4A4F-A3F5-019DAE7BDC83}">
           <p14:sldIdLst>
             <p14:sldId id="298"/>
+            <p14:sldId id="299"/>
           </p14:sldIdLst>
         </p14:section>
       </p14:sectionLst>
@@ -300,11 +302,11 @@
           <c:showPercent val="0"/>
           <c:showBubbleSize val="0"/>
         </c:dLbls>
-        <c:axId val="37376000"/>
-        <c:axId val="37377536"/>
+        <c:axId val="102249216"/>
+        <c:axId val="102250368"/>
       </c:scatterChart>
       <c:valAx>
-        <c:axId val="37376000"/>
+        <c:axId val="102249216"/>
         <c:scaling>
           <c:orientation val="minMax"/>
           <c:max val="8"/>
@@ -326,12 +328,12 @@
             <a:endParaRPr lang="nl-NL"/>
           </a:p>
         </c:txPr>
-        <c:crossAx val="37377536"/>
+        <c:crossAx val="102250368"/>
         <c:crosses val="autoZero"/>
         <c:crossBetween val="midCat"/>
       </c:valAx>
       <c:valAx>
-        <c:axId val="37377536"/>
+        <c:axId val="102250368"/>
         <c:scaling>
           <c:orientation val="minMax"/>
           <c:max val="8"/>
@@ -353,7 +355,7 @@
             <a:endParaRPr lang="nl-NL"/>
           </a:p>
         </c:txPr>
-        <c:crossAx val="37376000"/>
+        <c:crossAx val="102249216"/>
         <c:crosses val="autoZero"/>
         <c:crossBetween val="midCat"/>
       </c:valAx>
@@ -452,11 +454,11 @@
           <c:showPercent val="0"/>
           <c:showBubbleSize val="0"/>
         </c:dLbls>
-        <c:axId val="37769984"/>
-        <c:axId val="37771520"/>
+        <c:axId val="102289408"/>
+        <c:axId val="102290944"/>
       </c:scatterChart>
       <c:valAx>
-        <c:axId val="37769984"/>
+        <c:axId val="102289408"/>
         <c:scaling>
           <c:orientation val="minMax"/>
           <c:max val="8"/>
@@ -478,12 +480,12 @@
             <a:endParaRPr lang="nl-NL"/>
           </a:p>
         </c:txPr>
-        <c:crossAx val="37771520"/>
+        <c:crossAx val="102290944"/>
         <c:crosses val="autoZero"/>
         <c:crossBetween val="midCat"/>
       </c:valAx>
       <c:valAx>
-        <c:axId val="37771520"/>
+        <c:axId val="102290944"/>
         <c:scaling>
           <c:orientation val="minMax"/>
           <c:max val="8"/>
@@ -505,7 +507,7 @@
             <a:endParaRPr lang="nl-NL"/>
           </a:p>
         </c:txPr>
-        <c:crossAx val="37769984"/>
+        <c:crossAx val="102289408"/>
         <c:crosses val="autoZero"/>
         <c:crossBetween val="midCat"/>
       </c:valAx>
@@ -610,11 +612,11 @@
           <c:showPercent val="0"/>
           <c:showBubbleSize val="0"/>
         </c:dLbls>
-        <c:axId val="37799424"/>
-        <c:axId val="37800960"/>
+        <c:axId val="103097856"/>
+        <c:axId val="103099392"/>
       </c:scatterChart>
       <c:valAx>
-        <c:axId val="37799424"/>
+        <c:axId val="103097856"/>
         <c:scaling>
           <c:orientation val="minMax"/>
           <c:max val="8"/>
@@ -636,12 +638,12 @@
             <a:endParaRPr lang="nl-NL"/>
           </a:p>
         </c:txPr>
-        <c:crossAx val="37800960"/>
+        <c:crossAx val="103099392"/>
         <c:crosses val="autoZero"/>
         <c:crossBetween val="midCat"/>
       </c:valAx>
       <c:valAx>
-        <c:axId val="37800960"/>
+        <c:axId val="103099392"/>
         <c:scaling>
           <c:orientation val="minMax"/>
           <c:max val="8"/>
@@ -663,7 +665,7 @@
             <a:endParaRPr lang="nl-NL"/>
           </a:p>
         </c:txPr>
-        <c:crossAx val="37799424"/>
+        <c:crossAx val="103097856"/>
         <c:crosses val="autoZero"/>
         <c:crossBetween val="midCat"/>
       </c:valAx>
@@ -774,11 +776,11 @@
           <c:showPercent val="0"/>
           <c:showBubbleSize val="0"/>
         </c:dLbls>
-        <c:axId val="37488896"/>
-        <c:axId val="37507072"/>
+        <c:axId val="103139584"/>
+        <c:axId val="103145472"/>
       </c:scatterChart>
       <c:valAx>
-        <c:axId val="37488896"/>
+        <c:axId val="103139584"/>
         <c:scaling>
           <c:orientation val="minMax"/>
           <c:max val="8"/>
@@ -800,12 +802,12 @@
             <a:endParaRPr lang="nl-NL"/>
           </a:p>
         </c:txPr>
-        <c:crossAx val="37507072"/>
+        <c:crossAx val="103145472"/>
         <c:crosses val="autoZero"/>
         <c:crossBetween val="midCat"/>
       </c:valAx>
       <c:valAx>
-        <c:axId val="37507072"/>
+        <c:axId val="103145472"/>
         <c:scaling>
           <c:orientation val="minMax"/>
           <c:max val="8"/>
@@ -827,7 +829,7 @@
             <a:endParaRPr lang="nl-NL"/>
           </a:p>
         </c:txPr>
-        <c:crossAx val="37488896"/>
+        <c:crossAx val="103139584"/>
         <c:crosses val="autoZero"/>
         <c:crossBetween val="midCat"/>
       </c:valAx>
@@ -944,11 +946,11 @@
           <c:showPercent val="0"/>
           <c:showBubbleSize val="0"/>
         </c:dLbls>
-        <c:axId val="37567488"/>
-        <c:axId val="37569280"/>
+        <c:axId val="103156736"/>
+        <c:axId val="103187200"/>
       </c:scatterChart>
       <c:valAx>
-        <c:axId val="37567488"/>
+        <c:axId val="103156736"/>
         <c:scaling>
           <c:orientation val="minMax"/>
           <c:max val="8"/>
@@ -970,12 +972,12 @@
             <a:endParaRPr lang="nl-NL"/>
           </a:p>
         </c:txPr>
-        <c:crossAx val="37569280"/>
+        <c:crossAx val="103187200"/>
         <c:crosses val="autoZero"/>
         <c:crossBetween val="midCat"/>
       </c:valAx>
       <c:valAx>
-        <c:axId val="37569280"/>
+        <c:axId val="103187200"/>
         <c:scaling>
           <c:orientation val="minMax"/>
           <c:max val="8"/>
@@ -997,7 +999,7 @@
             <a:endParaRPr lang="nl-NL"/>
           </a:p>
         </c:txPr>
-        <c:crossAx val="37567488"/>
+        <c:crossAx val="103156736"/>
         <c:crosses val="autoZero"/>
         <c:crossBetween val="midCat"/>
       </c:valAx>
@@ -1120,11 +1122,11 @@
           <c:showPercent val="0"/>
           <c:showBubbleSize val="0"/>
         </c:dLbls>
-        <c:axId val="37580800"/>
-        <c:axId val="37582336"/>
+        <c:axId val="103194624"/>
+        <c:axId val="103196160"/>
       </c:scatterChart>
       <c:valAx>
-        <c:axId val="37580800"/>
+        <c:axId val="103194624"/>
         <c:scaling>
           <c:orientation val="minMax"/>
           <c:max val="8"/>
@@ -1146,12 +1148,12 @@
             <a:endParaRPr lang="nl-NL"/>
           </a:p>
         </c:txPr>
-        <c:crossAx val="37582336"/>
+        <c:crossAx val="103196160"/>
         <c:crosses val="autoZero"/>
         <c:crossBetween val="midCat"/>
       </c:valAx>
       <c:valAx>
-        <c:axId val="37582336"/>
+        <c:axId val="103196160"/>
         <c:scaling>
           <c:orientation val="minMax"/>
           <c:max val="8"/>
@@ -1173,7 +1175,7 @@
             <a:endParaRPr lang="nl-NL"/>
           </a:p>
         </c:txPr>
-        <c:crossAx val="37580800"/>
+        <c:crossAx val="103194624"/>
         <c:crosses val="autoZero"/>
         <c:crossBetween val="midCat"/>
       </c:valAx>
@@ -1302,11 +1304,11 @@
           <c:showPercent val="0"/>
           <c:showBubbleSize val="0"/>
         </c:dLbls>
-        <c:axId val="37647104"/>
-        <c:axId val="37648640"/>
+        <c:axId val="110011136"/>
+        <c:axId val="110012672"/>
       </c:scatterChart>
       <c:valAx>
-        <c:axId val="37647104"/>
+        <c:axId val="110011136"/>
         <c:scaling>
           <c:orientation val="minMax"/>
           <c:max val="8"/>
@@ -1328,12 +1330,12 @@
             <a:endParaRPr lang="nl-NL"/>
           </a:p>
         </c:txPr>
-        <c:crossAx val="37648640"/>
+        <c:crossAx val="110012672"/>
         <c:crosses val="autoZero"/>
         <c:crossBetween val="midCat"/>
       </c:valAx>
       <c:valAx>
-        <c:axId val="37648640"/>
+        <c:axId val="110012672"/>
         <c:scaling>
           <c:orientation val="minMax"/>
           <c:max val="8"/>
@@ -1355,7 +1357,7 @@
             <a:endParaRPr lang="nl-NL"/>
           </a:p>
         </c:txPr>
-        <c:crossAx val="37647104"/>
+        <c:crossAx val="110011136"/>
         <c:crosses val="autoZero"/>
         <c:crossBetween val="midCat"/>
       </c:valAx>
@@ -1490,11 +1492,11 @@
           <c:showPercent val="0"/>
           <c:showBubbleSize val="0"/>
         </c:dLbls>
-        <c:axId val="37672448"/>
-        <c:axId val="37673984"/>
+        <c:axId val="104334080"/>
+        <c:axId val="104335616"/>
       </c:scatterChart>
       <c:valAx>
-        <c:axId val="37672448"/>
+        <c:axId val="104334080"/>
         <c:scaling>
           <c:orientation val="minMax"/>
           <c:max val="8"/>
@@ -1516,12 +1518,12 @@
             <a:endParaRPr lang="nl-NL"/>
           </a:p>
         </c:txPr>
-        <c:crossAx val="37673984"/>
+        <c:crossAx val="104335616"/>
         <c:crosses val="autoZero"/>
         <c:crossBetween val="midCat"/>
       </c:valAx>
       <c:valAx>
-        <c:axId val="37673984"/>
+        <c:axId val="104335616"/>
         <c:scaling>
           <c:orientation val="minMax"/>
           <c:max val="8"/>
@@ -1543,7 +1545,7 @@
             <a:endParaRPr lang="nl-NL"/>
           </a:p>
         </c:txPr>
-        <c:crossAx val="37672448"/>
+        <c:crossAx val="104334080"/>
         <c:crosses val="autoZero"/>
         <c:crossBetween val="midCat"/>
       </c:valAx>
@@ -1684,11 +1686,11 @@
           <c:showPercent val="0"/>
           <c:showBubbleSize val="0"/>
         </c:dLbls>
-        <c:axId val="37669120"/>
-        <c:axId val="37691392"/>
+        <c:axId val="104351232"/>
+        <c:axId val="104352768"/>
       </c:scatterChart>
       <c:valAx>
-        <c:axId val="37669120"/>
+        <c:axId val="104351232"/>
         <c:scaling>
           <c:orientation val="minMax"/>
           <c:max val="8"/>
@@ -1710,13 +1712,13 @@
             <a:endParaRPr lang="nl-NL"/>
           </a:p>
         </c:txPr>
-        <c:crossAx val="37691392"/>
+        <c:crossAx val="104352768"/>
         <c:crosses val="autoZero"/>
         <c:crossBetween val="midCat"/>
         <c:majorUnit val="2"/>
       </c:valAx>
       <c:valAx>
-        <c:axId val="37691392"/>
+        <c:axId val="104352768"/>
         <c:scaling>
           <c:orientation val="minMax"/>
           <c:max val="8"/>
@@ -1738,7 +1740,7 @@
             <a:endParaRPr lang="nl-NL"/>
           </a:p>
         </c:txPr>
-        <c:crossAx val="37669120"/>
+        <c:crossAx val="104351232"/>
         <c:crosses val="autoZero"/>
         <c:crossBetween val="midCat"/>
       </c:valAx>
@@ -1878,7 +1880,7 @@
           <a:p>
             <a:fld id="{9B672E7A-3E5D-4AB0-B300-1A3301431166}" type="datetimeFigureOut">
               <a:rPr lang="nl-NL" smtClean="0"/>
-              <a:t>15-12-2016</a:t>
+              <a:t>16-12-2016</a:t>
             </a:fld>
             <a:endParaRPr lang="nl-NL"/>
           </a:p>
@@ -2730,6 +2732,95 @@
     <p:extLst>
       <p:ext uri="{BB962C8B-B14F-4D97-AF65-F5344CB8AC3E}">
         <p14:creationId xmlns:p14="http://schemas.microsoft.com/office/powerpoint/2010/main" val="166963673"/>
+      </p:ext>
+    </p:extLst>
+  </p:cSld>
+  <p:clrMapOvr>
+    <a:masterClrMapping/>
+  </p:clrMapOvr>
+</p:notes>
+</file>
+
+<file path=ppt/notesSlides/notesSlide8.xml><?xml version="1.0" encoding="utf-8"?>
+<p:notes xmlns:a="http://schemas.openxmlformats.org/drawingml/2006/main" xmlns:r="http://schemas.openxmlformats.org/officeDocument/2006/relationships" xmlns:p="http://schemas.openxmlformats.org/presentationml/2006/main">
+  <p:cSld>
+    <p:spTree>
+      <p:nvGrpSpPr>
+        <p:cNvPr id="1" name=""/>
+        <p:cNvGrpSpPr/>
+        <p:nvPr/>
+      </p:nvGrpSpPr>
+      <p:grpSpPr>
+        <a:xfrm>
+          <a:off x="0" y="0"/>
+          <a:ext cx="0" cy="0"/>
+          <a:chOff x="0" y="0"/>
+          <a:chExt cx="0" cy="0"/>
+        </a:xfrm>
+      </p:grpSpPr>
+      <p:sp>
+        <p:nvSpPr>
+          <p:cNvPr id="2" name="Tijdelijke aanduiding voor dia-afbeelding 1"/>
+          <p:cNvSpPr>
+            <a:spLocks noGrp="1" noRot="1" noChangeAspect="1"/>
+          </p:cNvSpPr>
+          <p:nvPr>
+            <p:ph type="sldImg"/>
+          </p:nvPr>
+        </p:nvSpPr>
+        <p:spPr>
+          <a:xfrm>
+            <a:off x="1143000" y="685800"/>
+            <a:ext cx="4572000" cy="3429000"/>
+          </a:xfrm>
+        </p:spPr>
+      </p:sp>
+      <p:sp>
+        <p:nvSpPr>
+          <p:cNvPr id="3" name="Tijdelijke aanduiding voor notities 2"/>
+          <p:cNvSpPr>
+            <a:spLocks noGrp="1"/>
+          </p:cNvSpPr>
+          <p:nvPr>
+            <p:ph type="body" idx="1"/>
+          </p:nvPr>
+        </p:nvSpPr>
+        <p:spPr/>
+        <p:txBody>
+          <a:bodyPr/>
+          <a:lstStyle/>
+          <a:p>
+            <a:endParaRPr lang="nl-NL" dirty="0"/>
+          </a:p>
+        </p:txBody>
+      </p:sp>
+      <p:sp>
+        <p:nvSpPr>
+          <p:cNvPr id="4" name="Tijdelijke aanduiding voor dianummer 3"/>
+          <p:cNvSpPr>
+            <a:spLocks noGrp="1"/>
+          </p:cNvSpPr>
+          <p:nvPr>
+            <p:ph type="sldNum" sz="quarter" idx="10"/>
+          </p:nvPr>
+        </p:nvSpPr>
+        <p:spPr/>
+        <p:txBody>
+          <a:bodyPr/>
+          <a:lstStyle/>
+          <a:p>
+            <a:fld id="{763CB1AC-7512-428E-8D64-A7F319414701}" type="slidenum">
+              <a:rPr lang="nl-NL" smtClean="0"/>
+              <a:t>30</a:t>
+            </a:fld>
+            <a:endParaRPr lang="nl-NL"/>
+          </a:p>
+        </p:txBody>
+      </p:sp>
+    </p:spTree>
+    <p:extLst>
+      <p:ext uri="{BB962C8B-B14F-4D97-AF65-F5344CB8AC3E}">
+        <p14:creationId xmlns:p14="http://schemas.microsoft.com/office/powerpoint/2010/main" val="2193829826"/>
       </p:ext>
     </p:extLst>
   </p:cSld>
@@ -10545,7 +10636,7 @@
         <p:spPr>
           <a:xfrm>
             <a:off x="457201" y="2174875"/>
-            <a:ext cx="4040188" cy="4566494"/>
+            <a:ext cx="5410944" cy="4566494"/>
           </a:xfrm>
         </p:spPr>
         <p:txBody>
@@ -10640,6 +10731,9 @@
             <a:endParaRPr lang="nl-NL" dirty="0"/>
           </a:p>
           <a:p>
+            <a:pPr marL="0" indent="0">
+              <a:buNone/>
+            </a:pPr>
             <a:r>
               <a:rPr lang="nl-NL" b="1" dirty="0" err="1" smtClean="0"/>
               <a:t>Our</a:t>
@@ -10650,7 +10744,6 @@
             </a:r>
           </a:p>
           <a:p>
-            <a:pPr lvl="1"/>
             <a:r>
               <a:rPr lang="nl-NL" dirty="0" smtClean="0"/>
               <a:t>Move </a:t>
@@ -10673,7 +10766,6 @@
             </a:r>
           </a:p>
           <a:p>
-            <a:pPr lvl="1"/>
             <a:r>
               <a:rPr lang="nl-NL" dirty="0" smtClean="0"/>
               <a:t>Keep </a:t>
@@ -10693,7 +10785,6 @@
             <a:endParaRPr lang="nl-NL" dirty="0" smtClean="0"/>
           </a:p>
           <a:p>
-            <a:pPr lvl="1"/>
             <a:r>
               <a:rPr lang="nl-NL" i="1" dirty="0" err="1" smtClean="0"/>
               <a:t>Automatically</a:t>
@@ -11986,7 +12077,7 @@
     <p:controls>
       <mc:AlternateContent xmlns:mc="http://schemas.openxmlformats.org/markup-compatibility/2006">
         <mc:Choice xmlns:v="urn:schemas-microsoft-com:vml" Requires="v">
-          <p:control spid="3082" name="WindowsMediaPlayer1" r:id="rId2" imgW="9142857" imgH="6857143"/>
+          <p:control spid="3083" name="WindowsMediaPlayer1" r:id="rId2" imgW="9142857" imgH="6857143"/>
         </mc:Choice>
         <mc:Fallback>
           <p:control name="WindowsMediaPlayer1" r:id="rId2" imgW="9142857" imgH="6857143">
@@ -18418,8 +18509,8 @@
           </a:fontRef>
         </p:style>
       </p:cxnSp>
-      <mc:AlternateContent xmlns:mc="http://schemas.openxmlformats.org/markup-compatibility/2006">
-        <mc:Choice xmlns:a14="http://schemas.microsoft.com/office/drawing/2010/main" Requires="a14">
+      <mc:AlternateContent xmlns:mc="http://schemas.openxmlformats.org/markup-compatibility/2006" xmlns:a14="http://schemas.microsoft.com/office/drawing/2010/main">
+        <mc:Choice Requires="a14">
           <p:sp>
             <p:nvSpPr>
               <p:cNvPr id="59" name="Tekstvak 58"/>
@@ -18442,6 +18533,7 @@
               </a:bodyPr>
               <a:lstStyle/>
               <a:p>
+                <a:pPr/>
                 <a14:m>
                   <m:oMathPara xmlns:m="http://schemas.openxmlformats.org/officeDocument/2006/math">
                     <m:oMathParaPr>
@@ -18462,7 +18554,7 @@
             </p:txBody>
           </p:sp>
         </mc:Choice>
-        <mc:Fallback>
+        <mc:Fallback xmlns="">
           <p:sp>
             <p:nvSpPr>
               <p:cNvPr id="59" name="Tekstvak 58"/>
@@ -18501,8 +18593,8 @@
           </p:sp>
         </mc:Fallback>
       </mc:AlternateContent>
-      <mc:AlternateContent xmlns:mc="http://schemas.openxmlformats.org/markup-compatibility/2006">
-        <mc:Choice xmlns:a14="http://schemas.microsoft.com/office/drawing/2010/main" Requires="a14">
+      <mc:AlternateContent xmlns:mc="http://schemas.openxmlformats.org/markup-compatibility/2006" xmlns:a14="http://schemas.microsoft.com/office/drawing/2010/main">
+        <mc:Choice Requires="a14">
           <p:sp>
             <p:nvSpPr>
               <p:cNvPr id="60" name="Tekstvak 59"/>
@@ -18525,6 +18617,7 @@
               </a:bodyPr>
               <a:lstStyle/>
               <a:p>
+                <a:pPr/>
                 <a14:m>
                   <m:oMathPara xmlns:m="http://schemas.openxmlformats.org/officeDocument/2006/math">
                     <m:oMathParaPr>
@@ -18545,7 +18638,7 @@
             </p:txBody>
           </p:sp>
         </mc:Choice>
-        <mc:Fallback>
+        <mc:Fallback xmlns="">
           <p:sp>
             <p:nvSpPr>
               <p:cNvPr id="60" name="Tekstvak 59"/>
@@ -19726,8 +19819,8 @@
           </a:p>
         </p:txBody>
       </p:sp>
-      <mc:AlternateContent xmlns:mc="http://schemas.openxmlformats.org/markup-compatibility/2006">
-        <mc:Choice xmlns:a14="http://schemas.microsoft.com/office/drawing/2010/main" Requires="a14">
+      <mc:AlternateContent xmlns:mc="http://schemas.openxmlformats.org/markup-compatibility/2006" xmlns:a14="http://schemas.microsoft.com/office/drawing/2010/main">
+        <mc:Choice Requires="a14">
           <p:sp>
             <p:nvSpPr>
               <p:cNvPr id="57" name="Tijdelijke aanduiding voor inhoud 56"/>
@@ -20238,13 +20331,7 @@
                       <a:rPr lang="nl-NL" b="0" i="1" smtClean="0">
                         <a:latin typeface="Cambria Math"/>
                       </a:rPr>
-                      <m:t>.0</m:t>
-                    </m:r>
-                    <m:r>
-                      <a:rPr lang="nl-NL" b="0" i="1" smtClean="0">
-                        <a:latin typeface="Cambria Math"/>
-                      </a:rPr>
-                      <m:t>≤</m:t>
+                      <m:t>.0≤</m:t>
                     </m:r>
                     <m:sSub>
                       <m:sSubPr>
@@ -20284,7 +20371,7 @@
             </p:txBody>
           </p:sp>
         </mc:Choice>
-        <mc:Fallback>
+        <mc:Fallback xmlns="">
           <p:sp>
             <p:nvSpPr>
               <p:cNvPr id="57" name="Tijdelijke aanduiding voor inhoud 56"/>
@@ -21121,8 +21208,8 @@
           </a:fontRef>
         </p:style>
       </p:cxnSp>
-      <mc:AlternateContent xmlns:mc="http://schemas.openxmlformats.org/markup-compatibility/2006">
-        <mc:Choice xmlns:a14="http://schemas.microsoft.com/office/drawing/2010/main" Requires="a14">
+      <mc:AlternateContent xmlns:mc="http://schemas.openxmlformats.org/markup-compatibility/2006" xmlns:a14="http://schemas.microsoft.com/office/drawing/2010/main">
+        <mc:Choice Requires="a14">
           <p:sp>
             <p:nvSpPr>
               <p:cNvPr id="59" name="Tekstvak 58"/>
@@ -21145,6 +21232,7 @@
               </a:bodyPr>
               <a:lstStyle/>
               <a:p>
+                <a:pPr/>
                 <a14:m>
                   <m:oMathPara xmlns:m="http://schemas.openxmlformats.org/officeDocument/2006/math">
                     <m:oMathParaPr>
@@ -21165,7 +21253,7 @@
             </p:txBody>
           </p:sp>
         </mc:Choice>
-        <mc:Fallback>
+        <mc:Fallback xmlns="">
           <p:sp>
             <p:nvSpPr>
               <p:cNvPr id="59" name="Tekstvak 58"/>
@@ -21204,8 +21292,8 @@
           </p:sp>
         </mc:Fallback>
       </mc:AlternateContent>
-      <mc:AlternateContent xmlns:mc="http://schemas.openxmlformats.org/markup-compatibility/2006">
-        <mc:Choice xmlns:a14="http://schemas.microsoft.com/office/drawing/2010/main" Requires="a14">
+      <mc:AlternateContent xmlns:mc="http://schemas.openxmlformats.org/markup-compatibility/2006" xmlns:a14="http://schemas.microsoft.com/office/drawing/2010/main">
+        <mc:Choice Requires="a14">
           <p:sp>
             <p:nvSpPr>
               <p:cNvPr id="60" name="Tekstvak 59"/>
@@ -21228,6 +21316,7 @@
               </a:bodyPr>
               <a:lstStyle/>
               <a:p>
+                <a:pPr/>
                 <a14:m>
                   <m:oMathPara xmlns:m="http://schemas.openxmlformats.org/officeDocument/2006/math">
                     <m:oMathParaPr>
@@ -21248,7 +21337,7 @@
             </p:txBody>
           </p:sp>
         </mc:Choice>
-        <mc:Fallback>
+        <mc:Fallback xmlns="">
           <p:sp>
             <p:nvSpPr>
               <p:cNvPr id="60" name="Tekstvak 59"/>
@@ -21459,6 +21548,23 @@
                 <a:latin typeface="Consolas" panose="020B0609020204030204" pitchFamily="49" charset="0"/>
                 <a:cs typeface="Consolas" panose="020B0609020204030204" pitchFamily="49" charset="0"/>
               </a:rPr>
+              <a:t>  </a:t>
+            </a:r>
+            <a:r>
+              <a:rPr lang="nl-NL" sz="1800" b="1" dirty="0" err="1" smtClean="0">
+                <a:solidFill>
+                  <a:srgbClr val="7F0055"/>
+                </a:solidFill>
+                <a:latin typeface="Consolas" panose="020B0609020204030204" pitchFamily="49" charset="0"/>
+                <a:cs typeface="Consolas" panose="020B0609020204030204" pitchFamily="49" charset="0"/>
+              </a:rPr>
+              <a:t>protected</a:t>
+            </a:r>
+            <a:r>
+              <a:rPr lang="nl-NL" sz="1800" b="1" dirty="0" smtClean="0">
+                <a:latin typeface="Consolas" panose="020B0609020204030204" pitchFamily="49" charset="0"/>
+                <a:cs typeface="Consolas" panose="020B0609020204030204" pitchFamily="49" charset="0"/>
+              </a:rPr>
               <a:t> </a:t>
             </a:r>
             <a:r>
@@ -21469,10 +21575,108 @@
                 <a:latin typeface="Consolas" panose="020B0609020204030204" pitchFamily="49" charset="0"/>
                 <a:cs typeface="Consolas" panose="020B0609020204030204" pitchFamily="49" charset="0"/>
               </a:rPr>
-              <a:t>protected</a:t>
+              <a:t>final</a:t>
             </a:r>
             <a:r>
               <a:rPr lang="nl-NL" sz="1800" b="1" dirty="0">
+                <a:latin typeface="Consolas" panose="020B0609020204030204" pitchFamily="49" charset="0"/>
+                <a:cs typeface="Consolas" panose="020B0609020204030204" pitchFamily="49" charset="0"/>
+              </a:rPr>
+              <a:t> </a:t>
+            </a:r>
+            <a:r>
+              <a:rPr lang="nl-NL" sz="1800" b="1" dirty="0">
+                <a:solidFill>
+                  <a:srgbClr val="7F0055"/>
+                </a:solidFill>
+                <a:latin typeface="Consolas" panose="020B0609020204030204" pitchFamily="49" charset="0"/>
+                <a:cs typeface="Consolas" panose="020B0609020204030204" pitchFamily="49" charset="0"/>
+              </a:rPr>
+              <a:t>val</a:t>
+            </a:r>
+            <a:r>
+              <a:rPr lang="nl-NL" sz="1800" b="1" dirty="0">
+                <a:latin typeface="Consolas" panose="020B0609020204030204" pitchFamily="49" charset="0"/>
+                <a:cs typeface="Consolas" panose="020B0609020204030204" pitchFamily="49" charset="0"/>
+              </a:rPr>
+              <a:t> </a:t>
+            </a:r>
+            <a:r>
+              <a:rPr lang="nl-NL" sz="1800" dirty="0">
+                <a:solidFill>
+                  <a:srgbClr val="5E5EFF"/>
+                </a:solidFill>
+                <a:latin typeface="Consolas" panose="020B0609020204030204" pitchFamily="49" charset="0"/>
+                <a:cs typeface="Consolas" panose="020B0609020204030204" pitchFamily="49" charset="0"/>
+              </a:rPr>
+              <a:t>subject</a:t>
+            </a:r>
+            <a:r>
+              <a:rPr lang="nl-NL" sz="1800" dirty="0">
+                <a:latin typeface="Consolas" panose="020B0609020204030204" pitchFamily="49" charset="0"/>
+                <a:cs typeface="Consolas" panose="020B0609020204030204" pitchFamily="49" charset="0"/>
+              </a:rPr>
+              <a:t> = </a:t>
+            </a:r>
+            <a:r>
+              <a:rPr lang="nl-NL" sz="1800" i="1" dirty="0" err="1">
+                <a:latin typeface="Consolas" panose="020B0609020204030204" pitchFamily="49" charset="0"/>
+                <a:cs typeface="Consolas" panose="020B0609020204030204" pitchFamily="49" charset="0"/>
+              </a:rPr>
+              <a:t>PublishSubject</a:t>
+            </a:r>
+            <a:r>
+              <a:rPr lang="nl-NL" sz="1800" dirty="0">
+                <a:latin typeface="Consolas" panose="020B0609020204030204" pitchFamily="49" charset="0"/>
+                <a:cs typeface="Consolas" panose="020B0609020204030204" pitchFamily="49" charset="0"/>
+              </a:rPr>
+              <a:t>[T]()</a:t>
+            </a:r>
+            <a:br>
+              <a:rPr lang="nl-NL" sz="1800" dirty="0">
+                <a:latin typeface="Consolas" panose="020B0609020204030204" pitchFamily="49" charset="0"/>
+                <a:cs typeface="Consolas" panose="020B0609020204030204" pitchFamily="49" charset="0"/>
+              </a:rPr>
+            </a:br>
+            <a:r>
+              <a:rPr lang="nl-NL" sz="1800" dirty="0" smtClean="0">
+                <a:latin typeface="Consolas" panose="020B0609020204030204" pitchFamily="49" charset="0"/>
+                <a:cs typeface="Consolas" panose="020B0609020204030204" pitchFamily="49" charset="0"/>
+              </a:rPr>
+              <a:t/>
+            </a:r>
+            <a:br>
+              <a:rPr lang="nl-NL" sz="1800" dirty="0" smtClean="0">
+                <a:latin typeface="Consolas" panose="020B0609020204030204" pitchFamily="49" charset="0"/>
+                <a:cs typeface="Consolas" panose="020B0609020204030204" pitchFamily="49" charset="0"/>
+              </a:rPr>
+            </a:br>
+            <a:r>
+              <a:rPr lang="nl-NL" sz="1800" dirty="0" smtClean="0">
+                <a:latin typeface="Consolas" panose="020B0609020204030204" pitchFamily="49" charset="0"/>
+                <a:cs typeface="Consolas" panose="020B0609020204030204" pitchFamily="49" charset="0"/>
+              </a:rPr>
+              <a:t> </a:t>
+            </a:r>
+            <a:r>
+              <a:rPr lang="nl-NL" sz="1800" dirty="0" smtClean="0">
+                <a:latin typeface="Consolas" panose="020B0609020204030204" pitchFamily="49" charset="0"/>
+                <a:cs typeface="Consolas" panose="020B0609020204030204" pitchFamily="49" charset="0"/>
+              </a:rPr>
+              <a:t> </a:t>
+            </a:r>
+            <a:r>
+              <a:rPr lang="nl-NL" sz="1800" b="1" dirty="0" err="1" smtClean="0">
+                <a:solidFill>
+                  <a:srgbClr val="7F0055"/>
+                </a:solidFill>
+                <a:latin typeface="Consolas" panose="020B0609020204030204" pitchFamily="49" charset="0"/>
+                <a:cs typeface="Consolas" panose="020B0609020204030204" pitchFamily="49" charset="0"/>
+              </a:rPr>
+              <a:t>final</a:t>
+            </a:r>
+            <a:r>
+              <a:rPr lang="nl-NL" sz="1800" b="1" dirty="0" smtClean="0">
                 <a:latin typeface="Consolas" panose="020B0609020204030204" pitchFamily="49" charset="0"/>
                 <a:cs typeface="Consolas" panose="020B0609020204030204" pitchFamily="49" charset="0"/>
               </a:rPr>
@@ -21486,7 +21690,7 @@
                 <a:latin typeface="Consolas" panose="020B0609020204030204" pitchFamily="49" charset="0"/>
                 <a:cs typeface="Consolas" panose="020B0609020204030204" pitchFamily="49" charset="0"/>
               </a:rPr>
-              <a:t>final</a:t>
+              <a:t>def</a:t>
             </a:r>
             <a:r>
               <a:rPr lang="nl-NL" sz="1800" b="1" dirty="0">
@@ -21496,21 +21700,32 @@
               <a:t> </a:t>
             </a:r>
             <a:r>
-              <a:rPr lang="nl-NL" sz="1800" b="1" dirty="0">
-                <a:solidFill>
-                  <a:srgbClr val="7F0055"/>
-                </a:solidFill>
-                <a:latin typeface="Consolas" panose="020B0609020204030204" pitchFamily="49" charset="0"/>
-                <a:cs typeface="Consolas" panose="020B0609020204030204" pitchFamily="49" charset="0"/>
-              </a:rPr>
-              <a:t>val</a:t>
-            </a:r>
-            <a:r>
-              <a:rPr lang="nl-NL" sz="1800" b="1" dirty="0">
-                <a:latin typeface="Consolas" panose="020B0609020204030204" pitchFamily="49" charset="0"/>
-                <a:cs typeface="Consolas" panose="020B0609020204030204" pitchFamily="49" charset="0"/>
-              </a:rPr>
-              <a:t> </a:t>
+              <a:rPr lang="nl-NL" sz="1800" dirty="0" err="1">
+                <a:latin typeface="Consolas" panose="020B0609020204030204" pitchFamily="49" charset="0"/>
+                <a:cs typeface="Consolas" panose="020B0609020204030204" pitchFamily="49" charset="0"/>
+              </a:rPr>
+              <a:t>results</a:t>
+            </a:r>
+            <a:r>
+              <a:rPr lang="nl-NL" sz="1800" dirty="0">
+                <a:latin typeface="Consolas" panose="020B0609020204030204" pitchFamily="49" charset="0"/>
+                <a:cs typeface="Consolas" panose="020B0609020204030204" pitchFamily="49" charset="0"/>
+              </a:rPr>
+              <a:t>: </a:t>
+            </a:r>
+            <a:r>
+              <a:rPr lang="nl-NL" sz="1800" dirty="0" err="1">
+                <a:latin typeface="Consolas" panose="020B0609020204030204" pitchFamily="49" charset="0"/>
+                <a:cs typeface="Consolas" panose="020B0609020204030204" pitchFamily="49" charset="0"/>
+              </a:rPr>
+              <a:t>Observable</a:t>
+            </a:r>
+            <a:r>
+              <a:rPr lang="nl-NL" sz="1800" dirty="0">
+                <a:latin typeface="Consolas" panose="020B0609020204030204" pitchFamily="49" charset="0"/>
+                <a:cs typeface="Consolas" panose="020B0609020204030204" pitchFamily="49" charset="0"/>
+              </a:rPr>
+              <a:t>[T] = </a:t>
             </a:r>
             <a:r>
               <a:rPr lang="nl-NL" sz="1800" dirty="0">
@@ -21527,28 +21742,7 @@
                 <a:latin typeface="Consolas" panose="020B0609020204030204" pitchFamily="49" charset="0"/>
                 <a:cs typeface="Consolas" panose="020B0609020204030204" pitchFamily="49" charset="0"/>
               </a:rPr>
-              <a:t> </a:t>
-            </a:r>
-            <a:r>
-              <a:rPr lang="nl-NL" sz="1800" dirty="0">
-                <a:latin typeface="Consolas" panose="020B0609020204030204" pitchFamily="49" charset="0"/>
-                <a:cs typeface="Consolas" panose="020B0609020204030204" pitchFamily="49" charset="0"/>
-              </a:rPr>
-              <a:t>= </a:t>
-            </a:r>
-            <a:r>
-              <a:rPr lang="nl-NL" sz="1800" i="1" dirty="0" err="1">
-                <a:latin typeface="Consolas" panose="020B0609020204030204" pitchFamily="49" charset="0"/>
-                <a:cs typeface="Consolas" panose="020B0609020204030204" pitchFamily="49" charset="0"/>
-              </a:rPr>
-              <a:t>PublishSubject</a:t>
-            </a:r>
-            <a:r>
-              <a:rPr lang="nl-NL" sz="1800" dirty="0">
-                <a:latin typeface="Consolas" panose="020B0609020204030204" pitchFamily="49" charset="0"/>
-                <a:cs typeface="Consolas" panose="020B0609020204030204" pitchFamily="49" charset="0"/>
-              </a:rPr>
-              <a:t>[T]()</a:t>
+              <a:t/>
             </a:r>
             <a:br>
               <a:rPr lang="nl-NL" sz="1800" dirty="0">
@@ -21577,122 +21771,24 @@
               <a:t> </a:t>
             </a:r>
             <a:r>
-              <a:rPr lang="nl-NL" sz="1800" b="1" dirty="0" err="1">
+              <a:rPr lang="nl-NL" sz="1800" dirty="0" smtClean="0">
+                <a:latin typeface="Consolas" panose="020B0609020204030204" pitchFamily="49" charset="0"/>
+                <a:cs typeface="Consolas" panose="020B0609020204030204" pitchFamily="49" charset="0"/>
+              </a:rPr>
+              <a:t> </a:t>
+            </a:r>
+            <a:r>
+              <a:rPr lang="nl-NL" sz="1800" b="1" dirty="0" err="1" smtClean="0">
                 <a:solidFill>
                   <a:srgbClr val="7F0055"/>
                 </a:solidFill>
                 <a:latin typeface="Consolas" panose="020B0609020204030204" pitchFamily="49" charset="0"/>
                 <a:cs typeface="Consolas" panose="020B0609020204030204" pitchFamily="49" charset="0"/>
               </a:rPr>
-              <a:t>final</a:t>
-            </a:r>
-            <a:r>
-              <a:rPr lang="nl-NL" sz="1800" b="1" dirty="0">
-                <a:latin typeface="Consolas" panose="020B0609020204030204" pitchFamily="49" charset="0"/>
-                <a:cs typeface="Consolas" panose="020B0609020204030204" pitchFamily="49" charset="0"/>
-              </a:rPr>
-              <a:t> </a:t>
-            </a:r>
-            <a:r>
-              <a:rPr lang="nl-NL" sz="1800" b="1" dirty="0" err="1">
-                <a:solidFill>
-                  <a:srgbClr val="7F0055"/>
-                </a:solidFill>
-                <a:latin typeface="Consolas" panose="020B0609020204030204" pitchFamily="49" charset="0"/>
-                <a:cs typeface="Consolas" panose="020B0609020204030204" pitchFamily="49" charset="0"/>
-              </a:rPr>
               <a:t>def</a:t>
             </a:r>
             <a:r>
-              <a:rPr lang="nl-NL" sz="1800" b="1" dirty="0">
-                <a:latin typeface="Consolas" panose="020B0609020204030204" pitchFamily="49" charset="0"/>
-                <a:cs typeface="Consolas" panose="020B0609020204030204" pitchFamily="49" charset="0"/>
-              </a:rPr>
-              <a:t> </a:t>
-            </a:r>
-            <a:r>
-              <a:rPr lang="nl-NL" sz="1800" dirty="0" err="1">
-                <a:latin typeface="Consolas" panose="020B0609020204030204" pitchFamily="49" charset="0"/>
-                <a:cs typeface="Consolas" panose="020B0609020204030204" pitchFamily="49" charset="0"/>
-              </a:rPr>
-              <a:t>results</a:t>
-            </a:r>
-            <a:r>
-              <a:rPr lang="nl-NL" sz="1800" dirty="0">
-                <a:latin typeface="Consolas" panose="020B0609020204030204" pitchFamily="49" charset="0"/>
-                <a:cs typeface="Consolas" panose="020B0609020204030204" pitchFamily="49" charset="0"/>
-              </a:rPr>
-              <a:t>: </a:t>
-            </a:r>
-            <a:r>
-              <a:rPr lang="nl-NL" sz="1800" dirty="0" err="1">
-                <a:latin typeface="Consolas" panose="020B0609020204030204" pitchFamily="49" charset="0"/>
-                <a:cs typeface="Consolas" panose="020B0609020204030204" pitchFamily="49" charset="0"/>
-              </a:rPr>
-              <a:t>Observable</a:t>
-            </a:r>
-            <a:r>
-              <a:rPr lang="nl-NL" sz="1800" dirty="0">
-                <a:latin typeface="Consolas" panose="020B0609020204030204" pitchFamily="49" charset="0"/>
-                <a:cs typeface="Consolas" panose="020B0609020204030204" pitchFamily="49" charset="0"/>
-              </a:rPr>
-              <a:t>[T] = </a:t>
-            </a:r>
-            <a:r>
-              <a:rPr lang="nl-NL" sz="1800" dirty="0">
-                <a:solidFill>
-                  <a:srgbClr val="5E5EFF"/>
-                </a:solidFill>
-                <a:latin typeface="Consolas" panose="020B0609020204030204" pitchFamily="49" charset="0"/>
-                <a:cs typeface="Consolas" panose="020B0609020204030204" pitchFamily="49" charset="0"/>
-              </a:rPr>
-              <a:t>subject</a:t>
-            </a:r>
-            <a:r>
-              <a:rPr lang="nl-NL" sz="1800" dirty="0">
-                <a:latin typeface="Consolas" panose="020B0609020204030204" pitchFamily="49" charset="0"/>
-                <a:cs typeface="Consolas" panose="020B0609020204030204" pitchFamily="49" charset="0"/>
-              </a:rPr>
-              <a:t/>
-            </a:r>
-            <a:br>
-              <a:rPr lang="nl-NL" sz="1800" dirty="0">
-                <a:latin typeface="Consolas" panose="020B0609020204030204" pitchFamily="49" charset="0"/>
-                <a:cs typeface="Consolas" panose="020B0609020204030204" pitchFamily="49" charset="0"/>
-              </a:rPr>
-            </a:br>
-            <a:r>
-              <a:rPr lang="nl-NL" sz="1800" dirty="0" smtClean="0">
-                <a:latin typeface="Consolas" panose="020B0609020204030204" pitchFamily="49" charset="0"/>
-                <a:cs typeface="Consolas" panose="020B0609020204030204" pitchFamily="49" charset="0"/>
-              </a:rPr>
-              <a:t/>
-            </a:r>
-            <a:br>
-              <a:rPr lang="nl-NL" sz="1800" dirty="0" smtClean="0">
-                <a:latin typeface="Consolas" panose="020B0609020204030204" pitchFamily="49" charset="0"/>
-                <a:cs typeface="Consolas" panose="020B0609020204030204" pitchFamily="49" charset="0"/>
-              </a:rPr>
-            </a:br>
-            <a:r>
-              <a:rPr lang="nl-NL" sz="1800" dirty="0" smtClean="0">
-                <a:latin typeface="Consolas" panose="020B0609020204030204" pitchFamily="49" charset="0"/>
-                <a:cs typeface="Consolas" panose="020B0609020204030204" pitchFamily="49" charset="0"/>
-              </a:rPr>
-              <a:t> </a:t>
-            </a:r>
-            <a:r>
-              <a:rPr lang="nl-NL" sz="1800" b="1" dirty="0" err="1">
-                <a:solidFill>
-                  <a:srgbClr val="7F0055"/>
-                </a:solidFill>
-                <a:latin typeface="Consolas" panose="020B0609020204030204" pitchFamily="49" charset="0"/>
-                <a:cs typeface="Consolas" panose="020B0609020204030204" pitchFamily="49" charset="0"/>
-              </a:rPr>
-              <a:t>def</a:t>
-            </a:r>
-            <a:r>
-              <a:rPr lang="nl-NL" sz="1800" b="1" dirty="0">
+              <a:rPr lang="nl-NL" sz="1800" b="1" dirty="0" smtClean="0">
                 <a:latin typeface="Consolas" panose="020B0609020204030204" pitchFamily="49" charset="0"/>
                 <a:cs typeface="Consolas" panose="020B0609020204030204" pitchFamily="49" charset="0"/>
               </a:rPr>
@@ -24452,6 +24548,154 @@
 </p:sld>
 </file>
 
+<file path=ppt/slides/slide31.xml><?xml version="1.0" encoding="utf-8"?>
+<p:sld xmlns:a="http://schemas.openxmlformats.org/drawingml/2006/main" xmlns:r="http://schemas.openxmlformats.org/officeDocument/2006/relationships" xmlns:p="http://schemas.openxmlformats.org/presentationml/2006/main">
+  <p:cSld>
+    <p:spTree>
+      <p:nvGrpSpPr>
+        <p:cNvPr id="1" name=""/>
+        <p:cNvGrpSpPr/>
+        <p:nvPr/>
+      </p:nvGrpSpPr>
+      <p:grpSpPr>
+        <a:xfrm>
+          <a:off x="0" y="0"/>
+          <a:ext cx="0" cy="0"/>
+          <a:chOff x="0" y="0"/>
+          <a:chExt cx="0" cy="0"/>
+        </a:xfrm>
+      </p:grpSpPr>
+      <p:sp>
+        <p:nvSpPr>
+          <p:cNvPr id="2" name="Titel 1"/>
+          <p:cNvSpPr>
+            <a:spLocks noGrp="1"/>
+          </p:cNvSpPr>
+          <p:nvPr>
+            <p:ph type="ctrTitle"/>
+          </p:nvPr>
+        </p:nvSpPr>
+        <p:spPr>
+          <a:xfrm>
+            <a:off x="179512" y="1772817"/>
+            <a:ext cx="8784976" cy="1470025"/>
+          </a:xfrm>
+        </p:spPr>
+        <p:txBody>
+          <a:bodyPr>
+            <a:noAutofit/>
+          </a:bodyPr>
+          <a:lstStyle/>
+          <a:p>
+            <a:r>
+              <a:rPr lang="nl-NL" dirty="0" err="1" smtClean="0"/>
+              <a:t>Solving</a:t>
+            </a:r>
+            <a:r>
+              <a:rPr lang="nl-NL" dirty="0" smtClean="0"/>
+              <a:t> </a:t>
+            </a:r>
+            <a:r>
+              <a:rPr lang="nl-NL" dirty="0" err="1" smtClean="0"/>
+              <a:t>the</a:t>
+            </a:r>
+            <a:r>
+              <a:rPr lang="nl-NL" dirty="0" smtClean="0"/>
+              <a:t> </a:t>
+            </a:r>
+            <a:r>
+              <a:rPr lang="nl-NL" dirty="0" err="1" smtClean="0"/>
+              <a:t>Overproduction</a:t>
+            </a:r>
+            <a:r>
+              <a:rPr lang="nl-NL" dirty="0" smtClean="0"/>
+              <a:t> </a:t>
+            </a:r>
+            <a:r>
+              <a:rPr lang="nl-NL" dirty="0" err="1" smtClean="0"/>
+              <a:t>Problem</a:t>
+            </a:r>
+            <a:r>
+              <a:rPr lang="nl-NL" dirty="0" smtClean="0"/>
+              <a:t> in </a:t>
+            </a:r>
+            <a:r>
+              <a:rPr lang="nl-NL" dirty="0" err="1" smtClean="0"/>
+              <a:t>Reactive</a:t>
+            </a:r>
+            <a:r>
+              <a:rPr lang="nl-NL" dirty="0" smtClean="0"/>
+              <a:t> Programming </a:t>
+            </a:r>
+            <a:r>
+              <a:rPr lang="nl-NL" dirty="0" err="1" smtClean="0"/>
+              <a:t>using</a:t>
+            </a:r>
+            <a:r>
+              <a:rPr lang="nl-NL" dirty="0" smtClean="0"/>
+              <a:t> Feedback Control</a:t>
+            </a:r>
+            <a:endParaRPr lang="nl-NL" dirty="0"/>
+          </a:p>
+        </p:txBody>
+      </p:sp>
+      <p:sp>
+        <p:nvSpPr>
+          <p:cNvPr id="3" name="Ondertitel 2"/>
+          <p:cNvSpPr>
+            <a:spLocks noGrp="1"/>
+          </p:cNvSpPr>
+          <p:nvPr>
+            <p:ph type="subTitle" idx="1"/>
+          </p:nvPr>
+        </p:nvSpPr>
+        <p:spPr/>
+        <p:txBody>
+          <a:bodyPr/>
+          <a:lstStyle/>
+          <a:p>
+            <a:r>
+              <a:rPr lang="nl-NL" dirty="0" smtClean="0"/>
+              <a:t>Master Thesis </a:t>
+            </a:r>
+            <a:r>
+              <a:rPr lang="nl-NL" dirty="0" err="1" smtClean="0"/>
+              <a:t>Defense</a:t>
+            </a:r>
+            <a:endParaRPr lang="nl-NL" dirty="0" smtClean="0"/>
+          </a:p>
+          <a:p>
+            <a:endParaRPr lang="nl-NL" dirty="0"/>
+          </a:p>
+          <a:p>
+            <a:r>
+              <a:rPr lang="nl-NL" dirty="0" smtClean="0"/>
+              <a:t>Richard van Heest</a:t>
+            </a:r>
+            <a:endParaRPr lang="nl-NL" dirty="0"/>
+          </a:p>
+        </p:txBody>
+      </p:sp>
+    </p:spTree>
+    <p:extLst>
+      <p:ext uri="{BB962C8B-B14F-4D97-AF65-F5344CB8AC3E}">
+        <p14:creationId xmlns:p14="http://schemas.microsoft.com/office/powerpoint/2010/main" val="2333445550"/>
+      </p:ext>
+    </p:extLst>
+  </p:cSld>
+  <p:clrMapOvr>
+    <a:masterClrMapping/>
+  </p:clrMapOvr>
+  <p:timing>
+    <p:tnLst>
+      <p:par>
+        <p:cTn id="1" dur="indefinite" restart="never" nodeType="tmRoot"/>
+      </p:par>
+    </p:tnLst>
+  </p:timing>
+</p:sld>
+</file>
+
 <file path=ppt/slides/slide4.xml><?xml version="1.0" encoding="utf-8"?>
 <p:sld xmlns:a="http://schemas.openxmlformats.org/drawingml/2006/main" xmlns:r="http://schemas.openxmlformats.org/officeDocument/2006/relationships" xmlns:p="http://schemas.openxmlformats.org/presentationml/2006/main">
   <p:cSld>
@@ -25794,7 +26038,6 @@
               <a:rPr lang="nl-NL" dirty="0"/>
               <a:t>producer</a:t>
             </a:r>
-            <a:endParaRPr lang="nl-NL" dirty="0"/>
           </a:p>
         </p:txBody>
       </p:sp>
@@ -26377,7 +26620,6 @@
               <a:rPr lang="nl-NL" dirty="0"/>
               <a:t>time = 0</a:t>
             </a:r>
-            <a:endParaRPr lang="nl-NL" dirty="0"/>
           </a:p>
         </p:txBody>
       </p:sp>
@@ -26421,7 +26663,6 @@
               <a:rPr lang="nl-NL" dirty="0"/>
               <a:t>time = 1</a:t>
             </a:r>
-            <a:endParaRPr lang="nl-NL" dirty="0"/>
           </a:p>
         </p:txBody>
       </p:sp>
@@ -26465,7 +26706,6 @@
               <a:rPr lang="nl-NL" dirty="0"/>
               <a:t>time = 2</a:t>
             </a:r>
-            <a:endParaRPr lang="nl-NL" dirty="0"/>
           </a:p>
         </p:txBody>
       </p:sp>
@@ -26509,7 +26749,6 @@
               <a:rPr lang="nl-NL" dirty="0"/>
               <a:t>time = 3</a:t>
             </a:r>
-            <a:endParaRPr lang="nl-NL" dirty="0"/>
           </a:p>
         </p:txBody>
       </p:sp>
@@ -26553,7 +26792,6 @@
               <a:rPr lang="nl-NL" dirty="0"/>
               <a:t>time = 4</a:t>
             </a:r>
-            <a:endParaRPr lang="nl-NL" dirty="0"/>
           </a:p>
         </p:txBody>
       </p:sp>
@@ -26597,7 +26835,6 @@
               <a:rPr lang="nl-NL" dirty="0"/>
               <a:t>time = 5</a:t>
             </a:r>
-            <a:endParaRPr lang="nl-NL" dirty="0"/>
           </a:p>
         </p:txBody>
       </p:sp>
@@ -26684,7 +26921,6 @@
               <a:rPr lang="nl-NL" dirty="0"/>
               <a:t>time = 7</a:t>
             </a:r>
-            <a:endParaRPr lang="nl-NL" dirty="0"/>
           </a:p>
         </p:txBody>
       </p:sp>
@@ -26728,7 +26964,6 @@
               <a:rPr lang="nl-NL" dirty="0"/>
               <a:t>time = 8</a:t>
             </a:r>
-            <a:endParaRPr lang="nl-NL" dirty="0"/>
           </a:p>
         </p:txBody>
       </p:sp>

</xml_diff>